<commit_message>
Mejoro ejemplo de Entregas Gratuitas. Configuro OpenCover y Coveralls.io
</commit_message>
<xml_diff>
--- a/Especificacion por Ejemplos.pptx
+++ b/Especificacion por Ejemplos.pptx
@@ -5,7 +5,7 @@
     <p:sldMasterId id="2147483795" r:id="rId1"/>
   </p:sldMasterIdLst>
   <p:notesMasterIdLst>
-    <p:notesMasterId r:id="rId24"/>
+    <p:notesMasterId r:id="rId25"/>
   </p:notesMasterIdLst>
   <p:sldIdLst>
     <p:sldId id="256" r:id="rId2"/>
@@ -17,7 +17,7 @@
     <p:sldId id="302" r:id="rId8"/>
     <p:sldId id="303" r:id="rId9"/>
     <p:sldId id="304" r:id="rId10"/>
-    <p:sldId id="261" r:id="rId11"/>
+    <p:sldId id="308" r:id="rId11"/>
     <p:sldId id="271" r:id="rId12"/>
     <p:sldId id="270" r:id="rId13"/>
     <p:sldId id="272" r:id="rId14"/>
@@ -25,11 +25,12 @@
     <p:sldId id="273" r:id="rId16"/>
     <p:sldId id="306" r:id="rId17"/>
     <p:sldId id="305" r:id="rId18"/>
-    <p:sldId id="274" r:id="rId19"/>
-    <p:sldId id="279" r:id="rId20"/>
-    <p:sldId id="280" r:id="rId21"/>
-    <p:sldId id="298" r:id="rId22"/>
-    <p:sldId id="277" r:id="rId23"/>
+    <p:sldId id="307" r:id="rId19"/>
+    <p:sldId id="274" r:id="rId20"/>
+    <p:sldId id="279" r:id="rId21"/>
+    <p:sldId id="280" r:id="rId22"/>
+    <p:sldId id="298" r:id="rId23"/>
+    <p:sldId id="277" r:id="rId24"/>
   </p:sldIdLst>
   <p:sldSz cx="12192000" cy="6858000"/>
   <p:notesSz cx="6858000" cy="9144000"/>
@@ -150,7 +151,7 @@
         </p14:section>
         <p14:section name="Spec by example" id="{1F2E3606-063D-42F3-874C-C9963B2877B7}">
           <p14:sldIdLst>
-            <p14:sldId id="261"/>
+            <p14:sldId id="308"/>
             <p14:sldId id="271"/>
             <p14:sldId id="270"/>
             <p14:sldId id="272"/>
@@ -158,6 +159,7 @@
             <p14:sldId id="273"/>
             <p14:sldId id="306"/>
             <p14:sldId id="305"/>
+            <p14:sldId id="307"/>
             <p14:sldId id="274"/>
             <p14:sldId id="279"/>
             <p14:sldId id="280"/>
@@ -168,7 +170,7 @@
       </p14:sectionLst>
     </p:ext>
     <p:ext uri="{EFAFB233-063F-42B5-8137-9DF3F51BA10A}">
-      <p15:sldGuideLst xmlns:p15="http://schemas.microsoft.com/office/powerpoint/2012/main" xmlns=""/>
+      <p15:sldGuideLst xmlns="" xmlns:p15="http://schemas.microsoft.com/office/powerpoint/2012/main"/>
     </p:ext>
   </p:extLst>
 </p:presentation>
@@ -1683,17 +1685,17 @@
       </dgm:t>
     </dgm:pt>
     <dgm:pt modelId="{0F1CB210-C3B0-41D2-B132-68822290F20B}">
-      <dgm:prSet phldrT="[Text]" custT="1"/>
+      <dgm:prSet phldrT="[Text]"/>
       <dgm:spPr/>
       <dgm:t>
         <a:bodyPr/>
         <a:lstStyle/>
         <a:p>
           <a:r>
-            <a:rPr lang="es-CR" sz="2400" dirty="0" smtClean="0"/>
+            <a:rPr lang="es-CR" dirty="0" smtClean="0"/>
             <a:t>Ejemplos Clave</a:t>
           </a:r>
-          <a:endParaRPr lang="en-US" sz="2400" dirty="0"/>
+          <a:endParaRPr lang="en-US" dirty="0"/>
         </a:p>
       </dgm:t>
     </dgm:pt>
@@ -1720,17 +1722,17 @@
       </dgm:t>
     </dgm:pt>
     <dgm:pt modelId="{2A4F9878-FC56-4024-8EA0-A7CDD5646BF8}">
-      <dgm:prSet phldrT="[Text]" custT="1"/>
+      <dgm:prSet phldrT="[Text]"/>
       <dgm:spPr/>
       <dgm:t>
         <a:bodyPr/>
         <a:lstStyle/>
         <a:p>
           <a:r>
-            <a:rPr lang="es-CR" sz="2400" dirty="0" smtClean="0"/>
+            <a:rPr lang="es-CR" dirty="0" smtClean="0"/>
             <a:t>Especificación con Ejemplos</a:t>
           </a:r>
-          <a:endParaRPr lang="en-US" sz="2400" dirty="0"/>
+          <a:endParaRPr lang="en-US" dirty="0"/>
         </a:p>
       </dgm:t>
     </dgm:pt>
@@ -1757,17 +1759,17 @@
       </dgm:t>
     </dgm:pt>
     <dgm:pt modelId="{367C84AB-F23E-4FDC-B17A-C1910B5435CA}">
-      <dgm:prSet phldrT="[Text]" custT="1"/>
+      <dgm:prSet phldrT="[Text]"/>
       <dgm:spPr/>
       <dgm:t>
         <a:bodyPr/>
         <a:lstStyle/>
         <a:p>
           <a:r>
-            <a:rPr lang="es-CR" sz="2400" dirty="0" smtClean="0"/>
+            <a:rPr lang="es-CR" dirty="0" smtClean="0"/>
             <a:t>Especificación Ejecutable</a:t>
           </a:r>
-          <a:endParaRPr lang="en-US" sz="2400" dirty="0"/>
+          <a:endParaRPr lang="en-US" dirty="0"/>
         </a:p>
       </dgm:t>
     </dgm:pt>
@@ -1794,17 +1796,17 @@
       </dgm:t>
     </dgm:pt>
     <dgm:pt modelId="{4C78C2C7-5AEF-49EB-85FC-849C9D0129DE}">
-      <dgm:prSet phldrT="[Text]" custT="1"/>
+      <dgm:prSet phldrT="[Text]"/>
       <dgm:spPr/>
       <dgm:t>
         <a:bodyPr/>
         <a:lstStyle/>
         <a:p>
           <a:r>
-            <a:rPr lang="es-CR" sz="2400" dirty="0" smtClean="0"/>
+            <a:rPr lang="es-CR" dirty="0" smtClean="0"/>
             <a:t>Documentación Viva</a:t>
           </a:r>
-          <a:endParaRPr lang="en-US" sz="2400" dirty="0"/>
+          <a:endParaRPr lang="en-US" dirty="0"/>
         </a:p>
       </dgm:t>
     </dgm:pt>
@@ -1884,7 +1886,7 @@
       </dgm:t>
     </dgm:pt>
     <dgm:pt modelId="{39FA849E-717D-43F5-ACE9-9639D81A8645}" type="pres">
-      <dgm:prSet presAssocID="{2A4F9878-FC56-4024-8EA0-A7CDD5646BF8}" presName="node" presStyleLbl="node1" presStyleIdx="1" presStyleCnt="4" custScaleX="130407">
+      <dgm:prSet presAssocID="{2A4F9878-FC56-4024-8EA0-A7CDD5646BF8}" presName="node" presStyleLbl="node1" presStyleIdx="1" presStyleCnt="4">
         <dgm:presLayoutVars>
           <dgm:bulletEnabled val="1"/>
         </dgm:presLayoutVars>
@@ -1921,7 +1923,7 @@
       </dgm:t>
     </dgm:pt>
     <dgm:pt modelId="{DC39BE9A-5000-41DF-9715-6CDE0925001D}" type="pres">
-      <dgm:prSet presAssocID="{367C84AB-F23E-4FDC-B17A-C1910B5435CA}" presName="node" presStyleLbl="node1" presStyleIdx="2" presStyleCnt="4" custScaleX="133694">
+      <dgm:prSet presAssocID="{367C84AB-F23E-4FDC-B17A-C1910B5435CA}" presName="node" presStyleLbl="node1" presStyleIdx="2" presStyleCnt="4">
         <dgm:presLayoutVars>
           <dgm:bulletEnabled val="1"/>
         </dgm:presLayoutVars>
@@ -1958,7 +1960,7 @@
       </dgm:t>
     </dgm:pt>
     <dgm:pt modelId="{5A35CF05-8EA4-415C-9F34-B2DBE5E0CD3D}" type="pres">
-      <dgm:prSet presAssocID="{4C78C2C7-5AEF-49EB-85FC-849C9D0129DE}" presName="node" presStyleLbl="node1" presStyleIdx="3" presStyleCnt="4" custScaleX="158532">
+      <dgm:prSet presAssocID="{4C78C2C7-5AEF-49EB-85FC-849C9D0129DE}" presName="node" presStyleLbl="node1" presStyleIdx="3" presStyleCnt="4">
         <dgm:presLayoutVars>
           <dgm:bulletEnabled val="1"/>
         </dgm:presLayoutVars>
@@ -1974,31 +1976,31 @@
     </dgm:pt>
   </dgm:ptLst>
   <dgm:cxnLst>
-    <dgm:cxn modelId="{322FF33A-2BFC-40CB-B318-19A15FEB6546}" type="presOf" srcId="{2398B78F-1855-40FC-B242-5B73FBE442A8}" destId="{A49DCEA3-C7F8-4105-A0D2-F70D26BF7FDB}" srcOrd="0" destOrd="0" presId="urn:microsoft.com/office/officeart/2005/8/layout/process1"/>
     <dgm:cxn modelId="{F2B12970-2C84-4F60-BF0B-33F248008F75}" srcId="{F37B5313-5EDD-4019-B0B2-B457BE6F4146}" destId="{0F1CB210-C3B0-41D2-B132-68822290F20B}" srcOrd="0" destOrd="0" parTransId="{3EAD2E25-A840-4CCD-A9F7-CDC185B511FB}" sibTransId="{52078FF1-CFCF-4FCE-8063-65D9317AF517}"/>
-    <dgm:cxn modelId="{CE6696D5-1525-48AB-88F9-C56CAEADEC2A}" type="presOf" srcId="{4C78C2C7-5AEF-49EB-85FC-849C9D0129DE}" destId="{5A35CF05-8EA4-415C-9F34-B2DBE5E0CD3D}" srcOrd="0" destOrd="0" presId="urn:microsoft.com/office/officeart/2005/8/layout/process1"/>
-    <dgm:cxn modelId="{1EE06D5F-278F-4129-8124-D2D1591DF788}" type="presOf" srcId="{58BF5103-75B0-4E2A-B6AF-CC479AF3144F}" destId="{BD54F0FB-8B50-42C8-9067-4133612C3EF4}" srcOrd="1" destOrd="0" presId="urn:microsoft.com/office/officeart/2005/8/layout/process1"/>
-    <dgm:cxn modelId="{E445E301-DEEF-4CF5-ACCF-69426D8675AD}" type="presOf" srcId="{52078FF1-CFCF-4FCE-8063-65D9317AF517}" destId="{58D2F887-77EE-4190-8780-660498D18F88}" srcOrd="1" destOrd="0" presId="urn:microsoft.com/office/officeart/2005/8/layout/process1"/>
+    <dgm:cxn modelId="{91175FE9-E594-4B0C-9CAD-B4A3F680FE14}" type="presOf" srcId="{367C84AB-F23E-4FDC-B17A-C1910B5435CA}" destId="{DC39BE9A-5000-41DF-9715-6CDE0925001D}" srcOrd="0" destOrd="0" presId="urn:microsoft.com/office/officeart/2005/8/layout/process1"/>
+    <dgm:cxn modelId="{4CE9EAC6-A16D-4CC0-A50C-4643321549A4}" type="presOf" srcId="{2A4F9878-FC56-4024-8EA0-A7CDD5646BF8}" destId="{39FA849E-717D-43F5-ACE9-9639D81A8645}" srcOrd="0" destOrd="0" presId="urn:microsoft.com/office/officeart/2005/8/layout/process1"/>
     <dgm:cxn modelId="{DED076FE-8BCC-497F-A666-A37F64500EC6}" srcId="{F37B5313-5EDD-4019-B0B2-B457BE6F4146}" destId="{2A4F9878-FC56-4024-8EA0-A7CDD5646BF8}" srcOrd="1" destOrd="0" parTransId="{B92E2F66-9BD5-4EF7-8CB2-86426FB4117A}" sibTransId="{58BF5103-75B0-4E2A-B6AF-CC479AF3144F}"/>
-    <dgm:cxn modelId="{F67D034D-4135-4BED-916D-4D3B260978C3}" type="presOf" srcId="{52078FF1-CFCF-4FCE-8063-65D9317AF517}" destId="{11239894-F83D-4702-8D29-13D22A06A27C}" srcOrd="0" destOrd="0" presId="urn:microsoft.com/office/officeart/2005/8/layout/process1"/>
-    <dgm:cxn modelId="{51CAEDD2-2535-405B-9724-CB6E5A7A52D9}" type="presOf" srcId="{58BF5103-75B0-4E2A-B6AF-CC479AF3144F}" destId="{FDA83150-81A7-4521-AC28-95430F6F7734}" srcOrd="0" destOrd="0" presId="urn:microsoft.com/office/officeart/2005/8/layout/process1"/>
-    <dgm:cxn modelId="{554C19EE-7BFA-4122-BE01-69211F5E1C9A}" type="presOf" srcId="{F37B5313-5EDD-4019-B0B2-B457BE6F4146}" destId="{127B2901-52E8-4CCE-965C-F8B328B17D66}" srcOrd="0" destOrd="0" presId="urn:microsoft.com/office/officeart/2005/8/layout/process1"/>
-    <dgm:cxn modelId="{2DEBBE2E-7E0D-45CA-AB6D-E8BD0D8C66E2}" type="presOf" srcId="{367C84AB-F23E-4FDC-B17A-C1910B5435CA}" destId="{DC39BE9A-5000-41DF-9715-6CDE0925001D}" srcOrd="0" destOrd="0" presId="urn:microsoft.com/office/officeart/2005/8/layout/process1"/>
+    <dgm:cxn modelId="{5CD3DA04-9B0D-43FF-8D45-2B0A36E04BA8}" type="presOf" srcId="{2398B78F-1855-40FC-B242-5B73FBE442A8}" destId="{A49DCEA3-C7F8-4105-A0D2-F70D26BF7FDB}" srcOrd="0" destOrd="0" presId="urn:microsoft.com/office/officeart/2005/8/layout/process1"/>
+    <dgm:cxn modelId="{5D27EA2F-FF9B-4C25-B5EF-D6963A67C72B}" type="presOf" srcId="{58BF5103-75B0-4E2A-B6AF-CC479AF3144F}" destId="{FDA83150-81A7-4521-AC28-95430F6F7734}" srcOrd="0" destOrd="0" presId="urn:microsoft.com/office/officeart/2005/8/layout/process1"/>
+    <dgm:cxn modelId="{1F78DF42-0A34-47AC-9764-B5D4CD207B4D}" type="presOf" srcId="{52078FF1-CFCF-4FCE-8063-65D9317AF517}" destId="{11239894-F83D-4702-8D29-13D22A06A27C}" srcOrd="0" destOrd="0" presId="urn:microsoft.com/office/officeart/2005/8/layout/process1"/>
+    <dgm:cxn modelId="{8169BCF1-5A52-4266-9422-869158FCD471}" type="presOf" srcId="{F37B5313-5EDD-4019-B0B2-B457BE6F4146}" destId="{127B2901-52E8-4CCE-965C-F8B328B17D66}" srcOrd="0" destOrd="0" presId="urn:microsoft.com/office/officeart/2005/8/layout/process1"/>
     <dgm:cxn modelId="{F634DE2A-67CF-4B66-8C50-1F585F4DD80E}" srcId="{F37B5313-5EDD-4019-B0B2-B457BE6F4146}" destId="{4C78C2C7-5AEF-49EB-85FC-849C9D0129DE}" srcOrd="3" destOrd="0" parTransId="{9478B6A5-CD81-42BD-BCDA-6D5B734B0D7B}" sibTransId="{0C972B14-E274-48B3-BF9A-491355051192}"/>
-    <dgm:cxn modelId="{0B8E0E38-50CF-4FFD-BE3B-8FC357A9EC7B}" type="presOf" srcId="{2A4F9878-FC56-4024-8EA0-A7CDD5646BF8}" destId="{39FA849E-717D-43F5-ACE9-9639D81A8645}" srcOrd="0" destOrd="0" presId="urn:microsoft.com/office/officeart/2005/8/layout/process1"/>
-    <dgm:cxn modelId="{923CA6DD-EA70-48E8-AB8F-7371366AE165}" type="presOf" srcId="{2398B78F-1855-40FC-B242-5B73FBE442A8}" destId="{44130665-29AD-456E-9999-7BB3512CC5BA}" srcOrd="1" destOrd="0" presId="urn:microsoft.com/office/officeart/2005/8/layout/process1"/>
-    <dgm:cxn modelId="{718A03B3-D369-4786-93FB-D8D72D11FBBA}" type="presOf" srcId="{0F1CB210-C3B0-41D2-B132-68822290F20B}" destId="{1BF4AC25-65F3-4933-8A88-D3D7742E370A}" srcOrd="0" destOrd="0" presId="urn:microsoft.com/office/officeart/2005/8/layout/process1"/>
+    <dgm:cxn modelId="{C05FE206-0F8D-42BB-B867-5ACF796B8854}" type="presOf" srcId="{58BF5103-75B0-4E2A-B6AF-CC479AF3144F}" destId="{BD54F0FB-8B50-42C8-9067-4133612C3EF4}" srcOrd="1" destOrd="0" presId="urn:microsoft.com/office/officeart/2005/8/layout/process1"/>
+    <dgm:cxn modelId="{AB297D45-13A2-4879-8D5F-88FF1F4F59D9}" type="presOf" srcId="{0F1CB210-C3B0-41D2-B132-68822290F20B}" destId="{1BF4AC25-65F3-4933-8A88-D3D7742E370A}" srcOrd="0" destOrd="0" presId="urn:microsoft.com/office/officeart/2005/8/layout/process1"/>
+    <dgm:cxn modelId="{F5C419BA-A539-418F-AF7D-BED8BFA4F459}" type="presOf" srcId="{52078FF1-CFCF-4FCE-8063-65D9317AF517}" destId="{58D2F887-77EE-4190-8780-660498D18F88}" srcOrd="1" destOrd="0" presId="urn:microsoft.com/office/officeart/2005/8/layout/process1"/>
     <dgm:cxn modelId="{B64D59CD-61D5-4881-B700-74927010CEA6}" srcId="{F37B5313-5EDD-4019-B0B2-B457BE6F4146}" destId="{367C84AB-F23E-4FDC-B17A-C1910B5435CA}" srcOrd="2" destOrd="0" parTransId="{807C904C-E4CD-44D5-BC22-73BA741154AC}" sibTransId="{2398B78F-1855-40FC-B242-5B73FBE442A8}"/>
-    <dgm:cxn modelId="{FADCD27A-50A5-4839-A3AF-E2A67D4E0380}" type="presParOf" srcId="{127B2901-52E8-4CCE-965C-F8B328B17D66}" destId="{1BF4AC25-65F3-4933-8A88-D3D7742E370A}" srcOrd="0" destOrd="0" presId="urn:microsoft.com/office/officeart/2005/8/layout/process1"/>
-    <dgm:cxn modelId="{90887BAB-65AF-4161-815A-D1A4661E4A84}" type="presParOf" srcId="{127B2901-52E8-4CCE-965C-F8B328B17D66}" destId="{11239894-F83D-4702-8D29-13D22A06A27C}" srcOrd="1" destOrd="0" presId="urn:microsoft.com/office/officeart/2005/8/layout/process1"/>
-    <dgm:cxn modelId="{C5C72F95-6E86-4A3B-A13E-F3D8904828C8}" type="presParOf" srcId="{11239894-F83D-4702-8D29-13D22A06A27C}" destId="{58D2F887-77EE-4190-8780-660498D18F88}" srcOrd="0" destOrd="0" presId="urn:microsoft.com/office/officeart/2005/8/layout/process1"/>
-    <dgm:cxn modelId="{6003480F-AEEA-438D-BACD-41A4A32B23F5}" type="presParOf" srcId="{127B2901-52E8-4CCE-965C-F8B328B17D66}" destId="{39FA849E-717D-43F5-ACE9-9639D81A8645}" srcOrd="2" destOrd="0" presId="urn:microsoft.com/office/officeart/2005/8/layout/process1"/>
-    <dgm:cxn modelId="{26D70EA4-8773-4087-AFA0-5E97D69BF23B}" type="presParOf" srcId="{127B2901-52E8-4CCE-965C-F8B328B17D66}" destId="{FDA83150-81A7-4521-AC28-95430F6F7734}" srcOrd="3" destOrd="0" presId="urn:microsoft.com/office/officeart/2005/8/layout/process1"/>
-    <dgm:cxn modelId="{18AE70DB-2F5E-4341-B313-98C0BD283E5B}" type="presParOf" srcId="{FDA83150-81A7-4521-AC28-95430F6F7734}" destId="{BD54F0FB-8B50-42C8-9067-4133612C3EF4}" srcOrd="0" destOrd="0" presId="urn:microsoft.com/office/officeart/2005/8/layout/process1"/>
-    <dgm:cxn modelId="{443CF2CD-4E96-4C91-99E1-4EB4FE0F2A00}" type="presParOf" srcId="{127B2901-52E8-4CCE-965C-F8B328B17D66}" destId="{DC39BE9A-5000-41DF-9715-6CDE0925001D}" srcOrd="4" destOrd="0" presId="urn:microsoft.com/office/officeart/2005/8/layout/process1"/>
-    <dgm:cxn modelId="{502723CE-E3C1-4776-83EE-C07333C9C449}" type="presParOf" srcId="{127B2901-52E8-4CCE-965C-F8B328B17D66}" destId="{A49DCEA3-C7F8-4105-A0D2-F70D26BF7FDB}" srcOrd="5" destOrd="0" presId="urn:microsoft.com/office/officeart/2005/8/layout/process1"/>
-    <dgm:cxn modelId="{B53D11A4-A7F0-49C6-9A3A-031E78611A51}" type="presParOf" srcId="{A49DCEA3-C7F8-4105-A0D2-F70D26BF7FDB}" destId="{44130665-29AD-456E-9999-7BB3512CC5BA}" srcOrd="0" destOrd="0" presId="urn:microsoft.com/office/officeart/2005/8/layout/process1"/>
-    <dgm:cxn modelId="{04C3391E-ABE2-4363-A3BD-47175CFAFBC4}" type="presParOf" srcId="{127B2901-52E8-4CCE-965C-F8B328B17D66}" destId="{5A35CF05-8EA4-415C-9F34-B2DBE5E0CD3D}" srcOrd="6" destOrd="0" presId="urn:microsoft.com/office/officeart/2005/8/layout/process1"/>
+    <dgm:cxn modelId="{621F94B4-A684-4D0D-8FB1-1CA2D8ADE7D4}" type="presOf" srcId="{2398B78F-1855-40FC-B242-5B73FBE442A8}" destId="{44130665-29AD-456E-9999-7BB3512CC5BA}" srcOrd="1" destOrd="0" presId="urn:microsoft.com/office/officeart/2005/8/layout/process1"/>
+    <dgm:cxn modelId="{034264D9-4031-4684-94E1-3C29AA2DE416}" type="presOf" srcId="{4C78C2C7-5AEF-49EB-85FC-849C9D0129DE}" destId="{5A35CF05-8EA4-415C-9F34-B2DBE5E0CD3D}" srcOrd="0" destOrd="0" presId="urn:microsoft.com/office/officeart/2005/8/layout/process1"/>
+    <dgm:cxn modelId="{6F044933-CA50-4693-BE4A-3F6BA146BA73}" type="presParOf" srcId="{127B2901-52E8-4CCE-965C-F8B328B17D66}" destId="{1BF4AC25-65F3-4933-8A88-D3D7742E370A}" srcOrd="0" destOrd="0" presId="urn:microsoft.com/office/officeart/2005/8/layout/process1"/>
+    <dgm:cxn modelId="{C2C08AF4-4695-4BCB-AED4-62E6CB30D15B}" type="presParOf" srcId="{127B2901-52E8-4CCE-965C-F8B328B17D66}" destId="{11239894-F83D-4702-8D29-13D22A06A27C}" srcOrd="1" destOrd="0" presId="urn:microsoft.com/office/officeart/2005/8/layout/process1"/>
+    <dgm:cxn modelId="{24236E0B-8C92-4564-9D7E-F3FDB25AA145}" type="presParOf" srcId="{11239894-F83D-4702-8D29-13D22A06A27C}" destId="{58D2F887-77EE-4190-8780-660498D18F88}" srcOrd="0" destOrd="0" presId="urn:microsoft.com/office/officeart/2005/8/layout/process1"/>
+    <dgm:cxn modelId="{AFFB3199-9399-4E69-AAD2-D139242B2141}" type="presParOf" srcId="{127B2901-52E8-4CCE-965C-F8B328B17D66}" destId="{39FA849E-717D-43F5-ACE9-9639D81A8645}" srcOrd="2" destOrd="0" presId="urn:microsoft.com/office/officeart/2005/8/layout/process1"/>
+    <dgm:cxn modelId="{36F392B8-11AE-4B3E-80EF-2D5A749C9AB0}" type="presParOf" srcId="{127B2901-52E8-4CCE-965C-F8B328B17D66}" destId="{FDA83150-81A7-4521-AC28-95430F6F7734}" srcOrd="3" destOrd="0" presId="urn:microsoft.com/office/officeart/2005/8/layout/process1"/>
+    <dgm:cxn modelId="{BEFCE6E9-3A0B-434C-B784-5F1C8F81B4EA}" type="presParOf" srcId="{FDA83150-81A7-4521-AC28-95430F6F7734}" destId="{BD54F0FB-8B50-42C8-9067-4133612C3EF4}" srcOrd="0" destOrd="0" presId="urn:microsoft.com/office/officeart/2005/8/layout/process1"/>
+    <dgm:cxn modelId="{BEA3B4B9-2944-45BA-8505-8E221FD9DA23}" type="presParOf" srcId="{127B2901-52E8-4CCE-965C-F8B328B17D66}" destId="{DC39BE9A-5000-41DF-9715-6CDE0925001D}" srcOrd="4" destOrd="0" presId="urn:microsoft.com/office/officeart/2005/8/layout/process1"/>
+    <dgm:cxn modelId="{6086E68E-BBA6-4F83-80BF-E7CA372D5145}" type="presParOf" srcId="{127B2901-52E8-4CCE-965C-F8B328B17D66}" destId="{A49DCEA3-C7F8-4105-A0D2-F70D26BF7FDB}" srcOrd="5" destOrd="0" presId="urn:microsoft.com/office/officeart/2005/8/layout/process1"/>
+    <dgm:cxn modelId="{C7052C38-50FB-4044-B74C-F04A67FF90C8}" type="presParOf" srcId="{A49DCEA3-C7F8-4105-A0D2-F70D26BF7FDB}" destId="{44130665-29AD-456E-9999-7BB3512CC5BA}" srcOrd="0" destOrd="0" presId="urn:microsoft.com/office/officeart/2005/8/layout/process1"/>
+    <dgm:cxn modelId="{E41688A4-2CEA-4393-B1C7-9BFAEA860500}" type="presParOf" srcId="{127B2901-52E8-4CCE-965C-F8B328B17D66}" destId="{5A35CF05-8EA4-415C-9F34-B2DBE5E0CD3D}" srcOrd="6" destOrd="0" presId="urn:microsoft.com/office/officeart/2005/8/layout/process1"/>
   </dgm:cxnLst>
   <dgm:bg/>
   <dgm:whole/>
@@ -2367,8 +2369,8 @@
       </dsp:nvSpPr>
       <dsp:spPr>
         <a:xfrm>
-          <a:off x="9384" y="2725906"/>
-          <a:ext cx="1858868" cy="1116411"/>
+          <a:off x="5257" y="2594460"/>
+          <a:ext cx="2298837" cy="1379302"/>
         </a:xfrm>
         <a:prstGeom prst="roundRect">
           <a:avLst>
@@ -2411,12 +2413,12 @@
         </a:fontRef>
       </dsp:style>
       <dsp:txBody>
-        <a:bodyPr spcFirstLastPara="0" vert="horz" wrap="square" lIns="91440" tIns="91440" rIns="91440" bIns="91440" numCol="1" spcCol="1270" anchor="ctr" anchorCtr="0">
+        <a:bodyPr spcFirstLastPara="0" vert="horz" wrap="square" lIns="76200" tIns="76200" rIns="76200" bIns="76200" numCol="1" spcCol="1270" anchor="ctr" anchorCtr="0">
           <a:noAutofit/>
         </a:bodyPr>
         <a:lstStyle/>
         <a:p>
-          <a:pPr lvl="0" algn="ctr" defTabSz="1066800">
+          <a:pPr lvl="0" algn="ctr" defTabSz="889000">
             <a:lnSpc>
               <a:spcPct val="90000"/>
             </a:lnSpc>
@@ -2428,15 +2430,15 @@
             </a:spcAft>
           </a:pPr>
           <a:r>
-            <a:rPr lang="es-CR" sz="2400" kern="1200" dirty="0" smtClean="0"/>
+            <a:rPr lang="es-CR" sz="2000" kern="1200" dirty="0" smtClean="0"/>
             <a:t>Ejemplos Clave</a:t>
           </a:r>
-          <a:endParaRPr lang="en-US" sz="2400" kern="1200" dirty="0"/>
+          <a:endParaRPr lang="en-US" sz="2000" kern="1200" dirty="0"/>
         </a:p>
       </dsp:txBody>
       <dsp:txXfrm>
-        <a:off x="42083" y="2758605"/>
-        <a:ext cx="1793470" cy="1051013"/>
+        <a:off x="45655" y="2634858"/>
+        <a:ext cx="2218041" cy="1298506"/>
       </dsp:txXfrm>
     </dsp:sp>
     <dsp:sp modelId="{11239894-F83D-4702-8D29-13D22A06A27C}">
@@ -2446,8 +2448,8 @@
       </dsp:nvSpPr>
       <dsp:spPr>
         <a:xfrm>
-          <a:off x="2054140" y="3053612"/>
-          <a:ext cx="394080" cy="460999"/>
+          <a:off x="2533979" y="2999056"/>
+          <a:ext cx="487353" cy="570111"/>
         </a:xfrm>
         <a:prstGeom prst="rightArrow">
           <a:avLst>
@@ -2489,7 +2491,7 @@
         </a:bodyPr>
         <a:lstStyle/>
         <a:p>
-          <a:pPr lvl="0" algn="ctr" defTabSz="844550">
+          <a:pPr lvl="0" algn="ctr" defTabSz="711200">
             <a:lnSpc>
               <a:spcPct val="90000"/>
             </a:lnSpc>
@@ -2500,12 +2502,12 @@
               <a:spcPct val="35000"/>
             </a:spcAft>
           </a:pPr>
-          <a:endParaRPr lang="en-US" sz="1900" kern="1200"/>
+          <a:endParaRPr lang="en-US" sz="1600" kern="1200"/>
         </a:p>
       </dsp:txBody>
       <dsp:txXfrm>
-        <a:off x="2054140" y="3145812"/>
-        <a:ext cx="275856" cy="276599"/>
+        <a:off x="2533979" y="3113078"/>
+        <a:ext cx="341147" cy="342067"/>
       </dsp:txXfrm>
     </dsp:sp>
     <dsp:sp modelId="{39FA849E-717D-43F5-ACE9-9639D81A8645}">
@@ -2515,8 +2517,8 @@
       </dsp:nvSpPr>
       <dsp:spPr>
         <a:xfrm>
-          <a:off x="2611800" y="2725906"/>
-          <a:ext cx="2424095" cy="1116411"/>
+          <a:off x="3223630" y="2594460"/>
+          <a:ext cx="2298837" cy="1379302"/>
         </a:xfrm>
         <a:prstGeom prst="roundRect">
           <a:avLst>
@@ -2559,12 +2561,12 @@
         </a:fontRef>
       </dsp:style>
       <dsp:txBody>
-        <a:bodyPr spcFirstLastPara="0" vert="horz" wrap="square" lIns="91440" tIns="91440" rIns="91440" bIns="91440" numCol="1" spcCol="1270" anchor="ctr" anchorCtr="0">
+        <a:bodyPr spcFirstLastPara="0" vert="horz" wrap="square" lIns="76200" tIns="76200" rIns="76200" bIns="76200" numCol="1" spcCol="1270" anchor="ctr" anchorCtr="0">
           <a:noAutofit/>
         </a:bodyPr>
         <a:lstStyle/>
         <a:p>
-          <a:pPr lvl="0" algn="ctr" defTabSz="1066800">
+          <a:pPr lvl="0" algn="ctr" defTabSz="889000">
             <a:lnSpc>
               <a:spcPct val="90000"/>
             </a:lnSpc>
@@ -2576,15 +2578,15 @@
             </a:spcAft>
           </a:pPr>
           <a:r>
-            <a:rPr lang="es-CR" sz="2400" kern="1200" dirty="0" smtClean="0"/>
+            <a:rPr lang="es-CR" sz="2000" kern="1200" dirty="0" smtClean="0"/>
             <a:t>Especificación con Ejemplos</a:t>
           </a:r>
-          <a:endParaRPr lang="en-US" sz="2400" kern="1200" dirty="0"/>
+          <a:endParaRPr lang="en-US" sz="2000" kern="1200" dirty="0"/>
         </a:p>
       </dsp:txBody>
       <dsp:txXfrm>
-        <a:off x="2644499" y="2758605"/>
-        <a:ext cx="2358697" cy="1051013"/>
+        <a:off x="3264028" y="2634858"/>
+        <a:ext cx="2218041" cy="1298506"/>
       </dsp:txXfrm>
     </dsp:sp>
     <dsp:sp modelId="{FDA83150-81A7-4521-AC28-95430F6F7734}">
@@ -2594,8 +2596,8 @@
       </dsp:nvSpPr>
       <dsp:spPr>
         <a:xfrm>
-          <a:off x="5221782" y="3053612"/>
-          <a:ext cx="394080" cy="460999"/>
+          <a:off x="5752352" y="2999056"/>
+          <a:ext cx="487353" cy="570111"/>
         </a:xfrm>
         <a:prstGeom prst="rightArrow">
           <a:avLst>
@@ -2637,7 +2639,7 @@
         </a:bodyPr>
         <a:lstStyle/>
         <a:p>
-          <a:pPr lvl="0" algn="ctr" defTabSz="844550">
+          <a:pPr lvl="0" algn="ctr" defTabSz="711200">
             <a:lnSpc>
               <a:spcPct val="90000"/>
             </a:lnSpc>
@@ -2648,12 +2650,12 @@
               <a:spcPct val="35000"/>
             </a:spcAft>
           </a:pPr>
-          <a:endParaRPr lang="en-US" sz="1900" kern="1200"/>
+          <a:endParaRPr lang="en-US" sz="1600" kern="1200"/>
         </a:p>
       </dsp:txBody>
       <dsp:txXfrm>
-        <a:off x="5221782" y="3145812"/>
-        <a:ext cx="275856" cy="276599"/>
+        <a:off x="5752352" y="3113078"/>
+        <a:ext cx="341147" cy="342067"/>
       </dsp:txXfrm>
     </dsp:sp>
     <dsp:sp modelId="{DC39BE9A-5000-41DF-9715-6CDE0925001D}">
@@ -2663,8 +2665,8 @@
       </dsp:nvSpPr>
       <dsp:spPr>
         <a:xfrm>
-          <a:off x="5779443" y="2725906"/>
-          <a:ext cx="2485196" cy="1116411"/>
+          <a:off x="6442004" y="2594460"/>
+          <a:ext cx="2298837" cy="1379302"/>
         </a:xfrm>
         <a:prstGeom prst="roundRect">
           <a:avLst>
@@ -2707,12 +2709,12 @@
         </a:fontRef>
       </dsp:style>
       <dsp:txBody>
-        <a:bodyPr spcFirstLastPara="0" vert="horz" wrap="square" lIns="91440" tIns="91440" rIns="91440" bIns="91440" numCol="1" spcCol="1270" anchor="ctr" anchorCtr="0">
+        <a:bodyPr spcFirstLastPara="0" vert="horz" wrap="square" lIns="76200" tIns="76200" rIns="76200" bIns="76200" numCol="1" spcCol="1270" anchor="ctr" anchorCtr="0">
           <a:noAutofit/>
         </a:bodyPr>
         <a:lstStyle/>
         <a:p>
-          <a:pPr lvl="0" algn="ctr" defTabSz="1066800">
+          <a:pPr lvl="0" algn="ctr" defTabSz="889000">
             <a:lnSpc>
               <a:spcPct val="90000"/>
             </a:lnSpc>
@@ -2724,15 +2726,15 @@
             </a:spcAft>
           </a:pPr>
           <a:r>
-            <a:rPr lang="es-CR" sz="2400" kern="1200" dirty="0" smtClean="0"/>
+            <a:rPr lang="es-CR" sz="2000" kern="1200" dirty="0" smtClean="0"/>
             <a:t>Especificación Ejecutable</a:t>
           </a:r>
-          <a:endParaRPr lang="en-US" sz="2400" kern="1200" dirty="0"/>
+          <a:endParaRPr lang="en-US" sz="2000" kern="1200" dirty="0"/>
         </a:p>
       </dsp:txBody>
       <dsp:txXfrm>
-        <a:off x="5812142" y="2758605"/>
-        <a:ext cx="2419798" cy="1051013"/>
+        <a:off x="6482402" y="2634858"/>
+        <a:ext cx="2218041" cy="1298506"/>
       </dsp:txXfrm>
     </dsp:sp>
     <dsp:sp modelId="{A49DCEA3-C7F8-4105-A0D2-F70D26BF7FDB}">
@@ -2742,8 +2744,8 @@
       </dsp:nvSpPr>
       <dsp:spPr>
         <a:xfrm>
-          <a:off x="8450526" y="3053612"/>
-          <a:ext cx="394080" cy="460999"/>
+          <a:off x="8970725" y="2999056"/>
+          <a:ext cx="487353" cy="570111"/>
         </a:xfrm>
         <a:prstGeom prst="rightArrow">
           <a:avLst>
@@ -2785,7 +2787,7 @@
         </a:bodyPr>
         <a:lstStyle/>
         <a:p>
-          <a:pPr lvl="0" algn="ctr" defTabSz="844550">
+          <a:pPr lvl="0" algn="ctr" defTabSz="711200">
             <a:lnSpc>
               <a:spcPct val="90000"/>
             </a:lnSpc>
@@ -2796,12 +2798,12 @@
               <a:spcPct val="35000"/>
             </a:spcAft>
           </a:pPr>
-          <a:endParaRPr lang="en-US" sz="1900" kern="1200"/>
+          <a:endParaRPr lang="en-US" sz="1600" kern="1200"/>
         </a:p>
       </dsp:txBody>
       <dsp:txXfrm>
-        <a:off x="8450526" y="3145812"/>
-        <a:ext cx="275856" cy="276599"/>
+        <a:off x="8970725" y="3113078"/>
+        <a:ext cx="341147" cy="342067"/>
       </dsp:txXfrm>
     </dsp:sp>
     <dsp:sp modelId="{5A35CF05-8EA4-415C-9F34-B2DBE5E0CD3D}">
@@ -2811,8 +2813,8 @@
       </dsp:nvSpPr>
       <dsp:spPr>
         <a:xfrm>
-          <a:off x="9008186" y="2725906"/>
-          <a:ext cx="2946901" cy="1116411"/>
+          <a:off x="9660377" y="2594460"/>
+          <a:ext cx="2298837" cy="1379302"/>
         </a:xfrm>
         <a:prstGeom prst="roundRect">
           <a:avLst>
@@ -2855,12 +2857,12 @@
         </a:fontRef>
       </dsp:style>
       <dsp:txBody>
-        <a:bodyPr spcFirstLastPara="0" vert="horz" wrap="square" lIns="91440" tIns="91440" rIns="91440" bIns="91440" numCol="1" spcCol="1270" anchor="ctr" anchorCtr="0">
+        <a:bodyPr spcFirstLastPara="0" vert="horz" wrap="square" lIns="76200" tIns="76200" rIns="76200" bIns="76200" numCol="1" spcCol="1270" anchor="ctr" anchorCtr="0">
           <a:noAutofit/>
         </a:bodyPr>
         <a:lstStyle/>
         <a:p>
-          <a:pPr lvl="0" algn="ctr" defTabSz="1066800">
+          <a:pPr lvl="0" algn="ctr" defTabSz="889000">
             <a:lnSpc>
               <a:spcPct val="90000"/>
             </a:lnSpc>
@@ -2872,15 +2874,15 @@
             </a:spcAft>
           </a:pPr>
           <a:r>
-            <a:rPr lang="es-CR" sz="2400" kern="1200" dirty="0" smtClean="0"/>
+            <a:rPr lang="es-CR" sz="2000" kern="1200" dirty="0" smtClean="0"/>
             <a:t>Documentación Viva</a:t>
           </a:r>
-          <a:endParaRPr lang="en-US" sz="2400" kern="1200" dirty="0"/>
+          <a:endParaRPr lang="en-US" sz="2000" kern="1200" dirty="0"/>
         </a:p>
       </dsp:txBody>
       <dsp:txXfrm>
-        <a:off x="9040885" y="2758605"/>
-        <a:ext cx="2881503" cy="1051013"/>
+        <a:off x="9700775" y="2634858"/>
+        <a:ext cx="2218041" cy="1298506"/>
       </dsp:txXfrm>
     </dsp:sp>
   </dsp:spTree>
@@ -5864,7 +5866,7 @@
           <a:p>
             <a:fld id="{41D56F23-EA9F-4617-B1DA-011EFD0CC45B}" type="datetimeFigureOut">
               <a:rPr lang="en-US" smtClean="0"/>
-              <a:t>5/30/2015</a:t>
+              <a:t>6/2/2015</a:t>
             </a:fld>
             <a:endParaRPr lang="en-US"/>
           </a:p>
@@ -6494,6 +6496,98 @@
           <a:bodyPr/>
           <a:lstStyle/>
           <a:p>
+            <a:r>
+              <a:rPr lang="es-CR" dirty="0" smtClean="0"/>
+              <a:t>Aquí agregamos un nuevo ejemplo, y validamos si la regla se programó con este requerimiento en mente, o no.</a:t>
+            </a:r>
+          </a:p>
+          <a:p>
+            <a:r>
+              <a:rPr lang="es-CR" dirty="0" smtClean="0"/>
+              <a:t>Al ver que la regla no está implementada, la prueba está en rojo y podemos modificar el código para satisfacerla. No se debe reprobar todo el sistema, pues ya sabemos que el cambio fue muy localizado.</a:t>
+            </a:r>
+          </a:p>
+          <a:p>
+            <a:endParaRPr lang="es-CR" dirty="0" smtClean="0"/>
+          </a:p>
+          <a:p>
+            <a:r>
+              <a:rPr lang="es-CR" sz="1200" kern="1200" dirty="0" smtClean="0">
+                <a:solidFill>
+                  <a:schemeClr val="tx1"/>
+                </a:solidFill>
+                <a:latin typeface="+mn-lt"/>
+                <a:ea typeface="+mn-ea"/>
+                <a:cs typeface="+mn-cs"/>
+              </a:rPr>
+              <a:t>| clientes </a:t>
+            </a:r>
+            <a:r>
+              <a:rPr lang="es-CR" sz="1200" kern="1200" dirty="0" err="1" smtClean="0">
+                <a:solidFill>
+                  <a:schemeClr val="tx1"/>
+                </a:solidFill>
+                <a:latin typeface="+mn-lt"/>
+                <a:ea typeface="+mn-ea"/>
+                <a:cs typeface="+mn-cs"/>
+              </a:rPr>
+              <a:t>premium</a:t>
+            </a:r>
+            <a:r>
+              <a:rPr lang="es-CR" sz="1200" kern="1200" dirty="0" smtClean="0">
+                <a:solidFill>
+                  <a:schemeClr val="tx1"/>
+                </a:solidFill>
+                <a:latin typeface="+mn-lt"/>
+                <a:ea typeface="+mn-ea"/>
+                <a:cs typeface="+mn-cs"/>
+              </a:rPr>
+              <a:t> </a:t>
+            </a:r>
+            <a:r>
+              <a:rPr lang="es-CR" sz="1200" kern="1200" smtClean="0">
+                <a:solidFill>
+                  <a:schemeClr val="tx1"/>
+                </a:solidFill>
+                <a:latin typeface="+mn-lt"/>
+                <a:ea typeface="+mn-ea"/>
+                <a:cs typeface="+mn-cs"/>
+              </a:rPr>
+              <a:t>tienen mínimo                       </a:t>
+            </a:r>
+            <a:r>
+              <a:rPr lang="es-CR" sz="1200" kern="1200" dirty="0" smtClean="0">
+                <a:solidFill>
+                  <a:schemeClr val="tx1"/>
+                </a:solidFill>
+                <a:latin typeface="+mn-lt"/>
+                <a:ea typeface="+mn-ea"/>
+                <a:cs typeface="+mn-cs"/>
+              </a:rPr>
+              <a:t>| </a:t>
+            </a:r>
+            <a:r>
+              <a:rPr lang="es-CR" sz="1200" kern="1200" dirty="0" err="1" smtClean="0">
+                <a:solidFill>
+                  <a:schemeClr val="tx1"/>
+                </a:solidFill>
+                <a:latin typeface="+mn-lt"/>
+                <a:ea typeface="+mn-ea"/>
+                <a:cs typeface="+mn-cs"/>
+              </a:rPr>
+              <a:t>premium</a:t>
+            </a:r>
+            <a:r>
+              <a:rPr lang="es-CR" sz="1200" kern="1200" dirty="0" smtClean="0">
+                <a:solidFill>
+                  <a:schemeClr val="tx1"/>
+                </a:solidFill>
+                <a:latin typeface="+mn-lt"/>
+                <a:ea typeface="+mn-ea"/>
+                <a:cs typeface="+mn-cs"/>
+              </a:rPr>
+              <a:t>   | 5        | libros    | $25         | Sí                                |</a:t>
+            </a:r>
             <a:endParaRPr lang="es-CR" dirty="0"/>
           </a:p>
         </p:txBody>
@@ -6515,7 +6609,189 @@
           <a:p>
             <a:fld id="{9980F735-AEAE-4F3B-8BAF-43B018904B5F}" type="slidenum">
               <a:rPr lang="en-US" smtClean="0"/>
-              <a:t>20</a:t>
+              <a:t>17</a:t>
+            </a:fld>
+            <a:endParaRPr lang="en-US"/>
+          </a:p>
+        </p:txBody>
+      </p:sp>
+    </p:spTree>
+    <p:extLst>
+      <p:ext uri="{BB962C8B-B14F-4D97-AF65-F5344CB8AC3E}">
+        <p14:creationId xmlns:p14="http://schemas.microsoft.com/office/powerpoint/2010/main" val="1065361342"/>
+      </p:ext>
+    </p:extLst>
+  </p:cSld>
+  <p:clrMapOvr>
+    <a:masterClrMapping/>
+  </p:clrMapOvr>
+</p:notes>
+</file>
+
+<file path=ppt/notesSlides/notesSlide5.xml><?xml version="1.0" encoding="utf-8"?>
+<p:notes xmlns:a="http://schemas.openxmlformats.org/drawingml/2006/main" xmlns:r="http://schemas.openxmlformats.org/officeDocument/2006/relationships" xmlns:p="http://schemas.openxmlformats.org/presentationml/2006/main">
+  <p:cSld>
+    <p:spTree>
+      <p:nvGrpSpPr>
+        <p:cNvPr id="1" name=""/>
+        <p:cNvGrpSpPr/>
+        <p:nvPr/>
+      </p:nvGrpSpPr>
+      <p:grpSpPr>
+        <a:xfrm>
+          <a:off x="0" y="0"/>
+          <a:ext cx="0" cy="0"/>
+          <a:chOff x="0" y="0"/>
+          <a:chExt cx="0" cy="0"/>
+        </a:xfrm>
+      </p:grpSpPr>
+      <p:sp>
+        <p:nvSpPr>
+          <p:cNvPr id="2" name="Slide Image Placeholder 1"/>
+          <p:cNvSpPr>
+            <a:spLocks noGrp="1" noRot="1" noChangeAspect="1"/>
+          </p:cNvSpPr>
+          <p:nvPr>
+            <p:ph type="sldImg"/>
+          </p:nvPr>
+        </p:nvSpPr>
+        <p:spPr/>
+      </p:sp>
+      <p:sp>
+        <p:nvSpPr>
+          <p:cNvPr id="3" name="Notes Placeholder 2"/>
+          <p:cNvSpPr>
+            <a:spLocks noGrp="1"/>
+          </p:cNvSpPr>
+          <p:nvPr>
+            <p:ph type="body" idx="1"/>
+          </p:nvPr>
+        </p:nvSpPr>
+        <p:spPr/>
+        <p:txBody>
+          <a:bodyPr/>
+          <a:lstStyle/>
+          <a:p>
+            <a:r>
+              <a:rPr lang="es-CR" dirty="0" smtClean="0"/>
+              <a:t>Aquí se puede eliminar la columna</a:t>
+            </a:r>
+            <a:r>
+              <a:rPr lang="es-CR" baseline="0" dirty="0" smtClean="0"/>
+              <a:t> de cantidad y por ende se puede eliminar del código fuente.</a:t>
+            </a:r>
+          </a:p>
+          <a:p>
+            <a:r>
+              <a:rPr lang="es-CR" baseline="0" dirty="0" smtClean="0"/>
+              <a:t>Ejecutamos todos los escenarios y pruebas unitarias para verificar de que todo se mantiene consistente.</a:t>
+            </a:r>
+            <a:endParaRPr lang="es-CR" dirty="0"/>
+          </a:p>
+        </p:txBody>
+      </p:sp>
+      <p:sp>
+        <p:nvSpPr>
+          <p:cNvPr id="4" name="Slide Number Placeholder 3"/>
+          <p:cNvSpPr>
+            <a:spLocks noGrp="1"/>
+          </p:cNvSpPr>
+          <p:nvPr>
+            <p:ph type="sldNum" sz="quarter" idx="10"/>
+          </p:nvPr>
+        </p:nvSpPr>
+        <p:spPr/>
+        <p:txBody>
+          <a:bodyPr/>
+          <a:lstStyle/>
+          <a:p>
+            <a:fld id="{9980F735-AEAE-4F3B-8BAF-43B018904B5F}" type="slidenum">
+              <a:rPr lang="en-US" smtClean="0"/>
+              <a:t>18</a:t>
+            </a:fld>
+            <a:endParaRPr lang="en-US"/>
+          </a:p>
+        </p:txBody>
+      </p:sp>
+    </p:spTree>
+    <p:extLst>
+      <p:ext uri="{BB962C8B-B14F-4D97-AF65-F5344CB8AC3E}">
+        <p14:creationId xmlns:p14="http://schemas.microsoft.com/office/powerpoint/2010/main" val="1636101692"/>
+      </p:ext>
+    </p:extLst>
+  </p:cSld>
+  <p:clrMapOvr>
+    <a:masterClrMapping/>
+  </p:clrMapOvr>
+</p:notes>
+</file>
+
+<file path=ppt/notesSlides/notesSlide6.xml><?xml version="1.0" encoding="utf-8"?>
+<p:notes xmlns:a="http://schemas.openxmlformats.org/drawingml/2006/main" xmlns:r="http://schemas.openxmlformats.org/officeDocument/2006/relationships" xmlns:p="http://schemas.openxmlformats.org/presentationml/2006/main">
+  <p:cSld>
+    <p:spTree>
+      <p:nvGrpSpPr>
+        <p:cNvPr id="1" name=""/>
+        <p:cNvGrpSpPr/>
+        <p:nvPr/>
+      </p:nvGrpSpPr>
+      <p:grpSpPr>
+        <a:xfrm>
+          <a:off x="0" y="0"/>
+          <a:ext cx="0" cy="0"/>
+          <a:chOff x="0" y="0"/>
+          <a:chExt cx="0" cy="0"/>
+        </a:xfrm>
+      </p:grpSpPr>
+      <p:sp>
+        <p:nvSpPr>
+          <p:cNvPr id="2" name="Slide Image Placeholder 1"/>
+          <p:cNvSpPr>
+            <a:spLocks noGrp="1" noRot="1" noChangeAspect="1"/>
+          </p:cNvSpPr>
+          <p:nvPr>
+            <p:ph type="sldImg"/>
+          </p:nvPr>
+        </p:nvSpPr>
+        <p:spPr/>
+      </p:sp>
+      <p:sp>
+        <p:nvSpPr>
+          <p:cNvPr id="3" name="Notes Placeholder 2"/>
+          <p:cNvSpPr>
+            <a:spLocks noGrp="1"/>
+          </p:cNvSpPr>
+          <p:nvPr>
+            <p:ph type="body" idx="1"/>
+          </p:nvPr>
+        </p:nvSpPr>
+        <p:spPr/>
+        <p:txBody>
+          <a:bodyPr/>
+          <a:lstStyle/>
+          <a:p>
+            <a:endParaRPr lang="es-CR" dirty="0"/>
+          </a:p>
+        </p:txBody>
+      </p:sp>
+      <p:sp>
+        <p:nvSpPr>
+          <p:cNvPr id="4" name="Slide Number Placeholder 3"/>
+          <p:cNvSpPr>
+            <a:spLocks noGrp="1"/>
+          </p:cNvSpPr>
+          <p:nvPr>
+            <p:ph type="sldNum" sz="quarter" idx="10"/>
+          </p:nvPr>
+        </p:nvSpPr>
+        <p:spPr/>
+        <p:txBody>
+          <a:bodyPr/>
+          <a:lstStyle/>
+          <a:p>
+            <a:fld id="{9980F735-AEAE-4F3B-8BAF-43B018904B5F}" type="slidenum">
+              <a:rPr lang="en-US" smtClean="0"/>
+              <a:t>21</a:t>
             </a:fld>
             <a:endParaRPr lang="en-US"/>
           </a:p>
@@ -6869,7 +7145,7 @@
           <a:p>
             <a:fld id="{4AAD347D-5ACD-4C99-B74B-A9C85AD731AF}" type="datetimeFigureOut">
               <a:rPr lang="en-US" smtClean="0"/>
-              <a:t>5/30/2015</a:t>
+              <a:t>6/2/2015</a:t>
             </a:fld>
             <a:endParaRPr lang="en-US" dirty="0"/>
           </a:p>
@@ -7957,7 +8233,7 @@
           <a:p>
             <a:fld id="{4AAD347D-5ACD-4C99-B74B-A9C85AD731AF}" type="datetimeFigureOut">
               <a:rPr lang="en-US" smtClean="0"/>
-              <a:t>5/30/2015</a:t>
+              <a:t>6/2/2015</a:t>
             </a:fld>
             <a:endParaRPr lang="en-US" dirty="0"/>
           </a:p>
@@ -8938,7 +9214,7 @@
           <a:p>
             <a:fld id="{4AAD347D-5ACD-4C99-B74B-A9C85AD731AF}" type="datetimeFigureOut">
               <a:rPr lang="en-US" smtClean="0"/>
-              <a:t>5/30/2015</a:t>
+              <a:t>6/2/2015</a:t>
             </a:fld>
             <a:endParaRPr lang="en-US" dirty="0"/>
           </a:p>
@@ -10073,7 +10349,7 @@
           <a:p>
             <a:fld id="{4AAD347D-5ACD-4C99-B74B-A9C85AD731AF}" type="datetimeFigureOut">
               <a:rPr lang="en-US" smtClean="0"/>
-              <a:t>5/30/2015</a:t>
+              <a:t>6/2/2015</a:t>
             </a:fld>
             <a:endParaRPr lang="en-US" dirty="0"/>
           </a:p>
@@ -11107,7 +11383,7 @@
           <a:p>
             <a:fld id="{4AAD347D-5ACD-4C99-B74B-A9C85AD731AF}" type="datetimeFigureOut">
               <a:rPr lang="en-US" smtClean="0"/>
-              <a:t>5/30/2015</a:t>
+              <a:t>6/2/2015</a:t>
             </a:fld>
             <a:endParaRPr lang="en-US" dirty="0"/>
           </a:p>
@@ -11768,7 +12044,7 @@
           <a:p>
             <a:fld id="{4AAD347D-5ACD-4C99-B74B-A9C85AD731AF}" type="datetimeFigureOut">
               <a:rPr lang="en-US" smtClean="0"/>
-              <a:t>5/30/2015</a:t>
+              <a:t>6/2/2015</a:t>
             </a:fld>
             <a:endParaRPr lang="en-US" dirty="0"/>
           </a:p>
@@ -12630,7 +12906,7 @@
           <a:p>
             <a:fld id="{4AAD347D-5ACD-4C99-B74B-A9C85AD731AF}" type="datetimeFigureOut">
               <a:rPr lang="en-US" smtClean="0"/>
-              <a:t>5/30/2015</a:t>
+              <a:t>6/2/2015</a:t>
             </a:fld>
             <a:endParaRPr lang="en-US" dirty="0"/>
           </a:p>
@@ -12821,7 +13097,7 @@
           <a:p>
             <a:fld id="{4509A250-FF31-4206-8172-F9D3106AACB1}" type="datetimeFigureOut">
               <a:rPr lang="en-US" smtClean="0"/>
-              <a:t>5/30/2015</a:t>
+              <a:t>6/2/2015</a:t>
             </a:fld>
             <a:endParaRPr lang="en-US" dirty="0"/>
           </a:p>
@@ -13793,7 +14069,7 @@
           <a:p>
             <a:fld id="{4509A250-FF31-4206-8172-F9D3106AACB1}" type="datetimeFigureOut">
               <a:rPr lang="en-US" smtClean="0"/>
-              <a:t>5/30/2015</a:t>
+              <a:t>6/2/2015</a:t>
             </a:fld>
             <a:endParaRPr lang="en-US" dirty="0"/>
           </a:p>
@@ -14004,7 +14280,7 @@
           <a:p>
             <a:fld id="{4509A250-FF31-4206-8172-F9D3106AACB1}" type="datetimeFigureOut">
               <a:rPr lang="en-US" smtClean="0"/>
-              <a:t>5/30/2015</a:t>
+              <a:t>6/2/2015</a:t>
             </a:fld>
             <a:endParaRPr lang="en-US" dirty="0"/>
           </a:p>
@@ -15038,7 +15314,7 @@
           <a:p>
             <a:fld id="{9796027F-7875-4030-9381-8BD8C4F21935}" type="datetimeFigureOut">
               <a:rPr lang="en-US" smtClean="0"/>
-              <a:t>5/30/2015</a:t>
+              <a:t>6/2/2015</a:t>
             </a:fld>
             <a:endParaRPr lang="en-US" dirty="0"/>
           </a:p>
@@ -15310,7 +15586,7 @@
           <a:p>
             <a:fld id="{9796027F-7875-4030-9381-8BD8C4F21935}" type="datetimeFigureOut">
               <a:rPr lang="en-US" smtClean="0"/>
-              <a:t>5/30/2015</a:t>
+              <a:t>6/2/2015</a:t>
             </a:fld>
             <a:endParaRPr lang="en-US" dirty="0"/>
           </a:p>
@@ -15720,7 +15996,7 @@
           <a:p>
             <a:fld id="{9796027F-7875-4030-9381-8BD8C4F21935}" type="datetimeFigureOut">
               <a:rPr lang="en-US" smtClean="0"/>
-              <a:t>5/30/2015</a:t>
+              <a:t>6/2/2015</a:t>
             </a:fld>
             <a:endParaRPr lang="en-US" dirty="0"/>
           </a:p>
@@ -15847,7 +16123,7 @@
           <a:p>
             <a:fld id="{4509A250-FF31-4206-8172-F9D3106AACB1}" type="datetimeFigureOut">
               <a:rPr lang="en-US" smtClean="0"/>
-              <a:t>5/30/2015</a:t>
+              <a:t>6/2/2015</a:t>
             </a:fld>
             <a:endParaRPr lang="en-US" dirty="0"/>
           </a:p>
@@ -15942,7 +16218,7 @@
           <a:p>
             <a:fld id="{4509A250-FF31-4206-8172-F9D3106AACB1}" type="datetimeFigureOut">
               <a:rPr lang="en-US" smtClean="0"/>
-              <a:t>5/30/2015</a:t>
+              <a:t>6/2/2015</a:t>
             </a:fld>
             <a:endParaRPr lang="en-US" dirty="0"/>
           </a:p>
@@ -17023,7 +17299,7 @@
           <a:p>
             <a:fld id="{4509A250-FF31-4206-8172-F9D3106AACB1}" type="datetimeFigureOut">
               <a:rPr lang="en-US" smtClean="0"/>
-              <a:t>5/30/2015</a:t>
+              <a:t>6/2/2015</a:t>
             </a:fld>
             <a:endParaRPr lang="en-US" dirty="0"/>
           </a:p>
@@ -18131,7 +18407,7 @@
           <a:p>
             <a:fld id="{4509A250-FF31-4206-8172-F9D3106AACB1}" type="datetimeFigureOut">
               <a:rPr lang="en-US" smtClean="0"/>
-              <a:t>5/30/2015</a:t>
+              <a:t>6/2/2015</a:t>
             </a:fld>
             <a:endParaRPr lang="en-US" dirty="0"/>
           </a:p>
@@ -19128,7 +19404,7 @@
           <a:p>
             <a:fld id="{4AAD347D-5ACD-4C99-B74B-A9C85AD731AF}" type="datetimeFigureOut">
               <a:rPr lang="en-US" smtClean="0"/>
-              <a:t>5/30/2015</a:t>
+              <a:t>6/2/2015</a:t>
             </a:fld>
             <a:endParaRPr lang="en-US" dirty="0"/>
           </a:p>
@@ -19828,11 +20104,7 @@
           <p:cNvPr id="3" name="Diagram 2"/>
           <p:cNvGraphicFramePr/>
           <p:nvPr>
-            <p:extLst>
-              <p:ext uri="{D42A27DB-BD31-4B8C-83A1-F6EECF244321}">
-                <p14:modId xmlns:p14="http://schemas.microsoft.com/office/powerpoint/2010/main" val="2500149782"/>
-              </p:ext>
-            </p:extLst>
+            <p:extLst/>
           </p:nvPr>
         </p:nvGraphicFramePr>
         <p:xfrm>
@@ -19876,8 +20148,80 @@
         </p:nvSpPr>
         <p:spPr>
           <a:xfrm>
-            <a:off x="199382" y="4327300"/>
-            <a:ext cx="2871779" cy="830997"/>
+            <a:off x="199383" y="4327300"/>
+            <a:ext cx="1962397" cy="707886"/>
+          </a:xfrm>
+          <a:prstGeom prst="rect">
+            <a:avLst/>
+          </a:prstGeom>
+          <a:noFill/>
+        </p:spPr>
+        <p:txBody>
+          <a:bodyPr wrap="none" rtlCol="0">
+            <a:spAutoFit/>
+          </a:bodyPr>
+          <a:lstStyle/>
+          <a:p>
+            <a:r>
+              <a:rPr lang="es-CR" sz="2000" dirty="0" smtClean="0"/>
+              <a:t>Especificamos</a:t>
+            </a:r>
+          </a:p>
+          <a:p>
+            <a:r>
+              <a:rPr lang="es-CR" sz="2000" dirty="0" smtClean="0"/>
+              <a:t>en equipo</a:t>
+            </a:r>
+            <a:endParaRPr lang="en-US" sz="2000" dirty="0"/>
+          </a:p>
+        </p:txBody>
+      </p:sp>
+      <p:sp>
+        <p:nvSpPr>
+          <p:cNvPr id="5" name="TextBox 4"/>
+          <p:cNvSpPr txBox="1"/>
+          <p:nvPr/>
+        </p:nvSpPr>
+        <p:spPr>
+          <a:xfrm>
+            <a:off x="3390773" y="4327301"/>
+            <a:ext cx="2026517" cy="707886"/>
+          </a:xfrm>
+          <a:prstGeom prst="rect">
+            <a:avLst/>
+          </a:prstGeom>
+          <a:noFill/>
+        </p:spPr>
+        <p:txBody>
+          <a:bodyPr wrap="none" rtlCol="0">
+            <a:spAutoFit/>
+          </a:bodyPr>
+          <a:lstStyle/>
+          <a:p>
+            <a:r>
+              <a:rPr lang="es-CR" sz="2000" dirty="0" smtClean="0"/>
+              <a:t>Refinamos la</a:t>
+            </a:r>
+          </a:p>
+          <a:p>
+            <a:r>
+              <a:rPr lang="es-CR" sz="2000" dirty="0" smtClean="0"/>
+              <a:t>especificación</a:t>
+            </a:r>
+            <a:endParaRPr lang="en-US" sz="2000" dirty="0"/>
+          </a:p>
+        </p:txBody>
+      </p:sp>
+      <p:sp>
+        <p:nvSpPr>
+          <p:cNvPr id="6" name="TextBox 5"/>
+          <p:cNvSpPr txBox="1"/>
+          <p:nvPr/>
+        </p:nvSpPr>
+        <p:spPr>
+          <a:xfrm>
+            <a:off x="6578957" y="4327300"/>
+            <a:ext cx="1843825" cy="1015663"/>
           </a:xfrm>
           <a:prstGeom prst="rect">
             <a:avLst/>
@@ -19891,29 +20235,23 @@
           <a:lstStyle/>
           <a:p>
             <a:r>
-              <a:rPr lang="es-CR" sz="2400" dirty="0" smtClean="0"/>
-              <a:t>Especificamos</a:t>
-            </a:r>
-          </a:p>
-          <a:p>
-            <a:r>
-              <a:rPr lang="es-CR" sz="2400" dirty="0" smtClean="0"/>
-              <a:t>en equipo</a:t>
-            </a:r>
-            <a:endParaRPr lang="en-US" sz="2400" dirty="0"/>
+              <a:rPr lang="es-CR" sz="2000" dirty="0" smtClean="0"/>
+              <a:t>Se automatiza sin cambiarla</a:t>
+            </a:r>
+            <a:endParaRPr lang="en-US" sz="2000" dirty="0"/>
           </a:p>
         </p:txBody>
       </p:sp>
       <p:sp>
         <p:nvSpPr>
-          <p:cNvPr id="5" name="TextBox 4"/>
+          <p:cNvPr id="7" name="TextBox 6"/>
           <p:cNvSpPr txBox="1"/>
           <p:nvPr/>
         </p:nvSpPr>
         <p:spPr>
           <a:xfrm>
-            <a:off x="3390773" y="4327301"/>
-            <a:ext cx="2963186" cy="830997"/>
+            <a:off x="9767141" y="4327300"/>
+            <a:ext cx="1483216" cy="1015663"/>
           </a:xfrm>
           <a:prstGeom prst="rect">
             <a:avLst/>
@@ -19927,83 +20265,17 @@
           <a:lstStyle/>
           <a:p>
             <a:r>
-              <a:rPr lang="es-CR" sz="2400" dirty="0" smtClean="0"/>
-              <a:t>Refinamos la</a:t>
-            </a:r>
-          </a:p>
-          <a:p>
-            <a:r>
-              <a:rPr lang="es-CR" sz="2400" dirty="0" smtClean="0"/>
-              <a:t>especificación</a:t>
-            </a:r>
-            <a:endParaRPr lang="en-US" sz="2400" dirty="0"/>
-          </a:p>
-        </p:txBody>
-      </p:sp>
-      <p:sp>
-        <p:nvSpPr>
-          <p:cNvPr id="6" name="TextBox 5"/>
-          <p:cNvSpPr txBox="1"/>
-          <p:nvPr/>
-        </p:nvSpPr>
-        <p:spPr>
-          <a:xfrm>
-            <a:off x="5950307" y="4327299"/>
-            <a:ext cx="2285643" cy="1200329"/>
-          </a:xfrm>
-          <a:prstGeom prst="rect">
-            <a:avLst/>
-          </a:prstGeom>
-          <a:noFill/>
-        </p:spPr>
-        <p:txBody>
-          <a:bodyPr wrap="square" rtlCol="0">
-            <a:spAutoFit/>
-          </a:bodyPr>
-          <a:lstStyle/>
-          <a:p>
-            <a:r>
-              <a:rPr lang="es-CR" sz="2400" dirty="0" smtClean="0"/>
-              <a:t>Se automatiza sin cambiarla</a:t>
-            </a:r>
-            <a:endParaRPr lang="en-US" sz="2400" dirty="0"/>
-          </a:p>
-        </p:txBody>
-      </p:sp>
-      <p:sp>
-        <p:nvSpPr>
-          <p:cNvPr id="7" name="TextBox 6"/>
-          <p:cNvSpPr txBox="1"/>
-          <p:nvPr/>
-        </p:nvSpPr>
-        <p:spPr>
-          <a:xfrm>
-            <a:off x="9119440" y="4292150"/>
-            <a:ext cx="1838625" cy="1200329"/>
-          </a:xfrm>
-          <a:prstGeom prst="rect">
-            <a:avLst/>
-          </a:prstGeom>
-          <a:noFill/>
-        </p:spPr>
-        <p:txBody>
-          <a:bodyPr wrap="square" rtlCol="0">
-            <a:spAutoFit/>
-          </a:bodyPr>
-          <a:lstStyle/>
-          <a:p>
-            <a:r>
-              <a:rPr lang="es-CR" sz="2400" dirty="0" smtClean="0"/>
-              <a:t>Se usa con cada cambio</a:t>
-            </a:r>
-            <a:endParaRPr lang="en-US" sz="2400" dirty="0"/>
+              <a:rPr lang="es-CR" sz="2000" dirty="0" smtClean="0"/>
+              <a:t>Se valida con cada cambio</a:t>
+            </a:r>
+            <a:endParaRPr lang="en-US" sz="2000" dirty="0"/>
           </a:p>
         </p:txBody>
       </p:sp>
     </p:spTree>
     <p:extLst>
       <p:ext uri="{BB962C8B-B14F-4D97-AF65-F5344CB8AC3E}">
-        <p14:creationId xmlns:p14="http://schemas.microsoft.com/office/powerpoint/2010/main" val="92726885"/>
+        <p14:creationId xmlns:p14="http://schemas.microsoft.com/office/powerpoint/2010/main" val="505765289"/>
       </p:ext>
     </p:extLst>
   </p:cSld>
@@ -21079,30 +21351,6 @@
           </a:p>
         </p:txBody>
       </p:sp>
-      <p:pic>
-        <p:nvPicPr>
-          <p:cNvPr id="10" name="Picture 9"/>
-          <p:cNvPicPr>
-            <a:picLocks noChangeAspect="1"/>
-          </p:cNvPicPr>
-          <p:nvPr/>
-        </p:nvPicPr>
-        <p:blipFill>
-          <a:blip r:embed="rId2"/>
-          <a:stretch>
-            <a:fillRect/>
-          </a:stretch>
-        </p:blipFill>
-        <p:spPr>
-          <a:xfrm>
-            <a:off x="113233" y="1968500"/>
-            <a:ext cx="9803134" cy="4709738"/>
-          </a:xfrm>
-          <a:prstGeom prst="rect">
-            <a:avLst/>
-          </a:prstGeom>
-        </p:spPr>
-      </p:pic>
       <p:sp>
         <p:nvSpPr>
           <p:cNvPr id="11" name="Rectangle 10"/>
@@ -21156,7 +21404,7 @@
           <p:nvPr/>
         </p:nvPicPr>
         <p:blipFill>
-          <a:blip r:embed="rId3">
+          <a:blip r:embed="rId2">
             <a:extLst>
               <a:ext uri="{28A0092B-C50C-407E-A947-70E740481C1C}">
                 <a14:useLocalDpi xmlns:a14="http://schemas.microsoft.com/office/drawing/2010/main" val="0"/>
@@ -22575,38 +22823,49 @@
         </p:nvSpPr>
         <p:spPr/>
         <p:txBody>
-          <a:bodyPr/>
+          <a:bodyPr>
+            <a:normAutofit/>
+          </a:bodyPr>
           <a:lstStyle/>
           <a:p>
             <a:r>
-              <a:rPr lang="es-CR" dirty="0" smtClean="0"/>
-              <a:t>Usa lenguaje del dominio</a:t>
-            </a:r>
-          </a:p>
-          <a:p>
-            <a:r>
-              <a:rPr lang="es-CR" dirty="0" smtClean="0"/>
-              <a:t>Es legible</a:t>
-            </a:r>
-          </a:p>
-          <a:p>
-            <a:r>
-              <a:rPr lang="es-CR" dirty="0" smtClean="0"/>
+              <a:rPr lang="es-CR" sz="3200" dirty="0" smtClean="0"/>
+              <a:t>Usa lenguaje del </a:t>
+            </a:r>
+            <a:r>
+              <a:rPr lang="es-CR" sz="3200" dirty="0" smtClean="0"/>
+              <a:t>negocio</a:t>
+            </a:r>
+            <a:endParaRPr lang="es-CR" sz="3200" dirty="0" smtClean="0"/>
+          </a:p>
+          <a:p>
+            <a:r>
+              <a:rPr lang="es-CR" sz="3200" dirty="0" smtClean="0"/>
+              <a:t>Es </a:t>
+            </a:r>
+            <a:r>
+              <a:rPr lang="es-CR" sz="3200" dirty="0" smtClean="0"/>
+              <a:t>legible para humanos</a:t>
+            </a:r>
+            <a:endParaRPr lang="es-CR" sz="3200" dirty="0" smtClean="0"/>
+          </a:p>
+          <a:p>
+            <a:r>
+              <a:rPr lang="es-CR" sz="3200" dirty="0" smtClean="0"/>
               <a:t>Todos pueden consultarlo fácilmente </a:t>
             </a:r>
           </a:p>
           <a:p>
-            <a:r>
-              <a:rPr lang="es-CR" dirty="0" smtClean="0"/>
-              <a:t>Se puede usar para conversar</a:t>
-            </a:r>
-          </a:p>
-          <a:p>
-            <a:r>
-              <a:rPr lang="es-CR" dirty="0" smtClean="0"/>
-              <a:t>Es para humanos</a:t>
-            </a:r>
-            <a:endParaRPr lang="es-CR" dirty="0"/>
+            <a:pPr lvl="1"/>
+            <a:r>
+              <a:rPr lang="es-CR" sz="3000" dirty="0" smtClean="0"/>
+              <a:t>Se puede usar para </a:t>
+            </a:r>
+            <a:r>
+              <a:rPr lang="es-CR" sz="3000" dirty="0" smtClean="0"/>
+              <a:t>conversar…</a:t>
+            </a:r>
+            <a:endParaRPr lang="es-CR" sz="3000" dirty="0"/>
           </a:p>
         </p:txBody>
       </p:sp>
@@ -22657,7 +22916,15 @@
           <a:p>
             <a:r>
               <a:rPr lang="es-CR" dirty="0" smtClean="0"/>
-              <a:t>¿Qué pasaría si…?</a:t>
+              <a:t>“¿</a:t>
+            </a:r>
+            <a:r>
+              <a:rPr lang="es-CR" dirty="0" smtClean="0"/>
+              <a:t>Qué pasaría si</a:t>
+            </a:r>
+            <a:r>
+              <a:rPr lang="es-CR" dirty="0" smtClean="0"/>
+              <a:t>…?”</a:t>
             </a:r>
             <a:endParaRPr lang="es-CR" dirty="0"/>
           </a:p>
@@ -22673,7 +22940,12 @@
             <p:ph idx="1"/>
           </p:nvPr>
         </p:nvSpPr>
-        <p:spPr/>
+        <p:spPr>
+          <a:xfrm>
+            <a:off x="1154954" y="2603499"/>
+            <a:ext cx="7020055" cy="4083903"/>
+          </a:xfrm>
+        </p:spPr>
         <p:txBody>
           <a:bodyPr>
             <a:noAutofit/>
@@ -22682,26 +22954,29 @@
           <a:p>
             <a:r>
               <a:rPr lang="es-CR" sz="3200" dirty="0" smtClean="0"/>
-              <a:t>Podemos pensar en nuevos ejemplos y saber rápidamente cómo se comporta el sistema…</a:t>
-            </a:r>
-          </a:p>
-          <a:p>
-            <a:endParaRPr lang="es-CR" sz="3200" dirty="0"/>
-          </a:p>
-          <a:p>
+              <a:t>…el </a:t>
+            </a:r>
+            <a:r>
+              <a:rPr lang="es-CR" sz="3200" dirty="0"/>
+              <a:t>precio mínimo es $25</a:t>
+            </a:r>
+          </a:p>
+          <a:p>
+            <a:pPr lvl="1"/>
+            <a:r>
+              <a:rPr lang="es-CR" sz="3200" dirty="0"/>
+              <a:t>y</a:t>
+            </a:r>
             <a:r>
               <a:rPr lang="es-CR" sz="3200" dirty="0" smtClean="0"/>
-              <a:t>El precio mínimo es $25</a:t>
-            </a:r>
-          </a:p>
-          <a:p>
-            <a:pPr lvl="1"/>
-            <a:r>
-              <a:rPr lang="es-CR" sz="3200" dirty="0" smtClean="0"/>
-              <a:t>Si un cliente </a:t>
-            </a:r>
-            <a:r>
-              <a:rPr lang="es-CR" sz="3200" dirty="0" smtClean="0">
+              <a:t> un </a:t>
+            </a:r>
+            <a:r>
+              <a:rPr lang="es-CR" sz="3200" dirty="0"/>
+              <a:t>cliente </a:t>
+            </a:r>
+            <a:r>
+              <a:rPr lang="es-CR" sz="3200" dirty="0">
                 <a:solidFill>
                   <a:schemeClr val="accent1"/>
                 </a:solidFill>
@@ -22713,10 +22988,10 @@
             <a:pPr lvl="1"/>
             <a:r>
               <a:rPr lang="es-CR" sz="3200" dirty="0" smtClean="0"/>
-              <a:t>Compra </a:t>
-            </a:r>
-            <a:r>
-              <a:rPr lang="es-CR" sz="3200" dirty="0" smtClean="0">
+              <a:t>compra </a:t>
+            </a:r>
+            <a:r>
+              <a:rPr lang="es-CR" sz="3200" dirty="0">
                 <a:solidFill>
                   <a:schemeClr val="accent1"/>
                 </a:solidFill>
@@ -22724,11 +22999,11 @@
               <a:t>5</a:t>
             </a:r>
             <a:r>
-              <a:rPr lang="es-CR" sz="3200" dirty="0" smtClean="0"/>
+              <a:rPr lang="es-CR" sz="3200" dirty="0"/>
               <a:t> </a:t>
             </a:r>
             <a:r>
-              <a:rPr lang="es-CR" sz="3200" dirty="0" smtClean="0">
+              <a:rPr lang="es-CR" sz="3200" dirty="0">
                 <a:solidFill>
                   <a:schemeClr val="accent1"/>
                 </a:solidFill>
@@ -22736,11 +23011,11 @@
               <a:t>libros</a:t>
             </a:r>
             <a:r>
-              <a:rPr lang="es-CR" sz="3200" dirty="0" smtClean="0"/>
+              <a:rPr lang="es-CR" sz="3200" dirty="0"/>
               <a:t> por </a:t>
             </a:r>
             <a:r>
-              <a:rPr lang="es-CR" sz="3200" dirty="0" smtClean="0">
+              <a:rPr lang="es-CR" sz="3200" dirty="0">
                 <a:solidFill>
                   <a:schemeClr val="accent1"/>
                 </a:solidFill>
@@ -22748,9 +23023,49 @@
               <a:t>$25</a:t>
             </a:r>
             <a:r>
-              <a:rPr lang="es-CR" sz="3200" dirty="0" smtClean="0"/>
+              <a:rPr lang="es-CR" sz="3200" dirty="0"/>
               <a:t>?</a:t>
             </a:r>
+            <a:endParaRPr lang="es-CR" sz="3200" dirty="0" smtClean="0"/>
+          </a:p>
+          <a:p>
+            <a:endParaRPr lang="es-CR" sz="3200" dirty="0"/>
+          </a:p>
+          <a:p>
+            <a:r>
+              <a:rPr lang="es-CR" sz="3200" dirty="0" smtClean="0">
+                <a:solidFill>
+                  <a:schemeClr val="tx1">
+                    <a:lumMod val="50000"/>
+                    <a:lumOff val="50000"/>
+                  </a:schemeClr>
+                </a:solidFill>
+              </a:rPr>
+              <a:t>Podemos </a:t>
+            </a:r>
+            <a:r>
+              <a:rPr lang="es-CR" sz="3200" dirty="0" smtClean="0">
+                <a:solidFill>
+                  <a:schemeClr val="tx1">
+                    <a:lumMod val="50000"/>
+                    <a:lumOff val="50000"/>
+                  </a:schemeClr>
+                </a:solidFill>
+              </a:rPr>
+              <a:t>pensar en nuevos ejemplos y saber rápidamente cómo se comporta el sistema…</a:t>
+            </a:r>
+          </a:p>
+          <a:p>
+            <a:endParaRPr lang="es-CR" sz="3200" dirty="0">
+              <a:solidFill>
+                <a:schemeClr val="tx1">
+                  <a:lumMod val="50000"/>
+                  <a:lumOff val="50000"/>
+                </a:schemeClr>
+              </a:solidFill>
+            </a:endParaRPr>
+          </a:p>
+          <a:p>
             <a:endParaRPr lang="es-CR" sz="3200" dirty="0"/>
           </a:p>
         </p:txBody>
@@ -22764,7 +23079,7 @@
           <p:nvPr/>
         </p:nvPicPr>
         <p:blipFill rotWithShape="1">
-          <a:blip r:embed="rId2">
+          <a:blip r:embed="rId3">
             <a:extLst>
               <a:ext uri="{28A0092B-C50C-407E-A947-70E740481C1C}">
                 <a14:useLocalDpi xmlns:a14="http://schemas.microsoft.com/office/drawing/2010/main" val="0"/>
@@ -22844,6 +23159,223 @@
           <a:chExt cx="0" cy="0"/>
         </a:xfrm>
       </p:grpSpPr>
+      <p:sp>
+        <p:nvSpPr>
+          <p:cNvPr id="2" name="Title 1"/>
+          <p:cNvSpPr>
+            <a:spLocks noGrp="1"/>
+          </p:cNvSpPr>
+          <p:nvPr>
+            <p:ph type="title"/>
+          </p:nvPr>
+        </p:nvSpPr>
+        <p:spPr/>
+        <p:txBody>
+          <a:bodyPr/>
+          <a:lstStyle/>
+          <a:p>
+            <a:r>
+              <a:rPr lang="es-CR" dirty="0" smtClean="0"/>
+              <a:t>“Tengo una observación…”</a:t>
+            </a:r>
+            <a:endParaRPr lang="es-CR" dirty="0"/>
+          </a:p>
+        </p:txBody>
+      </p:sp>
+      <p:sp>
+        <p:nvSpPr>
+          <p:cNvPr id="3" name="Content Placeholder 2"/>
+          <p:cNvSpPr>
+            <a:spLocks noGrp="1"/>
+          </p:cNvSpPr>
+          <p:nvPr>
+            <p:ph idx="1"/>
+          </p:nvPr>
+        </p:nvSpPr>
+        <p:spPr>
+          <a:xfrm>
+            <a:off x="1154954" y="2603500"/>
+            <a:ext cx="7589313" cy="3416300"/>
+          </a:xfrm>
+        </p:spPr>
+        <p:txBody>
+          <a:bodyPr>
+            <a:noAutofit/>
+          </a:bodyPr>
+          <a:lstStyle/>
+          <a:p>
+            <a:r>
+              <a:rPr lang="es-CR" sz="3200" dirty="0" smtClean="0"/>
+              <a:t>“…la cantidad de productos no afecta si le ofrecemos entrega gratuita o no.”</a:t>
+            </a:r>
+          </a:p>
+          <a:p>
+            <a:endParaRPr lang="es-CR" sz="3200" dirty="0"/>
+          </a:p>
+          <a:p>
+            <a:r>
+              <a:rPr lang="es-CR" sz="3200" dirty="0">
+                <a:solidFill>
+                  <a:schemeClr val="tx1">
+                    <a:lumMod val="50000"/>
+                    <a:lumOff val="50000"/>
+                  </a:schemeClr>
+                </a:solidFill>
+              </a:rPr>
+              <a:t>En los ejemplos, incluimos sólo la información relevante para la explicación de la regla.</a:t>
+            </a:r>
+          </a:p>
+          <a:p>
+            <a:endParaRPr lang="es-CR" sz="3200" dirty="0"/>
+          </a:p>
+        </p:txBody>
+      </p:sp>
+      <p:pic>
+        <p:nvPicPr>
+          <p:cNvPr id="5" name="Picture 2" descr="http://clarusapex.com/wp-content/uploads/2015/01/shutterstock_154519763.jpg"/>
+          <p:cNvPicPr>
+            <a:picLocks noChangeAspect="1" noChangeArrowheads="1"/>
+          </p:cNvPicPr>
+          <p:nvPr/>
+        </p:nvPicPr>
+        <p:blipFill>
+          <a:blip r:embed="rId3">
+            <a:extLst>
+              <a:ext uri="{28A0092B-C50C-407E-A947-70E740481C1C}">
+                <a14:useLocalDpi xmlns:a14="http://schemas.microsoft.com/office/drawing/2010/main" val="0"/>
+              </a:ext>
+            </a:extLst>
+          </a:blip>
+          <a:srcRect/>
+          <a:stretch>
+            <a:fillRect/>
+          </a:stretch>
+        </p:blipFill>
+        <p:spPr bwMode="auto">
+          <a:xfrm>
+            <a:off x="8744267" y="4818820"/>
+            <a:ext cx="3053844" cy="2039180"/>
+          </a:xfrm>
+          <a:prstGeom prst="rect">
+            <a:avLst/>
+          </a:prstGeom>
+          <a:noFill/>
+          <a:extLst>
+            <a:ext uri="{909E8E84-426E-40DD-AFC4-6F175D3DCCD1}">
+              <a14:hiddenFill xmlns:a14="http://schemas.microsoft.com/office/drawing/2010/main">
+                <a:solidFill>
+                  <a:srgbClr val="FFFFFF"/>
+                </a:solidFill>
+              </a14:hiddenFill>
+            </a:ext>
+          </a:extLst>
+        </p:spPr>
+      </p:pic>
+    </p:spTree>
+    <p:extLst>
+      <p:ext uri="{BB962C8B-B14F-4D97-AF65-F5344CB8AC3E}">
+        <p14:creationId xmlns:p14="http://schemas.microsoft.com/office/powerpoint/2010/main" val="2685694638"/>
+      </p:ext>
+    </p:extLst>
+  </p:cSld>
+  <p:clrMapOvr>
+    <a:masterClrMapping/>
+  </p:clrMapOvr>
+  <p:timing>
+    <p:tnLst>
+      <p:par>
+        <p:cTn id="1" dur="indefinite" restart="never" nodeType="tmRoot">
+          <p:childTnLst>
+            <p:seq concurrent="1" nextAc="seek">
+              <p:cTn id="2" dur="indefinite" nodeType="mainSeq">
+                <p:childTnLst>
+                  <p:par>
+                    <p:cTn id="3" fill="hold">
+                      <p:stCondLst>
+                        <p:cond delay="indefinite"/>
+                      </p:stCondLst>
+                      <p:childTnLst>
+                        <p:par>
+                          <p:cTn id="4" fill="hold">
+                            <p:stCondLst>
+                              <p:cond delay="0"/>
+                            </p:stCondLst>
+                            <p:childTnLst>
+                              <p:par>
+                                <p:cTn id="5" presetID="1" presetClass="entr" presetSubtype="0" fill="hold" nodeType="clickEffect">
+                                  <p:stCondLst>
+                                    <p:cond delay="0"/>
+                                  </p:stCondLst>
+                                  <p:childTnLst>
+                                    <p:set>
+                                      <p:cBhvr>
+                                        <p:cTn id="6" dur="1" fill="hold">
+                                          <p:stCondLst>
+                                            <p:cond delay="0"/>
+                                          </p:stCondLst>
+                                        </p:cTn>
+                                        <p:tgtEl>
+                                          <p:spTgt spid="5"/>
+                                        </p:tgtEl>
+                                        <p:attrNameLst>
+                                          <p:attrName>style.visibility</p:attrName>
+                                        </p:attrNameLst>
+                                      </p:cBhvr>
+                                      <p:to>
+                                        <p:strVal val="visible"/>
+                                      </p:to>
+                                    </p:set>
+                                  </p:childTnLst>
+                                </p:cTn>
+                              </p:par>
+                            </p:childTnLst>
+                          </p:cTn>
+                        </p:par>
+                      </p:childTnLst>
+                    </p:cTn>
+                  </p:par>
+                </p:childTnLst>
+              </p:cTn>
+              <p:prevCondLst>
+                <p:cond evt="onPrev" delay="0">
+                  <p:tgtEl>
+                    <p:sldTgt/>
+                  </p:tgtEl>
+                </p:cond>
+              </p:prevCondLst>
+              <p:nextCondLst>
+                <p:cond evt="onNext" delay="0">
+                  <p:tgtEl>
+                    <p:sldTgt/>
+                  </p:tgtEl>
+                </p:cond>
+              </p:nextCondLst>
+            </p:seq>
+          </p:childTnLst>
+        </p:cTn>
+      </p:par>
+    </p:tnLst>
+  </p:timing>
+</p:sld>
+</file>
+
+<file path=ppt/slides/slide19.xml><?xml version="1.0" encoding="utf-8"?>
+<p:sld xmlns:a="http://schemas.openxmlformats.org/drawingml/2006/main" xmlns:r="http://schemas.openxmlformats.org/officeDocument/2006/relationships" xmlns:p="http://schemas.openxmlformats.org/presentationml/2006/main">
+  <p:cSld>
+    <p:spTree>
+      <p:nvGrpSpPr>
+        <p:cNvPr id="1" name=""/>
+        <p:cNvGrpSpPr/>
+        <p:nvPr/>
+      </p:nvGrpSpPr>
+      <p:grpSpPr>
+        <a:xfrm>
+          <a:off x="0" y="0"/>
+          <a:ext cx="0" cy="0"/>
+          <a:chOff x="0" y="0"/>
+          <a:chExt cx="0" cy="0"/>
+        </a:xfrm>
+      </p:grpSpPr>
       <p:graphicFrame>
         <p:nvGraphicFramePr>
           <p:cNvPr id="3" name="Diagram 2"/>
@@ -22894,7 +23426,7 @@
         <p:spPr>
           <a:xfrm>
             <a:off x="199383" y="4327300"/>
-            <a:ext cx="1524776" cy="646331"/>
+            <a:ext cx="1962397" cy="707886"/>
           </a:xfrm>
           <a:prstGeom prst="rect">
             <a:avLst/>
@@ -22908,16 +23440,16 @@
           <a:lstStyle/>
           <a:p>
             <a:r>
-              <a:rPr lang="es-CR" dirty="0" smtClean="0"/>
+              <a:rPr lang="es-CR" sz="2000" dirty="0" smtClean="0"/>
               <a:t>Especificamos</a:t>
             </a:r>
           </a:p>
           <a:p>
             <a:r>
-              <a:rPr lang="es-CR" dirty="0" smtClean="0"/>
+              <a:rPr lang="es-CR" sz="2000" dirty="0" smtClean="0"/>
               <a:t>en equipo</a:t>
             </a:r>
-            <a:endParaRPr lang="en-US" dirty="0"/>
+            <a:endParaRPr lang="en-US" sz="2000" dirty="0"/>
           </a:p>
         </p:txBody>
       </p:sp>
@@ -22930,7 +23462,7 @@
         <p:spPr>
           <a:xfrm>
             <a:off x="3390773" y="4327301"/>
-            <a:ext cx="1521570" cy="646331"/>
+            <a:ext cx="2026517" cy="707886"/>
           </a:xfrm>
           <a:prstGeom prst="rect">
             <a:avLst/>
@@ -22944,16 +23476,16 @@
           <a:lstStyle/>
           <a:p>
             <a:r>
-              <a:rPr lang="es-CR" dirty="0" smtClean="0"/>
+              <a:rPr lang="es-CR" sz="2000" dirty="0" smtClean="0"/>
               <a:t>Refinamos la</a:t>
             </a:r>
           </a:p>
           <a:p>
             <a:r>
-              <a:rPr lang="es-CR" dirty="0" smtClean="0"/>
+              <a:rPr lang="es-CR" sz="2000" dirty="0" smtClean="0"/>
               <a:t>especificación</a:t>
             </a:r>
-            <a:endParaRPr lang="en-US" dirty="0"/>
+            <a:endParaRPr lang="en-US" sz="2000" dirty="0"/>
           </a:p>
         </p:txBody>
       </p:sp>
@@ -22966,7 +23498,7 @@
         <p:spPr>
           <a:xfrm>
             <a:off x="6578957" y="4327300"/>
-            <a:ext cx="1843825" cy="646331"/>
+            <a:ext cx="1843825" cy="1015663"/>
           </a:xfrm>
           <a:prstGeom prst="rect">
             <a:avLst/>
@@ -22980,10 +23512,10 @@
           <a:lstStyle/>
           <a:p>
             <a:r>
-              <a:rPr lang="es-CR" dirty="0" smtClean="0"/>
+              <a:rPr lang="es-CR" sz="2000" dirty="0" smtClean="0"/>
               <a:t>Se automatiza sin cambiarla</a:t>
             </a:r>
-            <a:endParaRPr lang="en-US" dirty="0"/>
+            <a:endParaRPr lang="en-US" sz="2000" dirty="0"/>
           </a:p>
         </p:txBody>
       </p:sp>
@@ -22996,7 +23528,7 @@
         <p:spPr>
           <a:xfrm>
             <a:off x="9767141" y="4327300"/>
-            <a:ext cx="1483216" cy="646331"/>
+            <a:ext cx="1483216" cy="1015663"/>
           </a:xfrm>
           <a:prstGeom prst="rect">
             <a:avLst/>
@@ -23010,10 +23542,10 @@
           <a:lstStyle/>
           <a:p>
             <a:r>
-              <a:rPr lang="es-CR" dirty="0" smtClean="0"/>
+              <a:rPr lang="es-CR" sz="2000" dirty="0" smtClean="0"/>
               <a:t>Se valida con cada cambio</a:t>
             </a:r>
-            <a:endParaRPr lang="en-US" dirty="0"/>
+            <a:endParaRPr lang="en-US" sz="2000" dirty="0"/>
           </a:p>
         </p:txBody>
       </p:sp>
@@ -23021,251 +23553,6 @@
     <p:extLst>
       <p:ext uri="{BB962C8B-B14F-4D97-AF65-F5344CB8AC3E}">
         <p14:creationId xmlns:p14="http://schemas.microsoft.com/office/powerpoint/2010/main" val="430844721"/>
-      </p:ext>
-    </p:extLst>
-  </p:cSld>
-  <p:clrMapOvr>
-    <a:masterClrMapping/>
-  </p:clrMapOvr>
-  <p:timing>
-    <p:tnLst>
-      <p:par>
-        <p:cTn id="1" dur="indefinite" restart="never" nodeType="tmRoot"/>
-      </p:par>
-    </p:tnLst>
-  </p:timing>
-</p:sld>
-</file>
-
-<file path=ppt/slides/slide19.xml><?xml version="1.0" encoding="utf-8"?>
-<p:sld xmlns:a="http://schemas.openxmlformats.org/drawingml/2006/main" xmlns:r="http://schemas.openxmlformats.org/officeDocument/2006/relationships" xmlns:p="http://schemas.openxmlformats.org/presentationml/2006/main">
-  <p:cSld>
-    <p:spTree>
-      <p:nvGrpSpPr>
-        <p:cNvPr id="1" name=""/>
-        <p:cNvGrpSpPr/>
-        <p:nvPr/>
-      </p:nvGrpSpPr>
-      <p:grpSpPr>
-        <a:xfrm>
-          <a:off x="0" y="0"/>
-          <a:ext cx="0" cy="0"/>
-          <a:chOff x="0" y="0"/>
-          <a:chExt cx="0" cy="0"/>
-        </a:xfrm>
-      </p:grpSpPr>
-      <p:sp>
-        <p:nvSpPr>
-          <p:cNvPr id="2" name="Title 1"/>
-          <p:cNvSpPr>
-            <a:spLocks noGrp="1"/>
-          </p:cNvSpPr>
-          <p:nvPr>
-            <p:ph type="title"/>
-          </p:nvPr>
-        </p:nvSpPr>
-        <p:spPr/>
-        <p:txBody>
-          <a:bodyPr/>
-          <a:lstStyle/>
-          <a:p>
-            <a:r>
-              <a:rPr lang="es-CR" b="1" dirty="0" smtClean="0"/>
-              <a:t>R/ </a:t>
-            </a:r>
-            <a:r>
-              <a:rPr lang="es-CR" dirty="0" smtClean="0"/>
-              <a:t>Tres problemas</a:t>
-            </a:r>
-            <a:endParaRPr lang="en-US" dirty="0"/>
-          </a:p>
-        </p:txBody>
-      </p:sp>
-      <p:sp>
-        <p:nvSpPr>
-          <p:cNvPr id="3" name="Text Placeholder 2"/>
-          <p:cNvSpPr>
-            <a:spLocks noGrp="1"/>
-          </p:cNvSpPr>
-          <p:nvPr>
-            <p:ph type="body" idx="1"/>
-          </p:nvPr>
-        </p:nvSpPr>
-        <p:spPr/>
-        <p:txBody>
-          <a:bodyPr/>
-          <a:lstStyle/>
-          <a:p>
-            <a:r>
-              <a:rPr lang="es-CR" dirty="0" smtClean="0"/>
-              <a:t>Abstractos </a:t>
-            </a:r>
-            <a:endParaRPr lang="en-US" dirty="0"/>
-          </a:p>
-        </p:txBody>
-      </p:sp>
-      <p:sp>
-        <p:nvSpPr>
-          <p:cNvPr id="4" name="Text Placeholder 3"/>
-          <p:cNvSpPr>
-            <a:spLocks noGrp="1"/>
-          </p:cNvSpPr>
-          <p:nvPr>
-            <p:ph type="body" sz="half" idx="15"/>
-          </p:nvPr>
-        </p:nvSpPr>
-        <p:spPr/>
-        <p:txBody>
-          <a:bodyPr>
-            <a:normAutofit/>
-          </a:bodyPr>
-          <a:lstStyle/>
-          <a:p>
-            <a:r>
-              <a:rPr lang="es-CR" sz="3200" dirty="0" smtClean="0"/>
-              <a:t>Una </a:t>
-            </a:r>
-            <a:r>
-              <a:rPr lang="es-CR" sz="3200" b="1" dirty="0" smtClean="0"/>
-              <a:t>Especificación por Ejemplos </a:t>
-            </a:r>
-            <a:r>
-              <a:rPr lang="es-CR" sz="3200" dirty="0" smtClean="0"/>
-              <a:t>es concreta.</a:t>
-            </a:r>
-            <a:endParaRPr lang="en-US" sz="3200" dirty="0"/>
-          </a:p>
-        </p:txBody>
-      </p:sp>
-      <p:sp>
-        <p:nvSpPr>
-          <p:cNvPr id="5" name="Text Placeholder 4"/>
-          <p:cNvSpPr>
-            <a:spLocks noGrp="1"/>
-          </p:cNvSpPr>
-          <p:nvPr>
-            <p:ph type="body" sz="quarter" idx="3"/>
-          </p:nvPr>
-        </p:nvSpPr>
-        <p:spPr/>
-        <p:txBody>
-          <a:bodyPr/>
-          <a:lstStyle/>
-          <a:p>
-            <a:r>
-              <a:rPr lang="es-CR" dirty="0" smtClean="0"/>
-              <a:t>Aislados</a:t>
-            </a:r>
-            <a:endParaRPr lang="en-US" dirty="0"/>
-          </a:p>
-        </p:txBody>
-      </p:sp>
-      <p:sp>
-        <p:nvSpPr>
-          <p:cNvPr id="6" name="Text Placeholder 5"/>
-          <p:cNvSpPr>
-            <a:spLocks noGrp="1"/>
-          </p:cNvSpPr>
-          <p:nvPr>
-            <p:ph type="body" sz="half" idx="16"/>
-          </p:nvPr>
-        </p:nvSpPr>
-        <p:spPr/>
-        <p:txBody>
-          <a:bodyPr>
-            <a:noAutofit/>
-          </a:bodyPr>
-          <a:lstStyle/>
-          <a:p>
-            <a:r>
-              <a:rPr lang="es-CR" sz="2800" dirty="0" smtClean="0"/>
-              <a:t>Los tres roles realizan la especificación </a:t>
-            </a:r>
-            <a:r>
-              <a:rPr lang="es-CR" sz="2800" b="1" dirty="0" smtClean="0"/>
-              <a:t>juntos</a:t>
-            </a:r>
-            <a:r>
-              <a:rPr lang="es-CR" sz="2800" dirty="0" smtClean="0"/>
-              <a:t>, y </a:t>
-            </a:r>
-            <a:r>
-              <a:rPr lang="es-CR" sz="2800" b="1" dirty="0" smtClean="0"/>
-              <a:t>comparten</a:t>
-            </a:r>
-            <a:r>
-              <a:rPr lang="es-CR" sz="2800" dirty="0" smtClean="0"/>
-              <a:t> los ejemplos en sus actividades.</a:t>
-            </a:r>
-            <a:endParaRPr lang="en-US" sz="2800" dirty="0"/>
-          </a:p>
-        </p:txBody>
-      </p:sp>
-      <p:sp>
-        <p:nvSpPr>
-          <p:cNvPr id="7" name="Text Placeholder 6"/>
-          <p:cNvSpPr>
-            <a:spLocks noGrp="1"/>
-          </p:cNvSpPr>
-          <p:nvPr>
-            <p:ph type="body" sz="quarter" idx="13"/>
-          </p:nvPr>
-        </p:nvSpPr>
-        <p:spPr>
-          <a:xfrm>
-            <a:off x="7888134" y="2603501"/>
-            <a:ext cx="4062565" cy="576262"/>
-          </a:xfrm>
-        </p:spPr>
-        <p:txBody>
-          <a:bodyPr/>
-          <a:lstStyle/>
-          <a:p>
-            <a:r>
-              <a:rPr lang="es-CR" dirty="0"/>
-              <a:t>Información accesible</a:t>
-            </a:r>
-            <a:endParaRPr lang="en-US" dirty="0"/>
-          </a:p>
-        </p:txBody>
-      </p:sp>
-      <p:sp>
-        <p:nvSpPr>
-          <p:cNvPr id="8" name="Text Placeholder 7"/>
-          <p:cNvSpPr>
-            <a:spLocks noGrp="1"/>
-          </p:cNvSpPr>
-          <p:nvPr>
-            <p:ph type="body" sz="half" idx="17"/>
-          </p:nvPr>
-        </p:nvSpPr>
-        <p:spPr/>
-        <p:txBody>
-          <a:bodyPr>
-            <a:normAutofit/>
-          </a:bodyPr>
-          <a:lstStyle/>
-          <a:p>
-            <a:r>
-              <a:rPr lang="es-CR" sz="2800" dirty="0" smtClean="0"/>
-              <a:t>Los ejemplos se automatizan sin cambiarlos y </a:t>
-            </a:r>
-            <a:r>
-              <a:rPr lang="es-CR" sz="2800" b="1" dirty="0" smtClean="0"/>
-              <a:t>son accesibles </a:t>
-            </a:r>
-            <a:r>
-              <a:rPr lang="es-CR" sz="2800" dirty="0" smtClean="0"/>
-              <a:t>por todos.</a:t>
-            </a:r>
-            <a:endParaRPr lang="en-US" sz="2800" dirty="0"/>
-          </a:p>
-        </p:txBody>
-      </p:sp>
-    </p:spTree>
-    <p:extLst>
-      <p:ext uri="{BB962C8B-B14F-4D97-AF65-F5344CB8AC3E}">
-        <p14:creationId xmlns:p14="http://schemas.microsoft.com/office/powerpoint/2010/main" val="3288590617"/>
       </p:ext>
     </p:extLst>
   </p:cSld>
@@ -23531,6 +23818,251 @@
           <a:lstStyle/>
           <a:p>
             <a:r>
+              <a:rPr lang="es-CR" b="1" dirty="0" smtClean="0"/>
+              <a:t>R/ </a:t>
+            </a:r>
+            <a:r>
+              <a:rPr lang="es-CR" dirty="0" smtClean="0"/>
+              <a:t>Tres problemas</a:t>
+            </a:r>
+            <a:endParaRPr lang="en-US" dirty="0"/>
+          </a:p>
+        </p:txBody>
+      </p:sp>
+      <p:sp>
+        <p:nvSpPr>
+          <p:cNvPr id="3" name="Text Placeholder 2"/>
+          <p:cNvSpPr>
+            <a:spLocks noGrp="1"/>
+          </p:cNvSpPr>
+          <p:nvPr>
+            <p:ph type="body" idx="1"/>
+          </p:nvPr>
+        </p:nvSpPr>
+        <p:spPr/>
+        <p:txBody>
+          <a:bodyPr/>
+          <a:lstStyle/>
+          <a:p>
+            <a:r>
+              <a:rPr lang="es-CR" dirty="0" smtClean="0"/>
+              <a:t>Abstractos </a:t>
+            </a:r>
+            <a:endParaRPr lang="en-US" dirty="0"/>
+          </a:p>
+        </p:txBody>
+      </p:sp>
+      <p:sp>
+        <p:nvSpPr>
+          <p:cNvPr id="4" name="Text Placeholder 3"/>
+          <p:cNvSpPr>
+            <a:spLocks noGrp="1"/>
+          </p:cNvSpPr>
+          <p:nvPr>
+            <p:ph type="body" sz="half" idx="15"/>
+          </p:nvPr>
+        </p:nvSpPr>
+        <p:spPr/>
+        <p:txBody>
+          <a:bodyPr>
+            <a:normAutofit/>
+          </a:bodyPr>
+          <a:lstStyle/>
+          <a:p>
+            <a:r>
+              <a:rPr lang="es-CR" sz="3200" dirty="0" smtClean="0"/>
+              <a:t>Una </a:t>
+            </a:r>
+            <a:r>
+              <a:rPr lang="es-CR" sz="3200" b="1" dirty="0" smtClean="0"/>
+              <a:t>Especificación por Ejemplos </a:t>
+            </a:r>
+            <a:r>
+              <a:rPr lang="es-CR" sz="3200" dirty="0" smtClean="0"/>
+              <a:t>es concreta.</a:t>
+            </a:r>
+            <a:endParaRPr lang="en-US" sz="3200" dirty="0"/>
+          </a:p>
+        </p:txBody>
+      </p:sp>
+      <p:sp>
+        <p:nvSpPr>
+          <p:cNvPr id="5" name="Text Placeholder 4"/>
+          <p:cNvSpPr>
+            <a:spLocks noGrp="1"/>
+          </p:cNvSpPr>
+          <p:nvPr>
+            <p:ph type="body" sz="quarter" idx="3"/>
+          </p:nvPr>
+        </p:nvSpPr>
+        <p:spPr/>
+        <p:txBody>
+          <a:bodyPr/>
+          <a:lstStyle/>
+          <a:p>
+            <a:r>
+              <a:rPr lang="es-CR" dirty="0" smtClean="0"/>
+              <a:t>Aislados</a:t>
+            </a:r>
+            <a:endParaRPr lang="en-US" dirty="0"/>
+          </a:p>
+        </p:txBody>
+      </p:sp>
+      <p:sp>
+        <p:nvSpPr>
+          <p:cNvPr id="6" name="Text Placeholder 5"/>
+          <p:cNvSpPr>
+            <a:spLocks noGrp="1"/>
+          </p:cNvSpPr>
+          <p:nvPr>
+            <p:ph type="body" sz="half" idx="16"/>
+          </p:nvPr>
+        </p:nvSpPr>
+        <p:spPr/>
+        <p:txBody>
+          <a:bodyPr>
+            <a:noAutofit/>
+          </a:bodyPr>
+          <a:lstStyle/>
+          <a:p>
+            <a:r>
+              <a:rPr lang="es-CR" sz="2800" dirty="0" smtClean="0"/>
+              <a:t>Los tres roles realizan la especificación </a:t>
+            </a:r>
+            <a:r>
+              <a:rPr lang="es-CR" sz="2800" b="1" dirty="0" smtClean="0"/>
+              <a:t>juntos</a:t>
+            </a:r>
+            <a:r>
+              <a:rPr lang="es-CR" sz="2800" dirty="0" smtClean="0"/>
+              <a:t>, y </a:t>
+            </a:r>
+            <a:r>
+              <a:rPr lang="es-CR" sz="2800" b="1" dirty="0" smtClean="0"/>
+              <a:t>comparten</a:t>
+            </a:r>
+            <a:r>
+              <a:rPr lang="es-CR" sz="2800" dirty="0" smtClean="0"/>
+              <a:t> los ejemplos en sus actividades.</a:t>
+            </a:r>
+            <a:endParaRPr lang="en-US" sz="2800" dirty="0"/>
+          </a:p>
+        </p:txBody>
+      </p:sp>
+      <p:sp>
+        <p:nvSpPr>
+          <p:cNvPr id="7" name="Text Placeholder 6"/>
+          <p:cNvSpPr>
+            <a:spLocks noGrp="1"/>
+          </p:cNvSpPr>
+          <p:nvPr>
+            <p:ph type="body" sz="quarter" idx="13"/>
+          </p:nvPr>
+        </p:nvSpPr>
+        <p:spPr>
+          <a:xfrm>
+            <a:off x="7888134" y="2603501"/>
+            <a:ext cx="4062565" cy="576262"/>
+          </a:xfrm>
+        </p:spPr>
+        <p:txBody>
+          <a:bodyPr/>
+          <a:lstStyle/>
+          <a:p>
+            <a:r>
+              <a:rPr lang="es-CR" dirty="0"/>
+              <a:t>Información accesible</a:t>
+            </a:r>
+            <a:endParaRPr lang="en-US" dirty="0"/>
+          </a:p>
+        </p:txBody>
+      </p:sp>
+      <p:sp>
+        <p:nvSpPr>
+          <p:cNvPr id="8" name="Text Placeholder 7"/>
+          <p:cNvSpPr>
+            <a:spLocks noGrp="1"/>
+          </p:cNvSpPr>
+          <p:nvPr>
+            <p:ph type="body" sz="half" idx="17"/>
+          </p:nvPr>
+        </p:nvSpPr>
+        <p:spPr/>
+        <p:txBody>
+          <a:bodyPr>
+            <a:normAutofit/>
+          </a:bodyPr>
+          <a:lstStyle/>
+          <a:p>
+            <a:r>
+              <a:rPr lang="es-CR" sz="2800" dirty="0" smtClean="0"/>
+              <a:t>Los ejemplos se automatizan sin cambiarlos y </a:t>
+            </a:r>
+            <a:r>
+              <a:rPr lang="es-CR" sz="2800" b="1" dirty="0" smtClean="0"/>
+              <a:t>son accesibles </a:t>
+            </a:r>
+            <a:r>
+              <a:rPr lang="es-CR" sz="2800" dirty="0" smtClean="0"/>
+              <a:t>por todos.</a:t>
+            </a:r>
+            <a:endParaRPr lang="en-US" sz="2800" dirty="0"/>
+          </a:p>
+        </p:txBody>
+      </p:sp>
+    </p:spTree>
+    <p:extLst>
+      <p:ext uri="{BB962C8B-B14F-4D97-AF65-F5344CB8AC3E}">
+        <p14:creationId xmlns:p14="http://schemas.microsoft.com/office/powerpoint/2010/main" val="3288590617"/>
+      </p:ext>
+    </p:extLst>
+  </p:cSld>
+  <p:clrMapOvr>
+    <a:masterClrMapping/>
+  </p:clrMapOvr>
+  <p:timing>
+    <p:tnLst>
+      <p:par>
+        <p:cTn id="1" dur="indefinite" restart="never" nodeType="tmRoot"/>
+      </p:par>
+    </p:tnLst>
+  </p:timing>
+</p:sld>
+</file>
+
+<file path=ppt/slides/slide21.xml><?xml version="1.0" encoding="utf-8"?>
+<p:sld xmlns:a="http://schemas.openxmlformats.org/drawingml/2006/main" xmlns:r="http://schemas.openxmlformats.org/officeDocument/2006/relationships" xmlns:p="http://schemas.openxmlformats.org/presentationml/2006/main">
+  <p:cSld>
+    <p:spTree>
+      <p:nvGrpSpPr>
+        <p:cNvPr id="1" name=""/>
+        <p:cNvGrpSpPr/>
+        <p:nvPr/>
+      </p:nvGrpSpPr>
+      <p:grpSpPr>
+        <a:xfrm>
+          <a:off x="0" y="0"/>
+          <a:ext cx="0" cy="0"/>
+          <a:chOff x="0" y="0"/>
+          <a:chExt cx="0" cy="0"/>
+        </a:xfrm>
+      </p:grpSpPr>
+      <p:sp>
+        <p:nvSpPr>
+          <p:cNvPr id="2" name="Title 1"/>
+          <p:cNvSpPr>
+            <a:spLocks noGrp="1"/>
+          </p:cNvSpPr>
+          <p:nvPr>
+            <p:ph type="title"/>
+          </p:nvPr>
+        </p:nvSpPr>
+        <p:spPr/>
+        <p:txBody>
+          <a:bodyPr/>
+          <a:lstStyle/>
+          <a:p>
+            <a:r>
               <a:rPr lang="es-CR" dirty="0" smtClean="0"/>
               <a:t>Bibliografía</a:t>
             </a:r>
@@ -23996,7 +24528,7 @@
 </p:sld>
 </file>
 
-<file path=ppt/slides/slide21.xml><?xml version="1.0" encoding="utf-8"?>
+<file path=ppt/slides/slide22.xml><?xml version="1.0" encoding="utf-8"?>
 <p:sld xmlns:a="http://schemas.openxmlformats.org/drawingml/2006/main" xmlns:r="http://schemas.openxmlformats.org/officeDocument/2006/relationships" xmlns:p="http://schemas.openxmlformats.org/presentationml/2006/main">
   <p:cSld>
     <p:spTree>
@@ -24186,7 +24718,7 @@
 </p:sld>
 </file>
 
-<file path=ppt/slides/slide22.xml><?xml version="1.0" encoding="utf-8"?>
+<file path=ppt/slides/slide23.xml><?xml version="1.0" encoding="utf-8"?>
 <p:sld xmlns:a="http://schemas.openxmlformats.org/drawingml/2006/main" xmlns:r="http://schemas.openxmlformats.org/officeDocument/2006/relationships" xmlns:p="http://schemas.openxmlformats.org/presentationml/2006/main">
   <p:cSld>
     <p:spTree>
@@ -25535,7 +26067,19 @@
           <a:p>
             <a:r>
               <a:rPr lang="es-CR" sz="3600" dirty="0" smtClean="0"/>
-              <a:t>Se debe poder ofrecer entregas gratuitas a clientes cuando compran un monto dado.</a:t>
+              <a:t>Se </a:t>
+            </a:r>
+            <a:r>
+              <a:rPr lang="es-CR" sz="3600" dirty="0" smtClean="0"/>
+              <a:t>puede ofrecer </a:t>
+            </a:r>
+            <a:r>
+              <a:rPr lang="es-CR" sz="3600" dirty="0" smtClean="0"/>
+              <a:t>entregas gratuitas a clientes </a:t>
+            </a:r>
+            <a:r>
+              <a:rPr lang="es-CR" sz="3600" dirty="0" smtClean="0"/>
+              <a:t>según sus compras.</a:t>
             </a:r>
             <a:endParaRPr lang="es-CR" sz="3600" dirty="0"/>
           </a:p>
@@ -25656,17 +26200,19 @@
             </a:pPr>
             <a:r>
               <a:rPr lang="es-CR" sz="2400" dirty="0" smtClean="0"/>
-              <a:t>Todos los productos.</a:t>
-            </a:r>
-          </a:p>
-          <a:p>
-            <a:pPr marL="285750" indent="-285750">
-              <a:buFont typeface="Arial" panose="020B0604020202020204" pitchFamily="34" charset="0"/>
-              <a:buChar char="•"/>
-            </a:pPr>
+              <a:t>Haré que funcione para todos </a:t>
+            </a:r>
             <a:r>
               <a:rPr lang="es-CR" sz="2400" dirty="0" smtClean="0"/>
-              <a:t>Todos los clientes.</a:t>
+              <a:t>los </a:t>
+            </a:r>
+            <a:r>
+              <a:rPr lang="es-CR" sz="2400" dirty="0" smtClean="0"/>
+              <a:t>productos y todos </a:t>
+            </a:r>
+            <a:r>
+              <a:rPr lang="es-CR" sz="2400" dirty="0" smtClean="0"/>
+              <a:t>los clientes.</a:t>
             </a:r>
             <a:endParaRPr lang="es-CR" sz="2400" dirty="0"/>
           </a:p>
@@ -25727,10 +26273,10 @@
               <a:buChar char="•"/>
             </a:pPr>
             <a:r>
-              <a:rPr lang="es-CR" sz="2800" dirty="0" smtClean="0"/>
-              <a:t>¿Funcionará para lavadoras y libros?</a:t>
-            </a:r>
-            <a:endParaRPr lang="es-CR" sz="2800" dirty="0"/>
+              <a:rPr lang="es-CR" sz="2400" dirty="0" smtClean="0"/>
+              <a:t>Probaré si ofrece entregas gratis para mil lavadoras.</a:t>
+            </a:r>
+            <a:endParaRPr lang="es-CR" sz="2400" dirty="0"/>
           </a:p>
         </p:txBody>
       </p:sp>
@@ -25864,7 +26410,7 @@
         </p:blipFill>
         <p:spPr bwMode="auto">
           <a:xfrm>
-            <a:off x="1083529" y="4818820"/>
+            <a:off x="1165417" y="4818820"/>
             <a:ext cx="2996345" cy="2039180"/>
           </a:xfrm>
           <a:prstGeom prst="rect">
@@ -26072,11 +26618,7 @@
                                           </p:stCondLst>
                                         </p:cTn>
                                         <p:tgtEl>
-                                          <p:spTgt spid="4">
-                                            <p:txEl>
-                                              <p:pRg st="1" end="1"/>
-                                            </p:txEl>
-                                          </p:spTgt>
+                                          <p:spTgt spid="1026"/>
                                         </p:tgtEl>
                                         <p:attrNameLst>
                                           <p:attrName>style.visibility</p:attrName>
@@ -26121,7 +26663,11 @@
                                           </p:stCondLst>
                                         </p:cTn>
                                         <p:tgtEl>
-                                          <p:spTgt spid="1026"/>
+                                          <p:spTgt spid="6">
+                                            <p:txEl>
+                                              <p:pRg st="0" end="0"/>
+                                            </p:txEl>
+                                          </p:spTgt>
                                         </p:tgtEl>
                                         <p:attrNameLst>
                                           <p:attrName>style.visibility</p:attrName>
@@ -26166,11 +26712,7 @@
                                           </p:stCondLst>
                                         </p:cTn>
                                         <p:tgtEl>
-                                          <p:spTgt spid="6">
-                                            <p:txEl>
-                                              <p:pRg st="0" end="0"/>
-                                            </p:txEl>
-                                          </p:spTgt>
+                                          <p:spTgt spid="1029"/>
                                         </p:tgtEl>
                                         <p:attrNameLst>
                                           <p:attrName>style.visibility</p:attrName>
@@ -26210,51 +26752,6 @@
                                     <p:set>
                                       <p:cBhvr>
                                         <p:cTn id="26" dur="1" fill="hold">
-                                          <p:stCondLst>
-                                            <p:cond delay="0"/>
-                                          </p:stCondLst>
-                                        </p:cTn>
-                                        <p:tgtEl>
-                                          <p:spTgt spid="1029"/>
-                                        </p:tgtEl>
-                                        <p:attrNameLst>
-                                          <p:attrName>style.visibility</p:attrName>
-                                        </p:attrNameLst>
-                                      </p:cBhvr>
-                                      <p:to>
-                                        <p:strVal val="visible"/>
-                                      </p:to>
-                                    </p:set>
-                                  </p:childTnLst>
-                                </p:cTn>
-                              </p:par>
-                            </p:childTnLst>
-                          </p:cTn>
-                        </p:par>
-                      </p:childTnLst>
-                    </p:cTn>
-                  </p:par>
-                  <p:par>
-                    <p:cTn id="27" fill="hold">
-                      <p:stCondLst>
-                        <p:cond delay="indefinite"/>
-                      </p:stCondLst>
-                      <p:childTnLst>
-                        <p:par>
-                          <p:cTn id="28" fill="hold">
-                            <p:stCondLst>
-                              <p:cond delay="0"/>
-                            </p:stCondLst>
-                            <p:childTnLst>
-                              <p:par>
-                                <p:cTn id="29" presetID="1" presetClass="entr" presetSubtype="0" fill="hold" nodeType="clickEffect">
-                                  <p:stCondLst>
-                                    <p:cond delay="0"/>
-                                  </p:stCondLst>
-                                  <p:childTnLst>
-                                    <p:set>
-                                      <p:cBhvr>
-                                        <p:cTn id="30" dur="1" fill="hold">
                                           <p:stCondLst>
                                             <p:cond delay="0"/>
                                           </p:stCondLst>
@@ -28030,7 +28527,7 @@
   <a:extraClrSchemeLst/>
   <a:extLst>
     <a:ext uri="{05A4C25C-085E-4340-85A3-A5531E510DB2}">
-      <thm15:themeFamily xmlns:thm15="http://schemas.microsoft.com/office/thememl/2012/main" xmlns="" name="Ion Boardroom" id="{FC33163D-4339-46B1-8EED-24C834239D99}" vid="{B8502691-933B-45FE-8764-BA278511EF27}"/>
+      <thm15:themeFamily xmlns="" xmlns:thm15="http://schemas.microsoft.com/office/thememl/2012/main" name="Ion Boardroom" id="{FC33163D-4339-46B1-8EED-24C834239D99}" vid="{B8502691-933B-45FE-8764-BA278511EF27}"/>
     </a:ext>
   </a:extLst>
 </a:theme>
@@ -28291,7 +28788,7 @@
   <a:extraClrSchemeLst/>
   <a:extLst>
     <a:ext uri="{05A4C25C-085E-4340-85A3-A5531E510DB2}">
-      <thm15:themeFamily xmlns:thm15="http://schemas.microsoft.com/office/thememl/2012/main" xmlns="" name="Office Theme" id="{62F939B6-93AF-4DB8-9C6B-D6C7DFDC589F}" vid="{4A3C46E8-61CC-4603-A589-7422A47A8E4A}"/>
+      <thm15:themeFamily xmlns="" xmlns:thm15="http://schemas.microsoft.com/office/thememl/2012/main" name="Office Theme" id="{62F939B6-93AF-4DB8-9C6B-D6C7DFDC589F}" vid="{4A3C46E8-61CC-4603-A589-7422A47A8E4A}"/>
     </a:ext>
   </a:extLst>
 </a:theme>

</xml_diff>

<commit_message>
Agrego ejemplo refinado con multiples tipos de producto en la orden
</commit_message>
<xml_diff>
--- a/Especificacion por Ejemplos.pptx
+++ b/Especificacion por Ejemplos.pptx
@@ -26,7 +26,7 @@
     <p:sldId id="306" r:id="rId17"/>
     <p:sldId id="305" r:id="rId18"/>
     <p:sldId id="307" r:id="rId19"/>
-    <p:sldId id="274" r:id="rId20"/>
+    <p:sldId id="309" r:id="rId20"/>
     <p:sldId id="279" r:id="rId21"/>
     <p:sldId id="280" r:id="rId22"/>
     <p:sldId id="298" r:id="rId23"/>
@@ -160,7 +160,7 @@
             <p14:sldId id="306"/>
             <p14:sldId id="305"/>
             <p14:sldId id="307"/>
-            <p14:sldId id="274"/>
+            <p14:sldId id="309"/>
             <p14:sldId id="279"/>
             <p14:sldId id="280"/>
             <p14:sldId id="298"/>
@@ -177,753 +177,6 @@
 </file>
 
 <file path=ppt/diagrams/colors1.xml><?xml version="1.0" encoding="utf-8"?>
-<dgm:colorsDef xmlns:dgm="http://schemas.openxmlformats.org/drawingml/2006/diagram" xmlns:a="http://schemas.openxmlformats.org/drawingml/2006/main" uniqueId="urn:microsoft.com/office/officeart/2005/8/colors/accent3_2">
-  <dgm:title val=""/>
-  <dgm:desc val=""/>
-  <dgm:catLst>
-    <dgm:cat type="accent3" pri="11200"/>
-  </dgm:catLst>
-  <dgm:styleLbl name="node0">
-    <dgm:fillClrLst meth="repeat">
-      <a:schemeClr val="accent3"/>
-    </dgm:fillClrLst>
-    <dgm:linClrLst meth="repeat">
-      <a:schemeClr val="lt1"/>
-    </dgm:linClrLst>
-    <dgm:effectClrLst/>
-    <dgm:txLinClrLst/>
-    <dgm:txFillClrLst/>
-    <dgm:txEffectClrLst/>
-  </dgm:styleLbl>
-  <dgm:styleLbl name="node1">
-    <dgm:fillClrLst meth="repeat">
-      <a:schemeClr val="accent3"/>
-    </dgm:fillClrLst>
-    <dgm:linClrLst meth="repeat">
-      <a:schemeClr val="lt1"/>
-    </dgm:linClrLst>
-    <dgm:effectClrLst/>
-    <dgm:txLinClrLst/>
-    <dgm:txFillClrLst/>
-    <dgm:txEffectClrLst/>
-  </dgm:styleLbl>
-  <dgm:styleLbl name="alignNode1">
-    <dgm:fillClrLst meth="repeat">
-      <a:schemeClr val="accent3"/>
-    </dgm:fillClrLst>
-    <dgm:linClrLst meth="repeat">
-      <a:schemeClr val="accent3"/>
-    </dgm:linClrLst>
-    <dgm:effectClrLst/>
-    <dgm:txLinClrLst/>
-    <dgm:txFillClrLst/>
-    <dgm:txEffectClrLst/>
-  </dgm:styleLbl>
-  <dgm:styleLbl name="lnNode1">
-    <dgm:fillClrLst meth="repeat">
-      <a:schemeClr val="accent3"/>
-    </dgm:fillClrLst>
-    <dgm:linClrLst meth="repeat">
-      <a:schemeClr val="lt1"/>
-    </dgm:linClrLst>
-    <dgm:effectClrLst/>
-    <dgm:txLinClrLst/>
-    <dgm:txFillClrLst/>
-    <dgm:txEffectClrLst/>
-  </dgm:styleLbl>
-  <dgm:styleLbl name="vennNode1">
-    <dgm:fillClrLst meth="repeat">
-      <a:schemeClr val="accent3">
-        <a:alpha val="50000"/>
-      </a:schemeClr>
-    </dgm:fillClrLst>
-    <dgm:linClrLst meth="repeat">
-      <a:schemeClr val="lt1"/>
-    </dgm:linClrLst>
-    <dgm:effectClrLst/>
-    <dgm:txLinClrLst/>
-    <dgm:txFillClrLst/>
-    <dgm:txEffectClrLst/>
-  </dgm:styleLbl>
-  <dgm:styleLbl name="node2">
-    <dgm:fillClrLst meth="repeat">
-      <a:schemeClr val="accent3"/>
-    </dgm:fillClrLst>
-    <dgm:linClrLst meth="repeat">
-      <a:schemeClr val="lt1"/>
-    </dgm:linClrLst>
-    <dgm:effectClrLst/>
-    <dgm:txLinClrLst/>
-    <dgm:txFillClrLst/>
-    <dgm:txEffectClrLst/>
-  </dgm:styleLbl>
-  <dgm:styleLbl name="node3">
-    <dgm:fillClrLst meth="repeat">
-      <a:schemeClr val="accent3"/>
-    </dgm:fillClrLst>
-    <dgm:linClrLst meth="repeat">
-      <a:schemeClr val="lt1"/>
-    </dgm:linClrLst>
-    <dgm:effectClrLst/>
-    <dgm:txLinClrLst/>
-    <dgm:txFillClrLst/>
-    <dgm:txEffectClrLst/>
-  </dgm:styleLbl>
-  <dgm:styleLbl name="node4">
-    <dgm:fillClrLst meth="repeat">
-      <a:schemeClr val="accent3"/>
-    </dgm:fillClrLst>
-    <dgm:linClrLst meth="repeat">
-      <a:schemeClr val="lt1"/>
-    </dgm:linClrLst>
-    <dgm:effectClrLst/>
-    <dgm:txLinClrLst/>
-    <dgm:txFillClrLst/>
-    <dgm:txEffectClrLst/>
-  </dgm:styleLbl>
-  <dgm:styleLbl name="fgImgPlace1">
-    <dgm:fillClrLst meth="repeat">
-      <a:schemeClr val="accent3">
-        <a:tint val="50000"/>
-      </a:schemeClr>
-    </dgm:fillClrLst>
-    <dgm:linClrLst meth="repeat">
-      <a:schemeClr val="lt1"/>
-    </dgm:linClrLst>
-    <dgm:effectClrLst/>
-    <dgm:txLinClrLst/>
-    <dgm:txFillClrLst meth="repeat">
-      <a:schemeClr val="lt1"/>
-    </dgm:txFillClrLst>
-    <dgm:txEffectClrLst/>
-  </dgm:styleLbl>
-  <dgm:styleLbl name="alignImgPlace1">
-    <dgm:fillClrLst meth="repeat">
-      <a:schemeClr val="accent3">
-        <a:tint val="50000"/>
-      </a:schemeClr>
-    </dgm:fillClrLst>
-    <dgm:linClrLst meth="repeat">
-      <a:schemeClr val="lt1"/>
-    </dgm:linClrLst>
-    <dgm:effectClrLst/>
-    <dgm:txLinClrLst/>
-    <dgm:txFillClrLst meth="repeat">
-      <a:schemeClr val="lt1"/>
-    </dgm:txFillClrLst>
-    <dgm:txEffectClrLst/>
-  </dgm:styleLbl>
-  <dgm:styleLbl name="bgImgPlace1">
-    <dgm:fillClrLst meth="repeat">
-      <a:schemeClr val="accent3">
-        <a:tint val="50000"/>
-      </a:schemeClr>
-    </dgm:fillClrLst>
-    <dgm:linClrLst meth="repeat">
-      <a:schemeClr val="lt1"/>
-    </dgm:linClrLst>
-    <dgm:effectClrLst/>
-    <dgm:txLinClrLst/>
-    <dgm:txFillClrLst meth="repeat">
-      <a:schemeClr val="lt1"/>
-    </dgm:txFillClrLst>
-    <dgm:txEffectClrLst/>
-  </dgm:styleLbl>
-  <dgm:styleLbl name="sibTrans2D1">
-    <dgm:fillClrLst meth="repeat">
-      <a:schemeClr val="accent3">
-        <a:tint val="60000"/>
-      </a:schemeClr>
-    </dgm:fillClrLst>
-    <dgm:linClrLst meth="repeat">
-      <a:schemeClr val="accent3">
-        <a:tint val="60000"/>
-      </a:schemeClr>
-    </dgm:linClrLst>
-    <dgm:effectClrLst/>
-    <dgm:txLinClrLst/>
-    <dgm:txFillClrLst/>
-    <dgm:txEffectClrLst/>
-  </dgm:styleLbl>
-  <dgm:styleLbl name="fgSibTrans2D1">
-    <dgm:fillClrLst meth="repeat">
-      <a:schemeClr val="accent3">
-        <a:tint val="60000"/>
-      </a:schemeClr>
-    </dgm:fillClrLst>
-    <dgm:linClrLst meth="repeat">
-      <a:schemeClr val="accent3">
-        <a:tint val="60000"/>
-      </a:schemeClr>
-    </dgm:linClrLst>
-    <dgm:effectClrLst/>
-    <dgm:txLinClrLst/>
-    <dgm:txFillClrLst/>
-    <dgm:txEffectClrLst/>
-  </dgm:styleLbl>
-  <dgm:styleLbl name="bgSibTrans2D1">
-    <dgm:fillClrLst meth="repeat">
-      <a:schemeClr val="accent3">
-        <a:tint val="60000"/>
-      </a:schemeClr>
-    </dgm:fillClrLst>
-    <dgm:linClrLst meth="repeat">
-      <a:schemeClr val="accent3">
-        <a:tint val="60000"/>
-      </a:schemeClr>
-    </dgm:linClrLst>
-    <dgm:effectClrLst/>
-    <dgm:txLinClrLst/>
-    <dgm:txFillClrLst/>
-    <dgm:txEffectClrLst/>
-  </dgm:styleLbl>
-  <dgm:styleLbl name="sibTrans1D1">
-    <dgm:fillClrLst meth="repeat">
-      <a:schemeClr val="accent3"/>
-    </dgm:fillClrLst>
-    <dgm:linClrLst meth="repeat">
-      <a:schemeClr val="accent3"/>
-    </dgm:linClrLst>
-    <dgm:effectClrLst/>
-    <dgm:txLinClrLst/>
-    <dgm:txFillClrLst meth="repeat">
-      <a:schemeClr val="tx1"/>
-    </dgm:txFillClrLst>
-    <dgm:txEffectClrLst/>
-  </dgm:styleLbl>
-  <dgm:styleLbl name="callout">
-    <dgm:fillClrLst meth="repeat">
-      <a:schemeClr val="accent3"/>
-    </dgm:fillClrLst>
-    <dgm:linClrLst meth="repeat">
-      <a:schemeClr val="accent3">
-        <a:tint val="50000"/>
-      </a:schemeClr>
-    </dgm:linClrLst>
-    <dgm:effectClrLst/>
-    <dgm:txLinClrLst/>
-    <dgm:txFillClrLst meth="repeat">
-      <a:schemeClr val="tx1"/>
-    </dgm:txFillClrLst>
-    <dgm:txEffectClrLst/>
-  </dgm:styleLbl>
-  <dgm:styleLbl name="asst0">
-    <dgm:fillClrLst meth="repeat">
-      <a:schemeClr val="accent3"/>
-    </dgm:fillClrLst>
-    <dgm:linClrLst meth="repeat">
-      <a:schemeClr val="lt1"/>
-    </dgm:linClrLst>
-    <dgm:effectClrLst/>
-    <dgm:txLinClrLst/>
-    <dgm:txFillClrLst/>
-    <dgm:txEffectClrLst/>
-  </dgm:styleLbl>
-  <dgm:styleLbl name="asst1">
-    <dgm:fillClrLst meth="repeat">
-      <a:schemeClr val="accent3"/>
-    </dgm:fillClrLst>
-    <dgm:linClrLst meth="repeat">
-      <a:schemeClr val="lt1"/>
-    </dgm:linClrLst>
-    <dgm:effectClrLst/>
-    <dgm:txLinClrLst/>
-    <dgm:txFillClrLst/>
-    <dgm:txEffectClrLst/>
-  </dgm:styleLbl>
-  <dgm:styleLbl name="asst2">
-    <dgm:fillClrLst meth="repeat">
-      <a:schemeClr val="accent3"/>
-    </dgm:fillClrLst>
-    <dgm:linClrLst meth="repeat">
-      <a:schemeClr val="lt1"/>
-    </dgm:linClrLst>
-    <dgm:effectClrLst/>
-    <dgm:txLinClrLst/>
-    <dgm:txFillClrLst/>
-    <dgm:txEffectClrLst/>
-  </dgm:styleLbl>
-  <dgm:styleLbl name="asst3">
-    <dgm:fillClrLst meth="repeat">
-      <a:schemeClr val="accent3"/>
-    </dgm:fillClrLst>
-    <dgm:linClrLst meth="repeat">
-      <a:schemeClr val="lt1"/>
-    </dgm:linClrLst>
-    <dgm:effectClrLst/>
-    <dgm:txLinClrLst/>
-    <dgm:txFillClrLst/>
-    <dgm:txEffectClrLst/>
-  </dgm:styleLbl>
-  <dgm:styleLbl name="asst4">
-    <dgm:fillClrLst meth="repeat">
-      <a:schemeClr val="accent3"/>
-    </dgm:fillClrLst>
-    <dgm:linClrLst meth="repeat">
-      <a:schemeClr val="lt1"/>
-    </dgm:linClrLst>
-    <dgm:effectClrLst/>
-    <dgm:txLinClrLst/>
-    <dgm:txFillClrLst/>
-    <dgm:txEffectClrLst/>
-  </dgm:styleLbl>
-  <dgm:styleLbl name="parChTrans2D1">
-    <dgm:fillClrLst meth="repeat">
-      <a:schemeClr val="accent3">
-        <a:tint val="60000"/>
-      </a:schemeClr>
-    </dgm:fillClrLst>
-    <dgm:linClrLst meth="repeat">
-      <a:schemeClr val="accent3">
-        <a:tint val="60000"/>
-      </a:schemeClr>
-    </dgm:linClrLst>
-    <dgm:effectClrLst/>
-    <dgm:txLinClrLst/>
-    <dgm:txFillClrLst meth="repeat">
-      <a:schemeClr val="lt1"/>
-    </dgm:txFillClrLst>
-    <dgm:txEffectClrLst/>
-  </dgm:styleLbl>
-  <dgm:styleLbl name="parChTrans2D2">
-    <dgm:fillClrLst meth="repeat">
-      <a:schemeClr val="accent3"/>
-    </dgm:fillClrLst>
-    <dgm:linClrLst meth="repeat">
-      <a:schemeClr val="accent3"/>
-    </dgm:linClrLst>
-    <dgm:effectClrLst/>
-    <dgm:txLinClrLst/>
-    <dgm:txFillClrLst meth="repeat">
-      <a:schemeClr val="lt1"/>
-    </dgm:txFillClrLst>
-    <dgm:txEffectClrLst/>
-  </dgm:styleLbl>
-  <dgm:styleLbl name="parChTrans2D3">
-    <dgm:fillClrLst meth="repeat">
-      <a:schemeClr val="accent3"/>
-    </dgm:fillClrLst>
-    <dgm:linClrLst meth="repeat">
-      <a:schemeClr val="accent3"/>
-    </dgm:linClrLst>
-    <dgm:effectClrLst/>
-    <dgm:txLinClrLst/>
-    <dgm:txFillClrLst meth="repeat">
-      <a:schemeClr val="lt1"/>
-    </dgm:txFillClrLst>
-    <dgm:txEffectClrLst/>
-  </dgm:styleLbl>
-  <dgm:styleLbl name="parChTrans2D4">
-    <dgm:fillClrLst meth="repeat">
-      <a:schemeClr val="accent3"/>
-    </dgm:fillClrLst>
-    <dgm:linClrLst meth="repeat">
-      <a:schemeClr val="accent3"/>
-    </dgm:linClrLst>
-    <dgm:effectClrLst/>
-    <dgm:txLinClrLst/>
-    <dgm:txFillClrLst meth="repeat">
-      <a:schemeClr val="lt1"/>
-    </dgm:txFillClrLst>
-    <dgm:txEffectClrLst/>
-  </dgm:styleLbl>
-  <dgm:styleLbl name="parChTrans1D1">
-    <dgm:fillClrLst meth="repeat">
-      <a:schemeClr val="accent3"/>
-    </dgm:fillClrLst>
-    <dgm:linClrLst meth="repeat">
-      <a:schemeClr val="accent3">
-        <a:shade val="60000"/>
-      </a:schemeClr>
-    </dgm:linClrLst>
-    <dgm:effectClrLst/>
-    <dgm:txLinClrLst/>
-    <dgm:txFillClrLst meth="repeat">
-      <a:schemeClr val="tx1"/>
-    </dgm:txFillClrLst>
-    <dgm:txEffectClrLst/>
-  </dgm:styleLbl>
-  <dgm:styleLbl name="parChTrans1D2">
-    <dgm:fillClrLst meth="repeat">
-      <a:schemeClr val="accent3"/>
-    </dgm:fillClrLst>
-    <dgm:linClrLst meth="repeat">
-      <a:schemeClr val="accent3">
-        <a:shade val="60000"/>
-      </a:schemeClr>
-    </dgm:linClrLst>
-    <dgm:effectClrLst/>
-    <dgm:txLinClrLst/>
-    <dgm:txFillClrLst meth="repeat">
-      <a:schemeClr val="tx1"/>
-    </dgm:txFillClrLst>
-    <dgm:txEffectClrLst/>
-  </dgm:styleLbl>
-  <dgm:styleLbl name="parChTrans1D3">
-    <dgm:fillClrLst meth="repeat">
-      <a:schemeClr val="accent3"/>
-    </dgm:fillClrLst>
-    <dgm:linClrLst meth="repeat">
-      <a:schemeClr val="accent3">
-        <a:shade val="80000"/>
-      </a:schemeClr>
-    </dgm:linClrLst>
-    <dgm:effectClrLst/>
-    <dgm:txLinClrLst/>
-    <dgm:txFillClrLst meth="repeat">
-      <a:schemeClr val="tx1"/>
-    </dgm:txFillClrLst>
-    <dgm:txEffectClrLst/>
-  </dgm:styleLbl>
-  <dgm:styleLbl name="parChTrans1D4">
-    <dgm:fillClrLst meth="repeat">
-      <a:schemeClr val="accent3"/>
-    </dgm:fillClrLst>
-    <dgm:linClrLst meth="repeat">
-      <a:schemeClr val="accent3">
-        <a:shade val="80000"/>
-      </a:schemeClr>
-    </dgm:linClrLst>
-    <dgm:effectClrLst/>
-    <dgm:txLinClrLst/>
-    <dgm:txFillClrLst meth="repeat">
-      <a:schemeClr val="tx1"/>
-    </dgm:txFillClrLst>
-    <dgm:txEffectClrLst/>
-  </dgm:styleLbl>
-  <dgm:styleLbl name="fgAcc1">
-    <dgm:fillClrLst meth="repeat">
-      <a:schemeClr val="lt1">
-        <a:alpha val="90000"/>
-      </a:schemeClr>
-    </dgm:fillClrLst>
-    <dgm:linClrLst meth="repeat">
-      <a:schemeClr val="accent3"/>
-    </dgm:linClrLst>
-    <dgm:effectClrLst/>
-    <dgm:txLinClrLst/>
-    <dgm:txFillClrLst meth="repeat">
-      <a:schemeClr val="dk1"/>
-    </dgm:txFillClrLst>
-    <dgm:txEffectClrLst/>
-  </dgm:styleLbl>
-  <dgm:styleLbl name="conFgAcc1">
-    <dgm:fillClrLst meth="repeat">
-      <a:schemeClr val="lt1">
-        <a:alpha val="90000"/>
-      </a:schemeClr>
-    </dgm:fillClrLst>
-    <dgm:linClrLst meth="repeat">
-      <a:schemeClr val="accent3"/>
-    </dgm:linClrLst>
-    <dgm:effectClrLst/>
-    <dgm:txLinClrLst/>
-    <dgm:txFillClrLst meth="repeat">
-      <a:schemeClr val="dk1"/>
-    </dgm:txFillClrLst>
-    <dgm:txEffectClrLst/>
-  </dgm:styleLbl>
-  <dgm:styleLbl name="alignAcc1">
-    <dgm:fillClrLst meth="repeat">
-      <a:schemeClr val="lt1">
-        <a:alpha val="90000"/>
-      </a:schemeClr>
-    </dgm:fillClrLst>
-    <dgm:linClrLst meth="repeat">
-      <a:schemeClr val="accent3"/>
-    </dgm:linClrLst>
-    <dgm:effectClrLst/>
-    <dgm:txLinClrLst/>
-    <dgm:txFillClrLst meth="repeat">
-      <a:schemeClr val="dk1"/>
-    </dgm:txFillClrLst>
-    <dgm:txEffectClrLst/>
-  </dgm:styleLbl>
-  <dgm:styleLbl name="trAlignAcc1">
-    <dgm:fillClrLst meth="repeat">
-      <a:schemeClr val="lt1">
-        <a:alpha val="40000"/>
-      </a:schemeClr>
-    </dgm:fillClrLst>
-    <dgm:linClrLst meth="repeat">
-      <a:schemeClr val="accent3"/>
-    </dgm:linClrLst>
-    <dgm:effectClrLst/>
-    <dgm:txLinClrLst/>
-    <dgm:txFillClrLst meth="repeat">
-      <a:schemeClr val="dk1"/>
-    </dgm:txFillClrLst>
-    <dgm:txEffectClrLst/>
-  </dgm:styleLbl>
-  <dgm:styleLbl name="bgAcc1">
-    <dgm:fillClrLst meth="repeat">
-      <a:schemeClr val="lt1">
-        <a:alpha val="90000"/>
-      </a:schemeClr>
-    </dgm:fillClrLst>
-    <dgm:linClrLst meth="repeat">
-      <a:schemeClr val="accent3"/>
-    </dgm:linClrLst>
-    <dgm:effectClrLst/>
-    <dgm:txLinClrLst/>
-    <dgm:txFillClrLst meth="repeat">
-      <a:schemeClr val="dk1"/>
-    </dgm:txFillClrLst>
-    <dgm:txEffectClrLst/>
-  </dgm:styleLbl>
-  <dgm:styleLbl name="solidFgAcc1">
-    <dgm:fillClrLst meth="repeat">
-      <a:schemeClr val="lt1"/>
-    </dgm:fillClrLst>
-    <dgm:linClrLst meth="repeat">
-      <a:schemeClr val="accent3"/>
-    </dgm:linClrLst>
-    <dgm:effectClrLst/>
-    <dgm:txLinClrLst/>
-    <dgm:txFillClrLst meth="repeat">
-      <a:schemeClr val="dk1"/>
-    </dgm:txFillClrLst>
-    <dgm:txEffectClrLst/>
-  </dgm:styleLbl>
-  <dgm:styleLbl name="solidAlignAcc1">
-    <dgm:fillClrLst meth="repeat">
-      <a:schemeClr val="lt1"/>
-    </dgm:fillClrLst>
-    <dgm:linClrLst meth="repeat">
-      <a:schemeClr val="accent3"/>
-    </dgm:linClrLst>
-    <dgm:effectClrLst/>
-    <dgm:txLinClrLst/>
-    <dgm:txFillClrLst meth="repeat">
-      <a:schemeClr val="dk1"/>
-    </dgm:txFillClrLst>
-    <dgm:txEffectClrLst/>
-  </dgm:styleLbl>
-  <dgm:styleLbl name="solidBgAcc1">
-    <dgm:fillClrLst meth="repeat">
-      <a:schemeClr val="lt1"/>
-    </dgm:fillClrLst>
-    <dgm:linClrLst meth="repeat">
-      <a:schemeClr val="accent3"/>
-    </dgm:linClrLst>
-    <dgm:effectClrLst/>
-    <dgm:txLinClrLst/>
-    <dgm:txFillClrLst meth="repeat">
-      <a:schemeClr val="dk1"/>
-    </dgm:txFillClrLst>
-    <dgm:txEffectClrLst/>
-  </dgm:styleLbl>
-  <dgm:styleLbl name="fgAccFollowNode1">
-    <dgm:fillClrLst meth="repeat">
-      <a:schemeClr val="accent3">
-        <a:alpha val="90000"/>
-        <a:tint val="40000"/>
-      </a:schemeClr>
-    </dgm:fillClrLst>
-    <dgm:linClrLst meth="repeat">
-      <a:schemeClr val="accent3">
-        <a:alpha val="90000"/>
-        <a:tint val="40000"/>
-      </a:schemeClr>
-    </dgm:linClrLst>
-    <dgm:effectClrLst/>
-    <dgm:txLinClrLst/>
-    <dgm:txFillClrLst meth="repeat">
-      <a:schemeClr val="dk1"/>
-    </dgm:txFillClrLst>
-    <dgm:txEffectClrLst/>
-  </dgm:styleLbl>
-  <dgm:styleLbl name="alignAccFollowNode1">
-    <dgm:fillClrLst meth="repeat">
-      <a:schemeClr val="accent3">
-        <a:alpha val="90000"/>
-        <a:tint val="40000"/>
-      </a:schemeClr>
-    </dgm:fillClrLst>
-    <dgm:linClrLst meth="repeat">
-      <a:schemeClr val="accent3">
-        <a:alpha val="90000"/>
-        <a:tint val="40000"/>
-      </a:schemeClr>
-    </dgm:linClrLst>
-    <dgm:effectClrLst/>
-    <dgm:txLinClrLst/>
-    <dgm:txFillClrLst meth="repeat">
-      <a:schemeClr val="dk1"/>
-    </dgm:txFillClrLst>
-    <dgm:txEffectClrLst/>
-  </dgm:styleLbl>
-  <dgm:styleLbl name="bgAccFollowNode1">
-    <dgm:fillClrLst meth="repeat">
-      <a:schemeClr val="accent3">
-        <a:alpha val="90000"/>
-        <a:tint val="40000"/>
-      </a:schemeClr>
-    </dgm:fillClrLst>
-    <dgm:linClrLst meth="repeat">
-      <a:schemeClr val="accent3">
-        <a:alpha val="90000"/>
-        <a:tint val="40000"/>
-      </a:schemeClr>
-    </dgm:linClrLst>
-    <dgm:effectClrLst/>
-    <dgm:txLinClrLst/>
-    <dgm:txFillClrLst meth="repeat">
-      <a:schemeClr val="dk1"/>
-    </dgm:txFillClrLst>
-    <dgm:txEffectClrLst/>
-  </dgm:styleLbl>
-  <dgm:styleLbl name="fgAcc0">
-    <dgm:fillClrLst meth="repeat">
-      <a:schemeClr val="lt1">
-        <a:alpha val="90000"/>
-      </a:schemeClr>
-    </dgm:fillClrLst>
-    <dgm:linClrLst meth="repeat">
-      <a:schemeClr val="accent3"/>
-    </dgm:linClrLst>
-    <dgm:effectClrLst/>
-    <dgm:txLinClrLst/>
-    <dgm:txFillClrLst meth="repeat">
-      <a:schemeClr val="dk1"/>
-    </dgm:txFillClrLst>
-    <dgm:txEffectClrLst/>
-  </dgm:styleLbl>
-  <dgm:styleLbl name="fgAcc2">
-    <dgm:fillClrLst meth="repeat">
-      <a:schemeClr val="lt1">
-        <a:alpha val="90000"/>
-      </a:schemeClr>
-    </dgm:fillClrLst>
-    <dgm:linClrLst meth="repeat">
-      <a:schemeClr val="accent3"/>
-    </dgm:linClrLst>
-    <dgm:effectClrLst/>
-    <dgm:txLinClrLst/>
-    <dgm:txFillClrLst meth="repeat">
-      <a:schemeClr val="dk1"/>
-    </dgm:txFillClrLst>
-    <dgm:txEffectClrLst/>
-  </dgm:styleLbl>
-  <dgm:styleLbl name="fgAcc3">
-    <dgm:fillClrLst meth="repeat">
-      <a:schemeClr val="lt1">
-        <a:alpha val="90000"/>
-      </a:schemeClr>
-    </dgm:fillClrLst>
-    <dgm:linClrLst meth="repeat">
-      <a:schemeClr val="accent3"/>
-    </dgm:linClrLst>
-    <dgm:effectClrLst/>
-    <dgm:txLinClrLst/>
-    <dgm:txFillClrLst meth="repeat">
-      <a:schemeClr val="dk1"/>
-    </dgm:txFillClrLst>
-    <dgm:txEffectClrLst/>
-  </dgm:styleLbl>
-  <dgm:styleLbl name="fgAcc4">
-    <dgm:fillClrLst meth="repeat">
-      <a:schemeClr val="lt1">
-        <a:alpha val="90000"/>
-      </a:schemeClr>
-    </dgm:fillClrLst>
-    <dgm:linClrLst meth="repeat">
-      <a:schemeClr val="accent3"/>
-    </dgm:linClrLst>
-    <dgm:effectClrLst/>
-    <dgm:txLinClrLst/>
-    <dgm:txFillClrLst meth="repeat">
-      <a:schemeClr val="dk1"/>
-    </dgm:txFillClrLst>
-    <dgm:txEffectClrLst/>
-  </dgm:styleLbl>
-  <dgm:styleLbl name="bgShp">
-    <dgm:fillClrLst meth="repeat">
-      <a:schemeClr val="accent3">
-        <a:tint val="40000"/>
-      </a:schemeClr>
-    </dgm:fillClrLst>
-    <dgm:linClrLst meth="repeat">
-      <a:schemeClr val="accent3"/>
-    </dgm:linClrLst>
-    <dgm:effectClrLst/>
-    <dgm:txLinClrLst/>
-    <dgm:txFillClrLst meth="repeat">
-      <a:schemeClr val="dk1"/>
-    </dgm:txFillClrLst>
-    <dgm:txEffectClrLst/>
-  </dgm:styleLbl>
-  <dgm:styleLbl name="dkBgShp">
-    <dgm:fillClrLst meth="repeat">
-      <a:schemeClr val="accent3">
-        <a:shade val="80000"/>
-      </a:schemeClr>
-    </dgm:fillClrLst>
-    <dgm:linClrLst meth="repeat">
-      <a:schemeClr val="accent3"/>
-    </dgm:linClrLst>
-    <dgm:effectClrLst/>
-    <dgm:txLinClrLst/>
-    <dgm:txFillClrLst meth="repeat">
-      <a:schemeClr val="lt1"/>
-    </dgm:txFillClrLst>
-    <dgm:txEffectClrLst/>
-  </dgm:styleLbl>
-  <dgm:styleLbl name="trBgShp">
-    <dgm:fillClrLst meth="repeat">
-      <a:schemeClr val="accent3">
-        <a:tint val="50000"/>
-        <a:alpha val="40000"/>
-      </a:schemeClr>
-    </dgm:fillClrLst>
-    <dgm:linClrLst meth="repeat">
-      <a:schemeClr val="accent3"/>
-    </dgm:linClrLst>
-    <dgm:effectClrLst/>
-    <dgm:txLinClrLst/>
-    <dgm:txFillClrLst meth="repeat">
-      <a:schemeClr val="lt1"/>
-    </dgm:txFillClrLst>
-    <dgm:txEffectClrLst/>
-  </dgm:styleLbl>
-  <dgm:styleLbl name="fgShp">
-    <dgm:fillClrLst meth="repeat">
-      <a:schemeClr val="accent3">
-        <a:tint val="60000"/>
-      </a:schemeClr>
-    </dgm:fillClrLst>
-    <dgm:linClrLst meth="repeat">
-      <a:schemeClr val="lt1"/>
-    </dgm:linClrLst>
-    <dgm:effectClrLst/>
-    <dgm:txLinClrLst/>
-    <dgm:txFillClrLst meth="repeat">
-      <a:schemeClr val="dk1"/>
-    </dgm:txFillClrLst>
-    <dgm:txEffectClrLst/>
-  </dgm:styleLbl>
-  <dgm:styleLbl name="revTx">
-    <dgm:fillClrLst meth="repeat">
-      <a:schemeClr val="lt1">
-        <a:alpha val="0"/>
-      </a:schemeClr>
-    </dgm:fillClrLst>
-    <dgm:linClrLst meth="repeat">
-      <a:schemeClr val="dk1">
-        <a:alpha val="0"/>
-      </a:schemeClr>
-    </dgm:linClrLst>
-    <dgm:effectClrLst/>
-    <dgm:txLinClrLst/>
-    <dgm:txFillClrLst meth="repeat">
-      <a:schemeClr val="tx1"/>
-    </dgm:txFillClrLst>
-    <dgm:txEffectClrLst/>
-  </dgm:styleLbl>
-</dgm:colorsDef>
-</file>
-
-<file path=ppt/diagrams/colors2.xml><?xml version="1.0" encoding="utf-8"?>
 <dgm:colorsDef xmlns:dgm="http://schemas.openxmlformats.org/drawingml/2006/diagram" xmlns:a="http://schemas.openxmlformats.org/drawingml/2006/main" uniqueId="urn:microsoft.com/office/officeart/2005/8/colors/accent3_2">
   <dgm:title val=""/>
   <dgm:desc val=""/>
@@ -2012,348 +1265,6 @@
 </dgm:dataModel>
 </file>
 
-<file path=ppt/diagrams/data2.xml><?xml version="1.0" encoding="utf-8"?>
-<dgm:dataModel xmlns:dgm="http://schemas.openxmlformats.org/drawingml/2006/diagram" xmlns:a="http://schemas.openxmlformats.org/drawingml/2006/main">
-  <dgm:ptLst>
-    <dgm:pt modelId="{F37B5313-5EDD-4019-B0B2-B457BE6F4146}" type="doc">
-      <dgm:prSet loTypeId="urn:microsoft.com/office/officeart/2005/8/layout/process1" loCatId="process" qsTypeId="urn:microsoft.com/office/officeart/2005/8/quickstyle/simple2" qsCatId="simple" csTypeId="urn:microsoft.com/office/officeart/2005/8/colors/accent3_2" csCatId="accent3" phldr="1"/>
-      <dgm:spPr/>
-      <dgm:t>
-        <a:bodyPr/>
-        <a:lstStyle/>
-        <a:p>
-          <a:endParaRPr lang="en-US"/>
-        </a:p>
-      </dgm:t>
-    </dgm:pt>
-    <dgm:pt modelId="{0F1CB210-C3B0-41D2-B132-68822290F20B}">
-      <dgm:prSet phldrT="[Text]"/>
-      <dgm:spPr/>
-      <dgm:t>
-        <a:bodyPr/>
-        <a:lstStyle/>
-        <a:p>
-          <a:r>
-            <a:rPr lang="es-CR" dirty="0" smtClean="0"/>
-            <a:t>Ejemplos Clave</a:t>
-          </a:r>
-          <a:endParaRPr lang="en-US" dirty="0"/>
-        </a:p>
-      </dgm:t>
-    </dgm:pt>
-    <dgm:pt modelId="{3EAD2E25-A840-4CCD-A9F7-CDC185B511FB}" type="parTrans" cxnId="{F2B12970-2C84-4F60-BF0B-33F248008F75}">
-      <dgm:prSet/>
-      <dgm:spPr/>
-      <dgm:t>
-        <a:bodyPr/>
-        <a:lstStyle/>
-        <a:p>
-          <a:endParaRPr lang="en-US"/>
-        </a:p>
-      </dgm:t>
-    </dgm:pt>
-    <dgm:pt modelId="{52078FF1-CFCF-4FCE-8063-65D9317AF517}" type="sibTrans" cxnId="{F2B12970-2C84-4F60-BF0B-33F248008F75}">
-      <dgm:prSet/>
-      <dgm:spPr/>
-      <dgm:t>
-        <a:bodyPr/>
-        <a:lstStyle/>
-        <a:p>
-          <a:endParaRPr lang="en-US"/>
-        </a:p>
-      </dgm:t>
-    </dgm:pt>
-    <dgm:pt modelId="{2A4F9878-FC56-4024-8EA0-A7CDD5646BF8}">
-      <dgm:prSet phldrT="[Text]"/>
-      <dgm:spPr/>
-      <dgm:t>
-        <a:bodyPr/>
-        <a:lstStyle/>
-        <a:p>
-          <a:r>
-            <a:rPr lang="es-CR" dirty="0" smtClean="0"/>
-            <a:t>Especificación con Ejemplos</a:t>
-          </a:r>
-          <a:endParaRPr lang="en-US" dirty="0"/>
-        </a:p>
-      </dgm:t>
-    </dgm:pt>
-    <dgm:pt modelId="{B92E2F66-9BD5-4EF7-8CB2-86426FB4117A}" type="parTrans" cxnId="{DED076FE-8BCC-497F-A666-A37F64500EC6}">
-      <dgm:prSet/>
-      <dgm:spPr/>
-      <dgm:t>
-        <a:bodyPr/>
-        <a:lstStyle/>
-        <a:p>
-          <a:endParaRPr lang="en-US"/>
-        </a:p>
-      </dgm:t>
-    </dgm:pt>
-    <dgm:pt modelId="{58BF5103-75B0-4E2A-B6AF-CC479AF3144F}" type="sibTrans" cxnId="{DED076FE-8BCC-497F-A666-A37F64500EC6}">
-      <dgm:prSet/>
-      <dgm:spPr/>
-      <dgm:t>
-        <a:bodyPr/>
-        <a:lstStyle/>
-        <a:p>
-          <a:endParaRPr lang="en-US"/>
-        </a:p>
-      </dgm:t>
-    </dgm:pt>
-    <dgm:pt modelId="{367C84AB-F23E-4FDC-B17A-C1910B5435CA}">
-      <dgm:prSet phldrT="[Text]"/>
-      <dgm:spPr/>
-      <dgm:t>
-        <a:bodyPr/>
-        <a:lstStyle/>
-        <a:p>
-          <a:r>
-            <a:rPr lang="es-CR" dirty="0" smtClean="0"/>
-            <a:t>Especificación Ejecutable</a:t>
-          </a:r>
-          <a:endParaRPr lang="en-US" dirty="0"/>
-        </a:p>
-      </dgm:t>
-    </dgm:pt>
-    <dgm:pt modelId="{807C904C-E4CD-44D5-BC22-73BA741154AC}" type="parTrans" cxnId="{B64D59CD-61D5-4881-B700-74927010CEA6}">
-      <dgm:prSet/>
-      <dgm:spPr/>
-      <dgm:t>
-        <a:bodyPr/>
-        <a:lstStyle/>
-        <a:p>
-          <a:endParaRPr lang="en-US"/>
-        </a:p>
-      </dgm:t>
-    </dgm:pt>
-    <dgm:pt modelId="{2398B78F-1855-40FC-B242-5B73FBE442A8}" type="sibTrans" cxnId="{B64D59CD-61D5-4881-B700-74927010CEA6}">
-      <dgm:prSet/>
-      <dgm:spPr/>
-      <dgm:t>
-        <a:bodyPr/>
-        <a:lstStyle/>
-        <a:p>
-          <a:endParaRPr lang="en-US"/>
-        </a:p>
-      </dgm:t>
-    </dgm:pt>
-    <dgm:pt modelId="{4C78C2C7-5AEF-49EB-85FC-849C9D0129DE}">
-      <dgm:prSet phldrT="[Text]"/>
-      <dgm:spPr/>
-      <dgm:t>
-        <a:bodyPr/>
-        <a:lstStyle/>
-        <a:p>
-          <a:r>
-            <a:rPr lang="es-CR" dirty="0" smtClean="0"/>
-            <a:t>Documentación Viva</a:t>
-          </a:r>
-          <a:endParaRPr lang="en-US" dirty="0"/>
-        </a:p>
-      </dgm:t>
-    </dgm:pt>
-    <dgm:pt modelId="{9478B6A5-CD81-42BD-BCDA-6D5B734B0D7B}" type="parTrans" cxnId="{F634DE2A-67CF-4B66-8C50-1F585F4DD80E}">
-      <dgm:prSet/>
-      <dgm:spPr/>
-      <dgm:t>
-        <a:bodyPr/>
-        <a:lstStyle/>
-        <a:p>
-          <a:endParaRPr lang="en-US"/>
-        </a:p>
-      </dgm:t>
-    </dgm:pt>
-    <dgm:pt modelId="{0C972B14-E274-48B3-BF9A-491355051192}" type="sibTrans" cxnId="{F634DE2A-67CF-4B66-8C50-1F585F4DD80E}">
-      <dgm:prSet/>
-      <dgm:spPr/>
-      <dgm:t>
-        <a:bodyPr/>
-        <a:lstStyle/>
-        <a:p>
-          <a:endParaRPr lang="en-US"/>
-        </a:p>
-      </dgm:t>
-    </dgm:pt>
-    <dgm:pt modelId="{127B2901-52E8-4CCE-965C-F8B328B17D66}" type="pres">
-      <dgm:prSet presAssocID="{F37B5313-5EDD-4019-B0B2-B457BE6F4146}" presName="Name0" presStyleCnt="0">
-        <dgm:presLayoutVars>
-          <dgm:dir/>
-          <dgm:resizeHandles val="exact"/>
-        </dgm:presLayoutVars>
-      </dgm:prSet>
-      <dgm:spPr/>
-      <dgm:t>
-        <a:bodyPr/>
-        <a:lstStyle/>
-        <a:p>
-          <a:endParaRPr lang="en-US"/>
-        </a:p>
-      </dgm:t>
-    </dgm:pt>
-    <dgm:pt modelId="{1BF4AC25-65F3-4933-8A88-D3D7742E370A}" type="pres">
-      <dgm:prSet presAssocID="{0F1CB210-C3B0-41D2-B132-68822290F20B}" presName="node" presStyleLbl="node1" presStyleIdx="0" presStyleCnt="4">
-        <dgm:presLayoutVars>
-          <dgm:bulletEnabled val="1"/>
-        </dgm:presLayoutVars>
-      </dgm:prSet>
-      <dgm:spPr/>
-      <dgm:t>
-        <a:bodyPr/>
-        <a:lstStyle/>
-        <a:p>
-          <a:endParaRPr lang="en-US"/>
-        </a:p>
-      </dgm:t>
-    </dgm:pt>
-    <dgm:pt modelId="{11239894-F83D-4702-8D29-13D22A06A27C}" type="pres">
-      <dgm:prSet presAssocID="{52078FF1-CFCF-4FCE-8063-65D9317AF517}" presName="sibTrans" presStyleLbl="sibTrans2D1" presStyleIdx="0" presStyleCnt="3"/>
-      <dgm:spPr/>
-      <dgm:t>
-        <a:bodyPr/>
-        <a:lstStyle/>
-        <a:p>
-          <a:endParaRPr lang="en-US"/>
-        </a:p>
-      </dgm:t>
-    </dgm:pt>
-    <dgm:pt modelId="{58D2F887-77EE-4190-8780-660498D18F88}" type="pres">
-      <dgm:prSet presAssocID="{52078FF1-CFCF-4FCE-8063-65D9317AF517}" presName="connectorText" presStyleLbl="sibTrans2D1" presStyleIdx="0" presStyleCnt="3"/>
-      <dgm:spPr/>
-      <dgm:t>
-        <a:bodyPr/>
-        <a:lstStyle/>
-        <a:p>
-          <a:endParaRPr lang="en-US"/>
-        </a:p>
-      </dgm:t>
-    </dgm:pt>
-    <dgm:pt modelId="{39FA849E-717D-43F5-ACE9-9639D81A8645}" type="pres">
-      <dgm:prSet presAssocID="{2A4F9878-FC56-4024-8EA0-A7CDD5646BF8}" presName="node" presStyleLbl="node1" presStyleIdx="1" presStyleCnt="4">
-        <dgm:presLayoutVars>
-          <dgm:bulletEnabled val="1"/>
-        </dgm:presLayoutVars>
-      </dgm:prSet>
-      <dgm:spPr/>
-      <dgm:t>
-        <a:bodyPr/>
-        <a:lstStyle/>
-        <a:p>
-          <a:endParaRPr lang="en-US"/>
-        </a:p>
-      </dgm:t>
-    </dgm:pt>
-    <dgm:pt modelId="{FDA83150-81A7-4521-AC28-95430F6F7734}" type="pres">
-      <dgm:prSet presAssocID="{58BF5103-75B0-4E2A-B6AF-CC479AF3144F}" presName="sibTrans" presStyleLbl="sibTrans2D1" presStyleIdx="1" presStyleCnt="3"/>
-      <dgm:spPr/>
-      <dgm:t>
-        <a:bodyPr/>
-        <a:lstStyle/>
-        <a:p>
-          <a:endParaRPr lang="en-US"/>
-        </a:p>
-      </dgm:t>
-    </dgm:pt>
-    <dgm:pt modelId="{BD54F0FB-8B50-42C8-9067-4133612C3EF4}" type="pres">
-      <dgm:prSet presAssocID="{58BF5103-75B0-4E2A-B6AF-CC479AF3144F}" presName="connectorText" presStyleLbl="sibTrans2D1" presStyleIdx="1" presStyleCnt="3"/>
-      <dgm:spPr/>
-      <dgm:t>
-        <a:bodyPr/>
-        <a:lstStyle/>
-        <a:p>
-          <a:endParaRPr lang="en-US"/>
-        </a:p>
-      </dgm:t>
-    </dgm:pt>
-    <dgm:pt modelId="{DC39BE9A-5000-41DF-9715-6CDE0925001D}" type="pres">
-      <dgm:prSet presAssocID="{367C84AB-F23E-4FDC-B17A-C1910B5435CA}" presName="node" presStyleLbl="node1" presStyleIdx="2" presStyleCnt="4">
-        <dgm:presLayoutVars>
-          <dgm:bulletEnabled val="1"/>
-        </dgm:presLayoutVars>
-      </dgm:prSet>
-      <dgm:spPr/>
-      <dgm:t>
-        <a:bodyPr/>
-        <a:lstStyle/>
-        <a:p>
-          <a:endParaRPr lang="en-US"/>
-        </a:p>
-      </dgm:t>
-    </dgm:pt>
-    <dgm:pt modelId="{A49DCEA3-C7F8-4105-A0D2-F70D26BF7FDB}" type="pres">
-      <dgm:prSet presAssocID="{2398B78F-1855-40FC-B242-5B73FBE442A8}" presName="sibTrans" presStyleLbl="sibTrans2D1" presStyleIdx="2" presStyleCnt="3"/>
-      <dgm:spPr/>
-      <dgm:t>
-        <a:bodyPr/>
-        <a:lstStyle/>
-        <a:p>
-          <a:endParaRPr lang="en-US"/>
-        </a:p>
-      </dgm:t>
-    </dgm:pt>
-    <dgm:pt modelId="{44130665-29AD-456E-9999-7BB3512CC5BA}" type="pres">
-      <dgm:prSet presAssocID="{2398B78F-1855-40FC-B242-5B73FBE442A8}" presName="connectorText" presStyleLbl="sibTrans2D1" presStyleIdx="2" presStyleCnt="3"/>
-      <dgm:spPr/>
-      <dgm:t>
-        <a:bodyPr/>
-        <a:lstStyle/>
-        <a:p>
-          <a:endParaRPr lang="en-US"/>
-        </a:p>
-      </dgm:t>
-    </dgm:pt>
-    <dgm:pt modelId="{5A35CF05-8EA4-415C-9F34-B2DBE5E0CD3D}" type="pres">
-      <dgm:prSet presAssocID="{4C78C2C7-5AEF-49EB-85FC-849C9D0129DE}" presName="node" presStyleLbl="node1" presStyleIdx="3" presStyleCnt="4">
-        <dgm:presLayoutVars>
-          <dgm:bulletEnabled val="1"/>
-        </dgm:presLayoutVars>
-      </dgm:prSet>
-      <dgm:spPr/>
-      <dgm:t>
-        <a:bodyPr/>
-        <a:lstStyle/>
-        <a:p>
-          <a:endParaRPr lang="en-US"/>
-        </a:p>
-      </dgm:t>
-    </dgm:pt>
-  </dgm:ptLst>
-  <dgm:cxnLst>
-    <dgm:cxn modelId="{5A87C86E-B9AA-4CA0-8061-38BE2A153498}" type="presOf" srcId="{58BF5103-75B0-4E2A-B6AF-CC479AF3144F}" destId="{FDA83150-81A7-4521-AC28-95430F6F7734}" srcOrd="0" destOrd="0" presId="urn:microsoft.com/office/officeart/2005/8/layout/process1"/>
-    <dgm:cxn modelId="{F2B12970-2C84-4F60-BF0B-33F248008F75}" srcId="{F37B5313-5EDD-4019-B0B2-B457BE6F4146}" destId="{0F1CB210-C3B0-41D2-B132-68822290F20B}" srcOrd="0" destOrd="0" parTransId="{3EAD2E25-A840-4CCD-A9F7-CDC185B511FB}" sibTransId="{52078FF1-CFCF-4FCE-8063-65D9317AF517}"/>
-    <dgm:cxn modelId="{2370CD24-C1E9-444B-8908-26B9982E216F}" type="presOf" srcId="{0F1CB210-C3B0-41D2-B132-68822290F20B}" destId="{1BF4AC25-65F3-4933-8A88-D3D7742E370A}" srcOrd="0" destOrd="0" presId="urn:microsoft.com/office/officeart/2005/8/layout/process1"/>
-    <dgm:cxn modelId="{1BCF3E52-5294-468C-ABCB-2462100D2136}" type="presOf" srcId="{52078FF1-CFCF-4FCE-8063-65D9317AF517}" destId="{11239894-F83D-4702-8D29-13D22A06A27C}" srcOrd="0" destOrd="0" presId="urn:microsoft.com/office/officeart/2005/8/layout/process1"/>
-    <dgm:cxn modelId="{A0B444EB-248C-49D5-B2FD-4C3B9BAA276C}" type="presOf" srcId="{F37B5313-5EDD-4019-B0B2-B457BE6F4146}" destId="{127B2901-52E8-4CCE-965C-F8B328B17D66}" srcOrd="0" destOrd="0" presId="urn:microsoft.com/office/officeart/2005/8/layout/process1"/>
-    <dgm:cxn modelId="{392E390D-1D01-4A7A-8AE3-A1B67FE32E45}" type="presOf" srcId="{58BF5103-75B0-4E2A-B6AF-CC479AF3144F}" destId="{BD54F0FB-8B50-42C8-9067-4133612C3EF4}" srcOrd="1" destOrd="0" presId="urn:microsoft.com/office/officeart/2005/8/layout/process1"/>
-    <dgm:cxn modelId="{DED076FE-8BCC-497F-A666-A37F64500EC6}" srcId="{F37B5313-5EDD-4019-B0B2-B457BE6F4146}" destId="{2A4F9878-FC56-4024-8EA0-A7CDD5646BF8}" srcOrd="1" destOrd="0" parTransId="{B92E2F66-9BD5-4EF7-8CB2-86426FB4117A}" sibTransId="{58BF5103-75B0-4E2A-B6AF-CC479AF3144F}"/>
-    <dgm:cxn modelId="{9786D255-F0EE-43C7-88BD-350761B1F39F}" type="presOf" srcId="{2398B78F-1855-40FC-B242-5B73FBE442A8}" destId="{44130665-29AD-456E-9999-7BB3512CC5BA}" srcOrd="1" destOrd="0" presId="urn:microsoft.com/office/officeart/2005/8/layout/process1"/>
-    <dgm:cxn modelId="{C54512F4-D7B9-4EB8-914C-FC3595C29CC6}" type="presOf" srcId="{367C84AB-F23E-4FDC-B17A-C1910B5435CA}" destId="{DC39BE9A-5000-41DF-9715-6CDE0925001D}" srcOrd="0" destOrd="0" presId="urn:microsoft.com/office/officeart/2005/8/layout/process1"/>
-    <dgm:cxn modelId="{850FC587-D633-42D7-8FF7-BF1052722284}" type="presOf" srcId="{2A4F9878-FC56-4024-8EA0-A7CDD5646BF8}" destId="{39FA849E-717D-43F5-ACE9-9639D81A8645}" srcOrd="0" destOrd="0" presId="urn:microsoft.com/office/officeart/2005/8/layout/process1"/>
-    <dgm:cxn modelId="{5F5D2D24-4EED-46FE-9771-E5D7CAD93A34}" type="presOf" srcId="{2398B78F-1855-40FC-B242-5B73FBE442A8}" destId="{A49DCEA3-C7F8-4105-A0D2-F70D26BF7FDB}" srcOrd="0" destOrd="0" presId="urn:microsoft.com/office/officeart/2005/8/layout/process1"/>
-    <dgm:cxn modelId="{61FD39A7-20E4-4C1E-AC09-5F7ABD96C693}" type="presOf" srcId="{4C78C2C7-5AEF-49EB-85FC-849C9D0129DE}" destId="{5A35CF05-8EA4-415C-9F34-B2DBE5E0CD3D}" srcOrd="0" destOrd="0" presId="urn:microsoft.com/office/officeart/2005/8/layout/process1"/>
-    <dgm:cxn modelId="{F634DE2A-67CF-4B66-8C50-1F585F4DD80E}" srcId="{F37B5313-5EDD-4019-B0B2-B457BE6F4146}" destId="{4C78C2C7-5AEF-49EB-85FC-849C9D0129DE}" srcOrd="3" destOrd="0" parTransId="{9478B6A5-CD81-42BD-BCDA-6D5B734B0D7B}" sibTransId="{0C972B14-E274-48B3-BF9A-491355051192}"/>
-    <dgm:cxn modelId="{CFF7678A-FF4A-4F81-AC38-A08411518123}" type="presOf" srcId="{52078FF1-CFCF-4FCE-8063-65D9317AF517}" destId="{58D2F887-77EE-4190-8780-660498D18F88}" srcOrd="1" destOrd="0" presId="urn:microsoft.com/office/officeart/2005/8/layout/process1"/>
-    <dgm:cxn modelId="{B64D59CD-61D5-4881-B700-74927010CEA6}" srcId="{F37B5313-5EDD-4019-B0B2-B457BE6F4146}" destId="{367C84AB-F23E-4FDC-B17A-C1910B5435CA}" srcOrd="2" destOrd="0" parTransId="{807C904C-E4CD-44D5-BC22-73BA741154AC}" sibTransId="{2398B78F-1855-40FC-B242-5B73FBE442A8}"/>
-    <dgm:cxn modelId="{A0D005CC-1A7E-4517-844E-F4D272B9C6B5}" type="presParOf" srcId="{127B2901-52E8-4CCE-965C-F8B328B17D66}" destId="{1BF4AC25-65F3-4933-8A88-D3D7742E370A}" srcOrd="0" destOrd="0" presId="urn:microsoft.com/office/officeart/2005/8/layout/process1"/>
-    <dgm:cxn modelId="{6F415849-636E-4280-AD23-1CA2E1D47899}" type="presParOf" srcId="{127B2901-52E8-4CCE-965C-F8B328B17D66}" destId="{11239894-F83D-4702-8D29-13D22A06A27C}" srcOrd="1" destOrd="0" presId="urn:microsoft.com/office/officeart/2005/8/layout/process1"/>
-    <dgm:cxn modelId="{D59D8797-2866-478D-A046-AB19ACB263DD}" type="presParOf" srcId="{11239894-F83D-4702-8D29-13D22A06A27C}" destId="{58D2F887-77EE-4190-8780-660498D18F88}" srcOrd="0" destOrd="0" presId="urn:microsoft.com/office/officeart/2005/8/layout/process1"/>
-    <dgm:cxn modelId="{76B2BC28-1154-4A67-8E65-0ADA3FC316CE}" type="presParOf" srcId="{127B2901-52E8-4CCE-965C-F8B328B17D66}" destId="{39FA849E-717D-43F5-ACE9-9639D81A8645}" srcOrd="2" destOrd="0" presId="urn:microsoft.com/office/officeart/2005/8/layout/process1"/>
-    <dgm:cxn modelId="{05AF4F1F-74FC-48DB-8DF8-A39B68A1FDC4}" type="presParOf" srcId="{127B2901-52E8-4CCE-965C-F8B328B17D66}" destId="{FDA83150-81A7-4521-AC28-95430F6F7734}" srcOrd="3" destOrd="0" presId="urn:microsoft.com/office/officeart/2005/8/layout/process1"/>
-    <dgm:cxn modelId="{21369D48-C9C0-4F3E-9170-A177AD2B93A6}" type="presParOf" srcId="{FDA83150-81A7-4521-AC28-95430F6F7734}" destId="{BD54F0FB-8B50-42C8-9067-4133612C3EF4}" srcOrd="0" destOrd="0" presId="urn:microsoft.com/office/officeart/2005/8/layout/process1"/>
-    <dgm:cxn modelId="{E442FDCB-66E0-4392-8E4F-9D744208FBC4}" type="presParOf" srcId="{127B2901-52E8-4CCE-965C-F8B328B17D66}" destId="{DC39BE9A-5000-41DF-9715-6CDE0925001D}" srcOrd="4" destOrd="0" presId="urn:microsoft.com/office/officeart/2005/8/layout/process1"/>
-    <dgm:cxn modelId="{83D361DD-74E1-4924-8ADB-93B5D8E15CA4}" type="presParOf" srcId="{127B2901-52E8-4CCE-965C-F8B328B17D66}" destId="{A49DCEA3-C7F8-4105-A0D2-F70D26BF7FDB}" srcOrd="5" destOrd="0" presId="urn:microsoft.com/office/officeart/2005/8/layout/process1"/>
-    <dgm:cxn modelId="{EAB7C8A0-1433-4B24-9325-C6C8255483FD}" type="presParOf" srcId="{A49DCEA3-C7F8-4105-A0D2-F70D26BF7FDB}" destId="{44130665-29AD-456E-9999-7BB3512CC5BA}" srcOrd="0" destOrd="0" presId="urn:microsoft.com/office/officeart/2005/8/layout/process1"/>
-    <dgm:cxn modelId="{0404DC29-31D1-458A-B536-5E0020B85DAA}" type="presParOf" srcId="{127B2901-52E8-4CCE-965C-F8B328B17D66}" destId="{5A35CF05-8EA4-415C-9F34-B2DBE5E0CD3D}" srcOrd="6" destOrd="0" presId="urn:microsoft.com/office/officeart/2005/8/layout/process1"/>
-  </dgm:cxnLst>
-  <dgm:bg/>
-  <dgm:whole/>
-  <dgm:extLst>
-    <a:ext uri="http://schemas.microsoft.com/office/drawing/2008/diagram">
-      <dsp:dataModelExt xmlns:dsp="http://schemas.microsoft.com/office/drawing/2008/diagram" relId="rId6" minVer="http://schemas.openxmlformats.org/drawingml/2006/diagram"/>
-    </a:ext>
-  </dgm:extLst>
-</dgm:dataModel>
-</file>
-
 <file path=ppt/diagrams/drawing1.xml><?xml version="1.0" encoding="utf-8"?>
 <dsp:drawing xmlns:dgm="http://schemas.openxmlformats.org/drawingml/2006/diagram" xmlns:dsp="http://schemas.microsoft.com/office/drawing/2008/diagram" xmlns:a="http://schemas.openxmlformats.org/drawingml/2006/main">
   <dsp:spTree>
@@ -2889,688 +1800,7 @@
 </dsp:drawing>
 </file>
 
-<file path=ppt/diagrams/drawing2.xml><?xml version="1.0" encoding="utf-8"?>
-<dsp:drawing xmlns:dgm="http://schemas.openxmlformats.org/drawingml/2006/diagram" xmlns:dsp="http://schemas.microsoft.com/office/drawing/2008/diagram" xmlns:a="http://schemas.openxmlformats.org/drawingml/2006/main">
-  <dsp:spTree>
-    <dsp:nvGrpSpPr>
-      <dsp:cNvPr id="0" name=""/>
-      <dsp:cNvGrpSpPr/>
-    </dsp:nvGrpSpPr>
-    <dsp:grpSpPr/>
-    <dsp:sp modelId="{1BF4AC25-65F3-4933-8A88-D3D7742E370A}">
-      <dsp:nvSpPr>
-        <dsp:cNvPr id="0" name=""/>
-        <dsp:cNvSpPr/>
-      </dsp:nvSpPr>
-      <dsp:spPr>
-        <a:xfrm>
-          <a:off x="5257" y="2594460"/>
-          <a:ext cx="2298837" cy="1379302"/>
-        </a:xfrm>
-        <a:prstGeom prst="roundRect">
-          <a:avLst>
-            <a:gd name="adj" fmla="val 10000"/>
-          </a:avLst>
-        </a:prstGeom>
-        <a:solidFill>
-          <a:schemeClr val="accent3">
-            <a:hueOff val="0"/>
-            <a:satOff val="0"/>
-            <a:lumOff val="0"/>
-            <a:alphaOff val="0"/>
-          </a:schemeClr>
-        </a:solidFill>
-        <a:ln w="28575" cap="rnd" cmpd="sng" algn="ctr">
-          <a:solidFill>
-            <a:schemeClr val="lt1">
-              <a:hueOff val="0"/>
-              <a:satOff val="0"/>
-              <a:lumOff val="0"/>
-              <a:alphaOff val="0"/>
-            </a:schemeClr>
-          </a:solidFill>
-          <a:prstDash val="solid"/>
-        </a:ln>
-        <a:effectLst/>
-      </dsp:spPr>
-      <dsp:style>
-        <a:lnRef idx="3">
-          <a:scrgbClr r="0" g="0" b="0"/>
-        </a:lnRef>
-        <a:fillRef idx="1">
-          <a:scrgbClr r="0" g="0" b="0"/>
-        </a:fillRef>
-        <a:effectRef idx="1">
-          <a:scrgbClr r="0" g="0" b="0"/>
-        </a:effectRef>
-        <a:fontRef idx="minor">
-          <a:schemeClr val="lt1"/>
-        </a:fontRef>
-      </dsp:style>
-      <dsp:txBody>
-        <a:bodyPr spcFirstLastPara="0" vert="horz" wrap="square" lIns="76200" tIns="76200" rIns="76200" bIns="76200" numCol="1" spcCol="1270" anchor="ctr" anchorCtr="0">
-          <a:noAutofit/>
-        </a:bodyPr>
-        <a:lstStyle/>
-        <a:p>
-          <a:pPr lvl="0" algn="ctr" defTabSz="889000">
-            <a:lnSpc>
-              <a:spcPct val="90000"/>
-            </a:lnSpc>
-            <a:spcBef>
-              <a:spcPct val="0"/>
-            </a:spcBef>
-            <a:spcAft>
-              <a:spcPct val="35000"/>
-            </a:spcAft>
-          </a:pPr>
-          <a:r>
-            <a:rPr lang="es-CR" sz="2000" kern="1200" dirty="0" smtClean="0"/>
-            <a:t>Ejemplos Clave</a:t>
-          </a:r>
-          <a:endParaRPr lang="en-US" sz="2000" kern="1200" dirty="0"/>
-        </a:p>
-      </dsp:txBody>
-      <dsp:txXfrm>
-        <a:off x="45655" y="2634858"/>
-        <a:ext cx="2218041" cy="1298506"/>
-      </dsp:txXfrm>
-    </dsp:sp>
-    <dsp:sp modelId="{11239894-F83D-4702-8D29-13D22A06A27C}">
-      <dsp:nvSpPr>
-        <dsp:cNvPr id="0" name=""/>
-        <dsp:cNvSpPr/>
-      </dsp:nvSpPr>
-      <dsp:spPr>
-        <a:xfrm>
-          <a:off x="2533979" y="2999056"/>
-          <a:ext cx="487353" cy="570111"/>
-        </a:xfrm>
-        <a:prstGeom prst="rightArrow">
-          <a:avLst>
-            <a:gd name="adj1" fmla="val 60000"/>
-            <a:gd name="adj2" fmla="val 50000"/>
-          </a:avLst>
-        </a:prstGeom>
-        <a:solidFill>
-          <a:schemeClr val="accent3">
-            <a:tint val="60000"/>
-            <a:hueOff val="0"/>
-            <a:satOff val="0"/>
-            <a:lumOff val="0"/>
-            <a:alphaOff val="0"/>
-          </a:schemeClr>
-        </a:solidFill>
-        <a:ln>
-          <a:noFill/>
-        </a:ln>
-        <a:effectLst/>
-      </dsp:spPr>
-      <dsp:style>
-        <a:lnRef idx="0">
-          <a:scrgbClr r="0" g="0" b="0"/>
-        </a:lnRef>
-        <a:fillRef idx="1">
-          <a:scrgbClr r="0" g="0" b="0"/>
-        </a:fillRef>
-        <a:effectRef idx="1">
-          <a:scrgbClr r="0" g="0" b="0"/>
-        </a:effectRef>
-        <a:fontRef idx="minor">
-          <a:schemeClr val="lt1"/>
-        </a:fontRef>
-      </dsp:style>
-      <dsp:txBody>
-        <a:bodyPr spcFirstLastPara="0" vert="horz" wrap="square" lIns="0" tIns="0" rIns="0" bIns="0" numCol="1" spcCol="1270" anchor="ctr" anchorCtr="0">
-          <a:noAutofit/>
-        </a:bodyPr>
-        <a:lstStyle/>
-        <a:p>
-          <a:pPr lvl="0" algn="ctr" defTabSz="711200">
-            <a:lnSpc>
-              <a:spcPct val="90000"/>
-            </a:lnSpc>
-            <a:spcBef>
-              <a:spcPct val="0"/>
-            </a:spcBef>
-            <a:spcAft>
-              <a:spcPct val="35000"/>
-            </a:spcAft>
-          </a:pPr>
-          <a:endParaRPr lang="en-US" sz="1600" kern="1200"/>
-        </a:p>
-      </dsp:txBody>
-      <dsp:txXfrm>
-        <a:off x="2533979" y="3113078"/>
-        <a:ext cx="341147" cy="342067"/>
-      </dsp:txXfrm>
-    </dsp:sp>
-    <dsp:sp modelId="{39FA849E-717D-43F5-ACE9-9639D81A8645}">
-      <dsp:nvSpPr>
-        <dsp:cNvPr id="0" name=""/>
-        <dsp:cNvSpPr/>
-      </dsp:nvSpPr>
-      <dsp:spPr>
-        <a:xfrm>
-          <a:off x="3223630" y="2594460"/>
-          <a:ext cx="2298837" cy="1379302"/>
-        </a:xfrm>
-        <a:prstGeom prst="roundRect">
-          <a:avLst>
-            <a:gd name="adj" fmla="val 10000"/>
-          </a:avLst>
-        </a:prstGeom>
-        <a:solidFill>
-          <a:schemeClr val="accent3">
-            <a:hueOff val="0"/>
-            <a:satOff val="0"/>
-            <a:lumOff val="0"/>
-            <a:alphaOff val="0"/>
-          </a:schemeClr>
-        </a:solidFill>
-        <a:ln w="28575" cap="rnd" cmpd="sng" algn="ctr">
-          <a:solidFill>
-            <a:schemeClr val="lt1">
-              <a:hueOff val="0"/>
-              <a:satOff val="0"/>
-              <a:lumOff val="0"/>
-              <a:alphaOff val="0"/>
-            </a:schemeClr>
-          </a:solidFill>
-          <a:prstDash val="solid"/>
-        </a:ln>
-        <a:effectLst/>
-      </dsp:spPr>
-      <dsp:style>
-        <a:lnRef idx="3">
-          <a:scrgbClr r="0" g="0" b="0"/>
-        </a:lnRef>
-        <a:fillRef idx="1">
-          <a:scrgbClr r="0" g="0" b="0"/>
-        </a:fillRef>
-        <a:effectRef idx="1">
-          <a:scrgbClr r="0" g="0" b="0"/>
-        </a:effectRef>
-        <a:fontRef idx="minor">
-          <a:schemeClr val="lt1"/>
-        </a:fontRef>
-      </dsp:style>
-      <dsp:txBody>
-        <a:bodyPr spcFirstLastPara="0" vert="horz" wrap="square" lIns="76200" tIns="76200" rIns="76200" bIns="76200" numCol="1" spcCol="1270" anchor="ctr" anchorCtr="0">
-          <a:noAutofit/>
-        </a:bodyPr>
-        <a:lstStyle/>
-        <a:p>
-          <a:pPr lvl="0" algn="ctr" defTabSz="889000">
-            <a:lnSpc>
-              <a:spcPct val="90000"/>
-            </a:lnSpc>
-            <a:spcBef>
-              <a:spcPct val="0"/>
-            </a:spcBef>
-            <a:spcAft>
-              <a:spcPct val="35000"/>
-            </a:spcAft>
-          </a:pPr>
-          <a:r>
-            <a:rPr lang="es-CR" sz="2000" kern="1200" dirty="0" smtClean="0"/>
-            <a:t>Especificación con Ejemplos</a:t>
-          </a:r>
-          <a:endParaRPr lang="en-US" sz="2000" kern="1200" dirty="0"/>
-        </a:p>
-      </dsp:txBody>
-      <dsp:txXfrm>
-        <a:off x="3264028" y="2634858"/>
-        <a:ext cx="2218041" cy="1298506"/>
-      </dsp:txXfrm>
-    </dsp:sp>
-    <dsp:sp modelId="{FDA83150-81A7-4521-AC28-95430F6F7734}">
-      <dsp:nvSpPr>
-        <dsp:cNvPr id="0" name=""/>
-        <dsp:cNvSpPr/>
-      </dsp:nvSpPr>
-      <dsp:spPr>
-        <a:xfrm>
-          <a:off x="5752352" y="2999056"/>
-          <a:ext cx="487353" cy="570111"/>
-        </a:xfrm>
-        <a:prstGeom prst="rightArrow">
-          <a:avLst>
-            <a:gd name="adj1" fmla="val 60000"/>
-            <a:gd name="adj2" fmla="val 50000"/>
-          </a:avLst>
-        </a:prstGeom>
-        <a:solidFill>
-          <a:schemeClr val="accent3">
-            <a:tint val="60000"/>
-            <a:hueOff val="0"/>
-            <a:satOff val="0"/>
-            <a:lumOff val="0"/>
-            <a:alphaOff val="0"/>
-          </a:schemeClr>
-        </a:solidFill>
-        <a:ln>
-          <a:noFill/>
-        </a:ln>
-        <a:effectLst/>
-      </dsp:spPr>
-      <dsp:style>
-        <a:lnRef idx="0">
-          <a:scrgbClr r="0" g="0" b="0"/>
-        </a:lnRef>
-        <a:fillRef idx="1">
-          <a:scrgbClr r="0" g="0" b="0"/>
-        </a:fillRef>
-        <a:effectRef idx="1">
-          <a:scrgbClr r="0" g="0" b="0"/>
-        </a:effectRef>
-        <a:fontRef idx="minor">
-          <a:schemeClr val="lt1"/>
-        </a:fontRef>
-      </dsp:style>
-      <dsp:txBody>
-        <a:bodyPr spcFirstLastPara="0" vert="horz" wrap="square" lIns="0" tIns="0" rIns="0" bIns="0" numCol="1" spcCol="1270" anchor="ctr" anchorCtr="0">
-          <a:noAutofit/>
-        </a:bodyPr>
-        <a:lstStyle/>
-        <a:p>
-          <a:pPr lvl="0" algn="ctr" defTabSz="711200">
-            <a:lnSpc>
-              <a:spcPct val="90000"/>
-            </a:lnSpc>
-            <a:spcBef>
-              <a:spcPct val="0"/>
-            </a:spcBef>
-            <a:spcAft>
-              <a:spcPct val="35000"/>
-            </a:spcAft>
-          </a:pPr>
-          <a:endParaRPr lang="en-US" sz="1600" kern="1200"/>
-        </a:p>
-      </dsp:txBody>
-      <dsp:txXfrm>
-        <a:off x="5752352" y="3113078"/>
-        <a:ext cx="341147" cy="342067"/>
-      </dsp:txXfrm>
-    </dsp:sp>
-    <dsp:sp modelId="{DC39BE9A-5000-41DF-9715-6CDE0925001D}">
-      <dsp:nvSpPr>
-        <dsp:cNvPr id="0" name=""/>
-        <dsp:cNvSpPr/>
-      </dsp:nvSpPr>
-      <dsp:spPr>
-        <a:xfrm>
-          <a:off x="6442004" y="2594460"/>
-          <a:ext cx="2298837" cy="1379302"/>
-        </a:xfrm>
-        <a:prstGeom prst="roundRect">
-          <a:avLst>
-            <a:gd name="adj" fmla="val 10000"/>
-          </a:avLst>
-        </a:prstGeom>
-        <a:solidFill>
-          <a:schemeClr val="accent3">
-            <a:hueOff val="0"/>
-            <a:satOff val="0"/>
-            <a:lumOff val="0"/>
-            <a:alphaOff val="0"/>
-          </a:schemeClr>
-        </a:solidFill>
-        <a:ln w="28575" cap="rnd" cmpd="sng" algn="ctr">
-          <a:solidFill>
-            <a:schemeClr val="lt1">
-              <a:hueOff val="0"/>
-              <a:satOff val="0"/>
-              <a:lumOff val="0"/>
-              <a:alphaOff val="0"/>
-            </a:schemeClr>
-          </a:solidFill>
-          <a:prstDash val="solid"/>
-        </a:ln>
-        <a:effectLst/>
-      </dsp:spPr>
-      <dsp:style>
-        <a:lnRef idx="3">
-          <a:scrgbClr r="0" g="0" b="0"/>
-        </a:lnRef>
-        <a:fillRef idx="1">
-          <a:scrgbClr r="0" g="0" b="0"/>
-        </a:fillRef>
-        <a:effectRef idx="1">
-          <a:scrgbClr r="0" g="0" b="0"/>
-        </a:effectRef>
-        <a:fontRef idx="minor">
-          <a:schemeClr val="lt1"/>
-        </a:fontRef>
-      </dsp:style>
-      <dsp:txBody>
-        <a:bodyPr spcFirstLastPara="0" vert="horz" wrap="square" lIns="76200" tIns="76200" rIns="76200" bIns="76200" numCol="1" spcCol="1270" anchor="ctr" anchorCtr="0">
-          <a:noAutofit/>
-        </a:bodyPr>
-        <a:lstStyle/>
-        <a:p>
-          <a:pPr lvl="0" algn="ctr" defTabSz="889000">
-            <a:lnSpc>
-              <a:spcPct val="90000"/>
-            </a:lnSpc>
-            <a:spcBef>
-              <a:spcPct val="0"/>
-            </a:spcBef>
-            <a:spcAft>
-              <a:spcPct val="35000"/>
-            </a:spcAft>
-          </a:pPr>
-          <a:r>
-            <a:rPr lang="es-CR" sz="2000" kern="1200" dirty="0" smtClean="0"/>
-            <a:t>Especificación Ejecutable</a:t>
-          </a:r>
-          <a:endParaRPr lang="en-US" sz="2000" kern="1200" dirty="0"/>
-        </a:p>
-      </dsp:txBody>
-      <dsp:txXfrm>
-        <a:off x="6482402" y="2634858"/>
-        <a:ext cx="2218041" cy="1298506"/>
-      </dsp:txXfrm>
-    </dsp:sp>
-    <dsp:sp modelId="{A49DCEA3-C7F8-4105-A0D2-F70D26BF7FDB}">
-      <dsp:nvSpPr>
-        <dsp:cNvPr id="0" name=""/>
-        <dsp:cNvSpPr/>
-      </dsp:nvSpPr>
-      <dsp:spPr>
-        <a:xfrm>
-          <a:off x="8970725" y="2999056"/>
-          <a:ext cx="487353" cy="570111"/>
-        </a:xfrm>
-        <a:prstGeom prst="rightArrow">
-          <a:avLst>
-            <a:gd name="adj1" fmla="val 60000"/>
-            <a:gd name="adj2" fmla="val 50000"/>
-          </a:avLst>
-        </a:prstGeom>
-        <a:solidFill>
-          <a:schemeClr val="accent3">
-            <a:tint val="60000"/>
-            <a:hueOff val="0"/>
-            <a:satOff val="0"/>
-            <a:lumOff val="0"/>
-            <a:alphaOff val="0"/>
-          </a:schemeClr>
-        </a:solidFill>
-        <a:ln>
-          <a:noFill/>
-        </a:ln>
-        <a:effectLst/>
-      </dsp:spPr>
-      <dsp:style>
-        <a:lnRef idx="0">
-          <a:scrgbClr r="0" g="0" b="0"/>
-        </a:lnRef>
-        <a:fillRef idx="1">
-          <a:scrgbClr r="0" g="0" b="0"/>
-        </a:fillRef>
-        <a:effectRef idx="1">
-          <a:scrgbClr r="0" g="0" b="0"/>
-        </a:effectRef>
-        <a:fontRef idx="minor">
-          <a:schemeClr val="lt1"/>
-        </a:fontRef>
-      </dsp:style>
-      <dsp:txBody>
-        <a:bodyPr spcFirstLastPara="0" vert="horz" wrap="square" lIns="0" tIns="0" rIns="0" bIns="0" numCol="1" spcCol="1270" anchor="ctr" anchorCtr="0">
-          <a:noAutofit/>
-        </a:bodyPr>
-        <a:lstStyle/>
-        <a:p>
-          <a:pPr lvl="0" algn="ctr" defTabSz="711200">
-            <a:lnSpc>
-              <a:spcPct val="90000"/>
-            </a:lnSpc>
-            <a:spcBef>
-              <a:spcPct val="0"/>
-            </a:spcBef>
-            <a:spcAft>
-              <a:spcPct val="35000"/>
-            </a:spcAft>
-          </a:pPr>
-          <a:endParaRPr lang="en-US" sz="1600" kern="1200"/>
-        </a:p>
-      </dsp:txBody>
-      <dsp:txXfrm>
-        <a:off x="8970725" y="3113078"/>
-        <a:ext cx="341147" cy="342067"/>
-      </dsp:txXfrm>
-    </dsp:sp>
-    <dsp:sp modelId="{5A35CF05-8EA4-415C-9F34-B2DBE5E0CD3D}">
-      <dsp:nvSpPr>
-        <dsp:cNvPr id="0" name=""/>
-        <dsp:cNvSpPr/>
-      </dsp:nvSpPr>
-      <dsp:spPr>
-        <a:xfrm>
-          <a:off x="9660377" y="2594460"/>
-          <a:ext cx="2298837" cy="1379302"/>
-        </a:xfrm>
-        <a:prstGeom prst="roundRect">
-          <a:avLst>
-            <a:gd name="adj" fmla="val 10000"/>
-          </a:avLst>
-        </a:prstGeom>
-        <a:solidFill>
-          <a:schemeClr val="accent3">
-            <a:hueOff val="0"/>
-            <a:satOff val="0"/>
-            <a:lumOff val="0"/>
-            <a:alphaOff val="0"/>
-          </a:schemeClr>
-        </a:solidFill>
-        <a:ln w="28575" cap="rnd" cmpd="sng" algn="ctr">
-          <a:solidFill>
-            <a:schemeClr val="lt1">
-              <a:hueOff val="0"/>
-              <a:satOff val="0"/>
-              <a:lumOff val="0"/>
-              <a:alphaOff val="0"/>
-            </a:schemeClr>
-          </a:solidFill>
-          <a:prstDash val="solid"/>
-        </a:ln>
-        <a:effectLst/>
-      </dsp:spPr>
-      <dsp:style>
-        <a:lnRef idx="3">
-          <a:scrgbClr r="0" g="0" b="0"/>
-        </a:lnRef>
-        <a:fillRef idx="1">
-          <a:scrgbClr r="0" g="0" b="0"/>
-        </a:fillRef>
-        <a:effectRef idx="1">
-          <a:scrgbClr r="0" g="0" b="0"/>
-        </a:effectRef>
-        <a:fontRef idx="minor">
-          <a:schemeClr val="lt1"/>
-        </a:fontRef>
-      </dsp:style>
-      <dsp:txBody>
-        <a:bodyPr spcFirstLastPara="0" vert="horz" wrap="square" lIns="76200" tIns="76200" rIns="76200" bIns="76200" numCol="1" spcCol="1270" anchor="ctr" anchorCtr="0">
-          <a:noAutofit/>
-        </a:bodyPr>
-        <a:lstStyle/>
-        <a:p>
-          <a:pPr lvl="0" algn="ctr" defTabSz="889000">
-            <a:lnSpc>
-              <a:spcPct val="90000"/>
-            </a:lnSpc>
-            <a:spcBef>
-              <a:spcPct val="0"/>
-            </a:spcBef>
-            <a:spcAft>
-              <a:spcPct val="35000"/>
-            </a:spcAft>
-          </a:pPr>
-          <a:r>
-            <a:rPr lang="es-CR" sz="2000" kern="1200" dirty="0" smtClean="0"/>
-            <a:t>Documentación Viva</a:t>
-          </a:r>
-          <a:endParaRPr lang="en-US" sz="2000" kern="1200" dirty="0"/>
-        </a:p>
-      </dsp:txBody>
-      <dsp:txXfrm>
-        <a:off x="9700775" y="2634858"/>
-        <a:ext cx="2218041" cy="1298506"/>
-      </dsp:txXfrm>
-    </dsp:sp>
-  </dsp:spTree>
-</dsp:drawing>
-</file>
-
 <file path=ppt/diagrams/layout1.xml><?xml version="1.0" encoding="utf-8"?>
-<dgm:layoutDef xmlns:dgm="http://schemas.openxmlformats.org/drawingml/2006/diagram" xmlns:a="http://schemas.openxmlformats.org/drawingml/2006/main" uniqueId="urn:microsoft.com/office/officeart/2005/8/layout/process1">
-  <dgm:title val=""/>
-  <dgm:desc val=""/>
-  <dgm:catLst>
-    <dgm:cat type="process" pri="1000"/>
-    <dgm:cat type="convert" pri="15000"/>
-  </dgm:catLst>
-  <dgm:sampData useDef="1">
-    <dgm:dataModel>
-      <dgm:ptLst/>
-      <dgm:bg/>
-      <dgm:whole/>
-    </dgm:dataModel>
-  </dgm:sampData>
-  <dgm:styleData>
-    <dgm:dataModel>
-      <dgm:ptLst>
-        <dgm:pt modelId="0" type="doc"/>
-        <dgm:pt modelId="1"/>
-        <dgm:pt modelId="2"/>
-      </dgm:ptLst>
-      <dgm:cxnLst>
-        <dgm:cxn modelId="3" srcId="0" destId="1" srcOrd="0" destOrd="0"/>
-        <dgm:cxn modelId="4" srcId="0" destId="2" srcOrd="1" destOrd="0"/>
-      </dgm:cxnLst>
-      <dgm:bg/>
-      <dgm:whole/>
-    </dgm:dataModel>
-  </dgm:styleData>
-  <dgm:clrData>
-    <dgm:dataModel>
-      <dgm:ptLst>
-        <dgm:pt modelId="0" type="doc"/>
-        <dgm:pt modelId="1"/>
-        <dgm:pt modelId="2"/>
-        <dgm:pt modelId="3"/>
-        <dgm:pt modelId="4"/>
-      </dgm:ptLst>
-      <dgm:cxnLst>
-        <dgm:cxn modelId="5" srcId="0" destId="1" srcOrd="0" destOrd="0"/>
-        <dgm:cxn modelId="6" srcId="0" destId="2" srcOrd="1" destOrd="0"/>
-        <dgm:cxn modelId="7" srcId="0" destId="3" srcOrd="2" destOrd="0"/>
-        <dgm:cxn modelId="8" srcId="0" destId="4" srcOrd="3" destOrd="0"/>
-      </dgm:cxnLst>
-      <dgm:bg/>
-      <dgm:whole/>
-    </dgm:dataModel>
-  </dgm:clrData>
-  <dgm:layoutNode name="Name0">
-    <dgm:varLst>
-      <dgm:dir/>
-      <dgm:resizeHandles val="exact"/>
-    </dgm:varLst>
-    <dgm:choose name="Name1">
-      <dgm:if name="Name2" func="var" arg="dir" op="equ" val="norm">
-        <dgm:alg type="lin"/>
-      </dgm:if>
-      <dgm:else name="Name3">
-        <dgm:alg type="lin">
-          <dgm:param type="linDir" val="fromR"/>
-        </dgm:alg>
-      </dgm:else>
-    </dgm:choose>
-    <dgm:shape xmlns:r="http://schemas.openxmlformats.org/officeDocument/2006/relationships" r:blip="">
-      <dgm:adjLst/>
-    </dgm:shape>
-    <dgm:presOf/>
-    <dgm:constrLst>
-      <dgm:constr type="w" for="ch" ptType="node" refType="w"/>
-      <dgm:constr type="h" for="ch" ptType="node" op="equ"/>
-      <dgm:constr type="primFontSz" for="ch" ptType="node" op="equ" val="65"/>
-      <dgm:constr type="w" for="ch" ptType="sibTrans" refType="w" refFor="ch" refPtType="node" op="equ" fact="0.4"/>
-      <dgm:constr type="h" for="ch" ptType="sibTrans" op="equ"/>
-      <dgm:constr type="primFontSz" for="des" forName="connectorText" op="equ" val="55"/>
-      <dgm:constr type="primFontSz" for="des" forName="connectorText" refType="primFontSz" refFor="ch" refPtType="node" op="lte" fact="0.8"/>
-    </dgm:constrLst>
-    <dgm:ruleLst/>
-    <dgm:forEach name="nodesForEach" axis="ch" ptType="node">
-      <dgm:layoutNode name="node">
-        <dgm:varLst>
-          <dgm:bulletEnabled val="1"/>
-        </dgm:varLst>
-        <dgm:alg type="tx"/>
-        <dgm:shape xmlns:r="http://schemas.openxmlformats.org/officeDocument/2006/relationships" type="roundRect" r:blip="">
-          <dgm:adjLst>
-            <dgm:adj idx="1" val="0.1"/>
-          </dgm:adjLst>
-        </dgm:shape>
-        <dgm:presOf axis="desOrSelf" ptType="node"/>
-        <dgm:constrLst>
-          <dgm:constr type="h" refType="w" fact="0.6"/>
-          <dgm:constr type="tMarg" refType="primFontSz" fact="0.3"/>
-          <dgm:constr type="bMarg" refType="primFontSz" fact="0.3"/>
-          <dgm:constr type="lMarg" refType="primFontSz" fact="0.3"/>
-          <dgm:constr type="rMarg" refType="primFontSz" fact="0.3"/>
-        </dgm:constrLst>
-        <dgm:ruleLst>
-          <dgm:rule type="primFontSz" val="18" fact="NaN" max="NaN"/>
-          <dgm:rule type="h" val="NaN" fact="1.5" max="NaN"/>
-          <dgm:rule type="primFontSz" val="5" fact="NaN" max="NaN"/>
-          <dgm:rule type="h" val="INF" fact="NaN" max="NaN"/>
-        </dgm:ruleLst>
-      </dgm:layoutNode>
-      <dgm:forEach name="sibTransForEach" axis="followSib" ptType="sibTrans" cnt="1">
-        <dgm:layoutNode name="sibTrans">
-          <dgm:alg type="conn">
-            <dgm:param type="begPts" val="auto"/>
-            <dgm:param type="endPts" val="auto"/>
-          </dgm:alg>
-          <dgm:shape xmlns:r="http://schemas.openxmlformats.org/officeDocument/2006/relationships" type="conn" r:blip="">
-            <dgm:adjLst/>
-          </dgm:shape>
-          <dgm:presOf axis="self"/>
-          <dgm:constrLst>
-            <dgm:constr type="h" refType="w" fact="0.62"/>
-            <dgm:constr type="connDist"/>
-            <dgm:constr type="begPad" refType="connDist" fact="0.25"/>
-            <dgm:constr type="endPad" refType="connDist" fact="0.22"/>
-          </dgm:constrLst>
-          <dgm:ruleLst/>
-          <dgm:layoutNode name="connectorText">
-            <dgm:alg type="tx">
-              <dgm:param type="autoTxRot" val="grav"/>
-            </dgm:alg>
-            <dgm:shape xmlns:r="http://schemas.openxmlformats.org/officeDocument/2006/relationships" type="conn" r:blip="" hideGeom="1">
-              <dgm:adjLst/>
-            </dgm:shape>
-            <dgm:presOf axis="self"/>
-            <dgm:constrLst>
-              <dgm:constr type="lMarg"/>
-              <dgm:constr type="rMarg"/>
-              <dgm:constr type="tMarg"/>
-              <dgm:constr type="bMarg"/>
-            </dgm:constrLst>
-            <dgm:ruleLst>
-              <dgm:rule type="primFontSz" val="5" fact="NaN" max="NaN"/>
-            </dgm:ruleLst>
-          </dgm:layoutNode>
-        </dgm:layoutNode>
-      </dgm:forEach>
-    </dgm:forEach>
-  </dgm:layoutNode>
-</dgm:layoutDef>
-</file>
-
-<file path=ppt/diagrams/layout2.xml><?xml version="1.0" encoding="utf-8"?>
 <dgm:layoutDef xmlns:dgm="http://schemas.openxmlformats.org/drawingml/2006/diagram" xmlns:a="http://schemas.openxmlformats.org/drawingml/2006/main" uniqueId="urn:microsoft.com/office/officeart/2005/8/layout/process1">
   <dgm:title val=""/>
   <dgm:desc val=""/>
@@ -4750,1040 +2980,6 @@
 </dgm:styleDef>
 </file>
 
-<file path=ppt/diagrams/quickStyle2.xml><?xml version="1.0" encoding="utf-8"?>
-<dgm:styleDef xmlns:dgm="http://schemas.openxmlformats.org/drawingml/2006/diagram" xmlns:a="http://schemas.openxmlformats.org/drawingml/2006/main" uniqueId="urn:microsoft.com/office/officeart/2005/8/quickstyle/simple2">
-  <dgm:title val=""/>
-  <dgm:desc val=""/>
-  <dgm:catLst>
-    <dgm:cat type="simple" pri="10200"/>
-  </dgm:catLst>
-  <dgm:scene3d>
-    <a:camera prst="orthographicFront"/>
-    <a:lightRig rig="threePt" dir="t"/>
-  </dgm:scene3d>
-  <dgm:styleLbl name="node0">
-    <dgm:scene3d>
-      <a:camera prst="orthographicFront"/>
-      <a:lightRig rig="threePt" dir="t"/>
-    </dgm:scene3d>
-    <dgm:sp3d/>
-    <dgm:txPr/>
-    <dgm:style>
-      <a:lnRef idx="3">
-        <a:scrgbClr r="0" g="0" b="0"/>
-      </a:lnRef>
-      <a:fillRef idx="1">
-        <a:scrgbClr r="0" g="0" b="0"/>
-      </a:fillRef>
-      <a:effectRef idx="1">
-        <a:scrgbClr r="0" g="0" b="0"/>
-      </a:effectRef>
-      <a:fontRef idx="minor">
-        <a:schemeClr val="lt1"/>
-      </a:fontRef>
-    </dgm:style>
-  </dgm:styleLbl>
-  <dgm:styleLbl name="lnNode1">
-    <dgm:scene3d>
-      <a:camera prst="orthographicFront"/>
-      <a:lightRig rig="threePt" dir="t"/>
-    </dgm:scene3d>
-    <dgm:sp3d/>
-    <dgm:txPr/>
-    <dgm:style>
-      <a:lnRef idx="3">
-        <a:scrgbClr r="0" g="0" b="0"/>
-      </a:lnRef>
-      <a:fillRef idx="1">
-        <a:scrgbClr r="0" g="0" b="0"/>
-      </a:fillRef>
-      <a:effectRef idx="1">
-        <a:scrgbClr r="0" g="0" b="0"/>
-      </a:effectRef>
-      <a:fontRef idx="minor">
-        <a:schemeClr val="lt1"/>
-      </a:fontRef>
-    </dgm:style>
-  </dgm:styleLbl>
-  <dgm:styleLbl name="vennNode1">
-    <dgm:scene3d>
-      <a:camera prst="orthographicFront"/>
-      <a:lightRig rig="threePt" dir="t"/>
-    </dgm:scene3d>
-    <dgm:sp3d/>
-    <dgm:txPr/>
-    <dgm:style>
-      <a:lnRef idx="3">
-        <a:scrgbClr r="0" g="0" b="0"/>
-      </a:lnRef>
-      <a:fillRef idx="1">
-        <a:scrgbClr r="0" g="0" b="0"/>
-      </a:fillRef>
-      <a:effectRef idx="0">
-        <a:scrgbClr r="0" g="0" b="0"/>
-      </a:effectRef>
-      <a:fontRef idx="minor">
-        <a:schemeClr val="tx1"/>
-      </a:fontRef>
-    </dgm:style>
-  </dgm:styleLbl>
-  <dgm:styleLbl name="alignNode1">
-    <dgm:scene3d>
-      <a:camera prst="orthographicFront"/>
-      <a:lightRig rig="threePt" dir="t"/>
-    </dgm:scene3d>
-    <dgm:sp3d/>
-    <dgm:txPr/>
-    <dgm:style>
-      <a:lnRef idx="2">
-        <a:scrgbClr r="0" g="0" b="0"/>
-      </a:lnRef>
-      <a:fillRef idx="1">
-        <a:scrgbClr r="0" g="0" b="0"/>
-      </a:fillRef>
-      <a:effectRef idx="1">
-        <a:scrgbClr r="0" g="0" b="0"/>
-      </a:effectRef>
-      <a:fontRef idx="minor">
-        <a:schemeClr val="lt1"/>
-      </a:fontRef>
-    </dgm:style>
-  </dgm:styleLbl>
-  <dgm:styleLbl name="node1">
-    <dgm:scene3d>
-      <a:camera prst="orthographicFront"/>
-      <a:lightRig rig="threePt" dir="t"/>
-    </dgm:scene3d>
-    <dgm:sp3d/>
-    <dgm:txPr/>
-    <dgm:style>
-      <a:lnRef idx="3">
-        <a:scrgbClr r="0" g="0" b="0"/>
-      </a:lnRef>
-      <a:fillRef idx="1">
-        <a:scrgbClr r="0" g="0" b="0"/>
-      </a:fillRef>
-      <a:effectRef idx="1">
-        <a:scrgbClr r="0" g="0" b="0"/>
-      </a:effectRef>
-      <a:fontRef idx="minor">
-        <a:schemeClr val="lt1"/>
-      </a:fontRef>
-    </dgm:style>
-  </dgm:styleLbl>
-  <dgm:styleLbl name="node2">
-    <dgm:scene3d>
-      <a:camera prst="orthographicFront"/>
-      <a:lightRig rig="threePt" dir="t"/>
-    </dgm:scene3d>
-    <dgm:sp3d/>
-    <dgm:txPr/>
-    <dgm:style>
-      <a:lnRef idx="3">
-        <a:scrgbClr r="0" g="0" b="0"/>
-      </a:lnRef>
-      <a:fillRef idx="1">
-        <a:scrgbClr r="0" g="0" b="0"/>
-      </a:fillRef>
-      <a:effectRef idx="1">
-        <a:scrgbClr r="0" g="0" b="0"/>
-      </a:effectRef>
-      <a:fontRef idx="minor">
-        <a:schemeClr val="lt1"/>
-      </a:fontRef>
-    </dgm:style>
-  </dgm:styleLbl>
-  <dgm:styleLbl name="node3">
-    <dgm:scene3d>
-      <a:camera prst="orthographicFront"/>
-      <a:lightRig rig="threePt" dir="t"/>
-    </dgm:scene3d>
-    <dgm:sp3d/>
-    <dgm:txPr/>
-    <dgm:style>
-      <a:lnRef idx="3">
-        <a:scrgbClr r="0" g="0" b="0"/>
-      </a:lnRef>
-      <a:fillRef idx="1">
-        <a:scrgbClr r="0" g="0" b="0"/>
-      </a:fillRef>
-      <a:effectRef idx="1">
-        <a:scrgbClr r="0" g="0" b="0"/>
-      </a:effectRef>
-      <a:fontRef idx="minor">
-        <a:schemeClr val="lt1"/>
-      </a:fontRef>
-    </dgm:style>
-  </dgm:styleLbl>
-  <dgm:styleLbl name="node4">
-    <dgm:scene3d>
-      <a:camera prst="orthographicFront"/>
-      <a:lightRig rig="threePt" dir="t"/>
-    </dgm:scene3d>
-    <dgm:sp3d/>
-    <dgm:txPr/>
-    <dgm:style>
-      <a:lnRef idx="3">
-        <a:scrgbClr r="0" g="0" b="0"/>
-      </a:lnRef>
-      <a:fillRef idx="1">
-        <a:scrgbClr r="0" g="0" b="0"/>
-      </a:fillRef>
-      <a:effectRef idx="1">
-        <a:scrgbClr r="0" g="0" b="0"/>
-      </a:effectRef>
-      <a:fontRef idx="minor">
-        <a:schemeClr val="lt1"/>
-      </a:fontRef>
-    </dgm:style>
-  </dgm:styleLbl>
-  <dgm:styleLbl name="fgImgPlace1">
-    <dgm:scene3d>
-      <a:camera prst="orthographicFront"/>
-      <a:lightRig rig="threePt" dir="t"/>
-    </dgm:scene3d>
-    <dgm:sp3d/>
-    <dgm:txPr/>
-    <dgm:style>
-      <a:lnRef idx="3">
-        <a:scrgbClr r="0" g="0" b="0"/>
-      </a:lnRef>
-      <a:fillRef idx="1">
-        <a:scrgbClr r="0" g="0" b="0"/>
-      </a:fillRef>
-      <a:effectRef idx="1">
-        <a:scrgbClr r="0" g="0" b="0"/>
-      </a:effectRef>
-      <a:fontRef idx="minor"/>
-    </dgm:style>
-  </dgm:styleLbl>
-  <dgm:styleLbl name="alignImgPlace1">
-    <dgm:scene3d>
-      <a:camera prst="orthographicFront"/>
-      <a:lightRig rig="threePt" dir="t"/>
-    </dgm:scene3d>
-    <dgm:sp3d/>
-    <dgm:txPr/>
-    <dgm:style>
-      <a:lnRef idx="3">
-        <a:scrgbClr r="0" g="0" b="0"/>
-      </a:lnRef>
-      <a:fillRef idx="1">
-        <a:scrgbClr r="0" g="0" b="0"/>
-      </a:fillRef>
-      <a:effectRef idx="1">
-        <a:scrgbClr r="0" g="0" b="0"/>
-      </a:effectRef>
-      <a:fontRef idx="minor"/>
-    </dgm:style>
-  </dgm:styleLbl>
-  <dgm:styleLbl name="bgImgPlace1">
-    <dgm:scene3d>
-      <a:camera prst="orthographicFront"/>
-      <a:lightRig rig="threePt" dir="t"/>
-    </dgm:scene3d>
-    <dgm:sp3d/>
-    <dgm:txPr/>
-    <dgm:style>
-      <a:lnRef idx="3">
-        <a:scrgbClr r="0" g="0" b="0"/>
-      </a:lnRef>
-      <a:fillRef idx="1">
-        <a:scrgbClr r="0" g="0" b="0"/>
-      </a:fillRef>
-      <a:effectRef idx="1">
-        <a:scrgbClr r="0" g="0" b="0"/>
-      </a:effectRef>
-      <a:fontRef idx="minor"/>
-    </dgm:style>
-  </dgm:styleLbl>
-  <dgm:styleLbl name="sibTrans2D1">
-    <dgm:scene3d>
-      <a:camera prst="orthographicFront"/>
-      <a:lightRig rig="threePt" dir="t"/>
-    </dgm:scene3d>
-    <dgm:sp3d/>
-    <dgm:txPr/>
-    <dgm:style>
-      <a:lnRef idx="0">
-        <a:scrgbClr r="0" g="0" b="0"/>
-      </a:lnRef>
-      <a:fillRef idx="1">
-        <a:scrgbClr r="0" g="0" b="0"/>
-      </a:fillRef>
-      <a:effectRef idx="1">
-        <a:scrgbClr r="0" g="0" b="0"/>
-      </a:effectRef>
-      <a:fontRef idx="minor">
-        <a:schemeClr val="lt1"/>
-      </a:fontRef>
-    </dgm:style>
-  </dgm:styleLbl>
-  <dgm:styleLbl name="fgSibTrans2D1">
-    <dgm:scene3d>
-      <a:camera prst="orthographicFront"/>
-      <a:lightRig rig="threePt" dir="t"/>
-    </dgm:scene3d>
-    <dgm:sp3d/>
-    <dgm:txPr/>
-    <dgm:style>
-      <a:lnRef idx="0">
-        <a:scrgbClr r="0" g="0" b="0"/>
-      </a:lnRef>
-      <a:fillRef idx="1">
-        <a:scrgbClr r="0" g="0" b="0"/>
-      </a:fillRef>
-      <a:effectRef idx="1">
-        <a:scrgbClr r="0" g="0" b="0"/>
-      </a:effectRef>
-      <a:fontRef idx="minor">
-        <a:schemeClr val="lt1"/>
-      </a:fontRef>
-    </dgm:style>
-  </dgm:styleLbl>
-  <dgm:styleLbl name="bgSibTrans2D1">
-    <dgm:scene3d>
-      <a:camera prst="orthographicFront"/>
-      <a:lightRig rig="threePt" dir="t"/>
-    </dgm:scene3d>
-    <dgm:sp3d/>
-    <dgm:txPr/>
-    <dgm:style>
-      <a:lnRef idx="0">
-        <a:scrgbClr r="0" g="0" b="0"/>
-      </a:lnRef>
-      <a:fillRef idx="1">
-        <a:scrgbClr r="0" g="0" b="0"/>
-      </a:fillRef>
-      <a:effectRef idx="1">
-        <a:scrgbClr r="0" g="0" b="0"/>
-      </a:effectRef>
-      <a:fontRef idx="minor">
-        <a:schemeClr val="lt1"/>
-      </a:fontRef>
-    </dgm:style>
-  </dgm:styleLbl>
-  <dgm:styleLbl name="sibTrans1D1">
-    <dgm:scene3d>
-      <a:camera prst="orthographicFront"/>
-      <a:lightRig rig="threePt" dir="t"/>
-    </dgm:scene3d>
-    <dgm:sp3d/>
-    <dgm:txPr/>
-    <dgm:style>
-      <a:lnRef idx="1">
-        <a:scrgbClr r="0" g="0" b="0"/>
-      </a:lnRef>
-      <a:fillRef idx="0">
-        <a:scrgbClr r="0" g="0" b="0"/>
-      </a:fillRef>
-      <a:effectRef idx="0">
-        <a:scrgbClr r="0" g="0" b="0"/>
-      </a:effectRef>
-      <a:fontRef idx="minor"/>
-    </dgm:style>
-  </dgm:styleLbl>
-  <dgm:styleLbl name="callout">
-    <dgm:scene3d>
-      <a:camera prst="orthographicFront"/>
-      <a:lightRig rig="threePt" dir="t"/>
-    </dgm:scene3d>
-    <dgm:sp3d/>
-    <dgm:txPr/>
-    <dgm:style>
-      <a:lnRef idx="2">
-        <a:scrgbClr r="0" g="0" b="0"/>
-      </a:lnRef>
-      <a:fillRef idx="1">
-        <a:scrgbClr r="0" g="0" b="0"/>
-      </a:fillRef>
-      <a:effectRef idx="1">
-        <a:scrgbClr r="0" g="0" b="0"/>
-      </a:effectRef>
-      <a:fontRef idx="minor"/>
-    </dgm:style>
-  </dgm:styleLbl>
-  <dgm:styleLbl name="asst0">
-    <dgm:scene3d>
-      <a:camera prst="orthographicFront"/>
-      <a:lightRig rig="threePt" dir="t"/>
-    </dgm:scene3d>
-    <dgm:sp3d/>
-    <dgm:txPr/>
-    <dgm:style>
-      <a:lnRef idx="3">
-        <a:scrgbClr r="0" g="0" b="0"/>
-      </a:lnRef>
-      <a:fillRef idx="1">
-        <a:scrgbClr r="0" g="0" b="0"/>
-      </a:fillRef>
-      <a:effectRef idx="1">
-        <a:scrgbClr r="0" g="0" b="0"/>
-      </a:effectRef>
-      <a:fontRef idx="minor">
-        <a:schemeClr val="lt1"/>
-      </a:fontRef>
-    </dgm:style>
-  </dgm:styleLbl>
-  <dgm:styleLbl name="asst1">
-    <dgm:scene3d>
-      <a:camera prst="orthographicFront"/>
-      <a:lightRig rig="threePt" dir="t"/>
-    </dgm:scene3d>
-    <dgm:sp3d/>
-    <dgm:txPr/>
-    <dgm:style>
-      <a:lnRef idx="3">
-        <a:scrgbClr r="0" g="0" b="0"/>
-      </a:lnRef>
-      <a:fillRef idx="1">
-        <a:scrgbClr r="0" g="0" b="0"/>
-      </a:fillRef>
-      <a:effectRef idx="1">
-        <a:scrgbClr r="0" g="0" b="0"/>
-      </a:effectRef>
-      <a:fontRef idx="minor">
-        <a:schemeClr val="lt1"/>
-      </a:fontRef>
-    </dgm:style>
-  </dgm:styleLbl>
-  <dgm:styleLbl name="asst2">
-    <dgm:scene3d>
-      <a:camera prst="orthographicFront"/>
-      <a:lightRig rig="threePt" dir="t"/>
-    </dgm:scene3d>
-    <dgm:sp3d/>
-    <dgm:txPr/>
-    <dgm:style>
-      <a:lnRef idx="3">
-        <a:scrgbClr r="0" g="0" b="0"/>
-      </a:lnRef>
-      <a:fillRef idx="1">
-        <a:scrgbClr r="0" g="0" b="0"/>
-      </a:fillRef>
-      <a:effectRef idx="1">
-        <a:scrgbClr r="0" g="0" b="0"/>
-      </a:effectRef>
-      <a:fontRef idx="minor">
-        <a:schemeClr val="lt1"/>
-      </a:fontRef>
-    </dgm:style>
-  </dgm:styleLbl>
-  <dgm:styleLbl name="asst3">
-    <dgm:scene3d>
-      <a:camera prst="orthographicFront"/>
-      <a:lightRig rig="threePt" dir="t"/>
-    </dgm:scene3d>
-    <dgm:sp3d/>
-    <dgm:txPr/>
-    <dgm:style>
-      <a:lnRef idx="3">
-        <a:scrgbClr r="0" g="0" b="0"/>
-      </a:lnRef>
-      <a:fillRef idx="1">
-        <a:scrgbClr r="0" g="0" b="0"/>
-      </a:fillRef>
-      <a:effectRef idx="1">
-        <a:scrgbClr r="0" g="0" b="0"/>
-      </a:effectRef>
-      <a:fontRef idx="minor">
-        <a:schemeClr val="lt1"/>
-      </a:fontRef>
-    </dgm:style>
-  </dgm:styleLbl>
-  <dgm:styleLbl name="asst4">
-    <dgm:scene3d>
-      <a:camera prst="orthographicFront"/>
-      <a:lightRig rig="threePt" dir="t"/>
-    </dgm:scene3d>
-    <dgm:sp3d/>
-    <dgm:txPr/>
-    <dgm:style>
-      <a:lnRef idx="3">
-        <a:scrgbClr r="0" g="0" b="0"/>
-      </a:lnRef>
-      <a:fillRef idx="1">
-        <a:scrgbClr r="0" g="0" b="0"/>
-      </a:fillRef>
-      <a:effectRef idx="1">
-        <a:scrgbClr r="0" g="0" b="0"/>
-      </a:effectRef>
-      <a:fontRef idx="minor">
-        <a:schemeClr val="lt1"/>
-      </a:fontRef>
-    </dgm:style>
-  </dgm:styleLbl>
-  <dgm:styleLbl name="parChTrans2D1">
-    <dgm:scene3d>
-      <a:camera prst="orthographicFront"/>
-      <a:lightRig rig="threePt" dir="t"/>
-    </dgm:scene3d>
-    <dgm:sp3d/>
-    <dgm:txPr/>
-    <dgm:style>
-      <a:lnRef idx="3">
-        <a:scrgbClr r="0" g="0" b="0"/>
-      </a:lnRef>
-      <a:fillRef idx="1">
-        <a:scrgbClr r="0" g="0" b="0"/>
-      </a:fillRef>
-      <a:effectRef idx="1">
-        <a:scrgbClr r="0" g="0" b="0"/>
-      </a:effectRef>
-      <a:fontRef idx="minor">
-        <a:schemeClr val="lt1"/>
-      </a:fontRef>
-    </dgm:style>
-  </dgm:styleLbl>
-  <dgm:styleLbl name="parChTrans2D2">
-    <dgm:scene3d>
-      <a:camera prst="orthographicFront"/>
-      <a:lightRig rig="threePt" dir="t"/>
-    </dgm:scene3d>
-    <dgm:sp3d/>
-    <dgm:txPr/>
-    <dgm:style>
-      <a:lnRef idx="3">
-        <a:scrgbClr r="0" g="0" b="0"/>
-      </a:lnRef>
-      <a:fillRef idx="1">
-        <a:scrgbClr r="0" g="0" b="0"/>
-      </a:fillRef>
-      <a:effectRef idx="1">
-        <a:scrgbClr r="0" g="0" b="0"/>
-      </a:effectRef>
-      <a:fontRef idx="minor">
-        <a:schemeClr val="lt1"/>
-      </a:fontRef>
-    </dgm:style>
-  </dgm:styleLbl>
-  <dgm:styleLbl name="parChTrans2D3">
-    <dgm:scene3d>
-      <a:camera prst="orthographicFront"/>
-      <a:lightRig rig="threePt" dir="t"/>
-    </dgm:scene3d>
-    <dgm:sp3d/>
-    <dgm:txPr/>
-    <dgm:style>
-      <a:lnRef idx="3">
-        <a:scrgbClr r="0" g="0" b="0"/>
-      </a:lnRef>
-      <a:fillRef idx="1">
-        <a:scrgbClr r="0" g="0" b="0"/>
-      </a:fillRef>
-      <a:effectRef idx="1">
-        <a:scrgbClr r="0" g="0" b="0"/>
-      </a:effectRef>
-      <a:fontRef idx="minor">
-        <a:schemeClr val="lt1"/>
-      </a:fontRef>
-    </dgm:style>
-  </dgm:styleLbl>
-  <dgm:styleLbl name="parChTrans2D4">
-    <dgm:scene3d>
-      <a:camera prst="orthographicFront"/>
-      <a:lightRig rig="threePt" dir="t"/>
-    </dgm:scene3d>
-    <dgm:sp3d/>
-    <dgm:txPr/>
-    <dgm:style>
-      <a:lnRef idx="3">
-        <a:scrgbClr r="0" g="0" b="0"/>
-      </a:lnRef>
-      <a:fillRef idx="1">
-        <a:scrgbClr r="0" g="0" b="0"/>
-      </a:fillRef>
-      <a:effectRef idx="1">
-        <a:scrgbClr r="0" g="0" b="0"/>
-      </a:effectRef>
-      <a:fontRef idx="minor">
-        <a:schemeClr val="lt1"/>
-      </a:fontRef>
-    </dgm:style>
-  </dgm:styleLbl>
-  <dgm:styleLbl name="parChTrans1D1">
-    <dgm:scene3d>
-      <a:camera prst="orthographicFront"/>
-      <a:lightRig rig="threePt" dir="t"/>
-    </dgm:scene3d>
-    <dgm:sp3d/>
-    <dgm:txPr/>
-    <dgm:style>
-      <a:lnRef idx="2">
-        <a:scrgbClr r="0" g="0" b="0"/>
-      </a:lnRef>
-      <a:fillRef idx="0">
-        <a:scrgbClr r="0" g="0" b="0"/>
-      </a:fillRef>
-      <a:effectRef idx="0">
-        <a:scrgbClr r="0" g="0" b="0"/>
-      </a:effectRef>
-      <a:fontRef idx="minor"/>
-    </dgm:style>
-  </dgm:styleLbl>
-  <dgm:styleLbl name="parChTrans1D2">
-    <dgm:scene3d>
-      <a:camera prst="orthographicFront"/>
-      <a:lightRig rig="threePt" dir="t"/>
-    </dgm:scene3d>
-    <dgm:sp3d/>
-    <dgm:txPr/>
-    <dgm:style>
-      <a:lnRef idx="2">
-        <a:scrgbClr r="0" g="0" b="0"/>
-      </a:lnRef>
-      <a:fillRef idx="0">
-        <a:scrgbClr r="0" g="0" b="0"/>
-      </a:fillRef>
-      <a:effectRef idx="0">
-        <a:scrgbClr r="0" g="0" b="0"/>
-      </a:effectRef>
-      <a:fontRef idx="minor"/>
-    </dgm:style>
-  </dgm:styleLbl>
-  <dgm:styleLbl name="parChTrans1D3">
-    <dgm:scene3d>
-      <a:camera prst="orthographicFront"/>
-      <a:lightRig rig="threePt" dir="t"/>
-    </dgm:scene3d>
-    <dgm:sp3d/>
-    <dgm:txPr/>
-    <dgm:style>
-      <a:lnRef idx="2">
-        <a:scrgbClr r="0" g="0" b="0"/>
-      </a:lnRef>
-      <a:fillRef idx="0">
-        <a:scrgbClr r="0" g="0" b="0"/>
-      </a:fillRef>
-      <a:effectRef idx="0">
-        <a:scrgbClr r="0" g="0" b="0"/>
-      </a:effectRef>
-      <a:fontRef idx="minor"/>
-    </dgm:style>
-  </dgm:styleLbl>
-  <dgm:styleLbl name="parChTrans1D4">
-    <dgm:scene3d>
-      <a:camera prst="orthographicFront"/>
-      <a:lightRig rig="threePt" dir="t"/>
-    </dgm:scene3d>
-    <dgm:sp3d/>
-    <dgm:txPr/>
-    <dgm:style>
-      <a:lnRef idx="2">
-        <a:scrgbClr r="0" g="0" b="0"/>
-      </a:lnRef>
-      <a:fillRef idx="0">
-        <a:scrgbClr r="0" g="0" b="0"/>
-      </a:fillRef>
-      <a:effectRef idx="0">
-        <a:scrgbClr r="0" g="0" b="0"/>
-      </a:effectRef>
-      <a:fontRef idx="minor"/>
-    </dgm:style>
-  </dgm:styleLbl>
-  <dgm:styleLbl name="fgAcc1">
-    <dgm:scene3d>
-      <a:camera prst="orthographicFront"/>
-      <a:lightRig rig="threePt" dir="t"/>
-    </dgm:scene3d>
-    <dgm:sp3d/>
-    <dgm:txPr/>
-    <dgm:style>
-      <a:lnRef idx="2">
-        <a:scrgbClr r="0" g="0" b="0"/>
-      </a:lnRef>
-      <a:fillRef idx="1">
-        <a:scrgbClr r="0" g="0" b="0"/>
-      </a:fillRef>
-      <a:effectRef idx="0">
-        <a:scrgbClr r="0" g="0" b="0"/>
-      </a:effectRef>
-      <a:fontRef idx="minor"/>
-    </dgm:style>
-  </dgm:styleLbl>
-  <dgm:styleLbl name="conFgAcc1">
-    <dgm:scene3d>
-      <a:camera prst="orthographicFront"/>
-      <a:lightRig rig="threePt" dir="t"/>
-    </dgm:scene3d>
-    <dgm:sp3d/>
-    <dgm:txPr/>
-    <dgm:style>
-      <a:lnRef idx="2">
-        <a:scrgbClr r="0" g="0" b="0"/>
-      </a:lnRef>
-      <a:fillRef idx="1">
-        <a:scrgbClr r="0" g="0" b="0"/>
-      </a:fillRef>
-      <a:effectRef idx="0">
-        <a:scrgbClr r="0" g="0" b="0"/>
-      </a:effectRef>
-      <a:fontRef idx="minor"/>
-    </dgm:style>
-  </dgm:styleLbl>
-  <dgm:styleLbl name="alignAcc1">
-    <dgm:scene3d>
-      <a:camera prst="orthographicFront"/>
-      <a:lightRig rig="threePt" dir="t"/>
-    </dgm:scene3d>
-    <dgm:sp3d/>
-    <dgm:txPr/>
-    <dgm:style>
-      <a:lnRef idx="2">
-        <a:scrgbClr r="0" g="0" b="0"/>
-      </a:lnRef>
-      <a:fillRef idx="1">
-        <a:scrgbClr r="0" g="0" b="0"/>
-      </a:fillRef>
-      <a:effectRef idx="0">
-        <a:scrgbClr r="0" g="0" b="0"/>
-      </a:effectRef>
-      <a:fontRef idx="minor"/>
-    </dgm:style>
-  </dgm:styleLbl>
-  <dgm:styleLbl name="trAlignAcc1">
-    <dgm:scene3d>
-      <a:camera prst="orthographicFront"/>
-      <a:lightRig rig="threePt" dir="t"/>
-    </dgm:scene3d>
-    <dgm:sp3d/>
-    <dgm:txPr/>
-    <dgm:style>
-      <a:lnRef idx="1">
-        <a:scrgbClr r="0" g="0" b="0"/>
-      </a:lnRef>
-      <a:fillRef idx="1">
-        <a:scrgbClr r="0" g="0" b="0"/>
-      </a:fillRef>
-      <a:effectRef idx="0">
-        <a:scrgbClr r="0" g="0" b="0"/>
-      </a:effectRef>
-      <a:fontRef idx="minor"/>
-    </dgm:style>
-  </dgm:styleLbl>
-  <dgm:styleLbl name="bgAcc1">
-    <dgm:scene3d>
-      <a:camera prst="orthographicFront"/>
-      <a:lightRig rig="threePt" dir="t"/>
-    </dgm:scene3d>
-    <dgm:sp3d/>
-    <dgm:txPr/>
-    <dgm:style>
-      <a:lnRef idx="2">
-        <a:scrgbClr r="0" g="0" b="0"/>
-      </a:lnRef>
-      <a:fillRef idx="1">
-        <a:scrgbClr r="0" g="0" b="0"/>
-      </a:fillRef>
-      <a:effectRef idx="0">
-        <a:scrgbClr r="0" g="0" b="0"/>
-      </a:effectRef>
-      <a:fontRef idx="minor"/>
-    </dgm:style>
-  </dgm:styleLbl>
-  <dgm:styleLbl name="solidFgAcc1">
-    <dgm:scene3d>
-      <a:camera prst="orthographicFront"/>
-      <a:lightRig rig="threePt" dir="t"/>
-    </dgm:scene3d>
-    <dgm:sp3d/>
-    <dgm:txPr/>
-    <dgm:style>
-      <a:lnRef idx="2">
-        <a:scrgbClr r="0" g="0" b="0"/>
-      </a:lnRef>
-      <a:fillRef idx="1">
-        <a:scrgbClr r="0" g="0" b="0"/>
-      </a:fillRef>
-      <a:effectRef idx="0">
-        <a:scrgbClr r="0" g="0" b="0"/>
-      </a:effectRef>
-      <a:fontRef idx="minor"/>
-    </dgm:style>
-  </dgm:styleLbl>
-  <dgm:styleLbl name="solidAlignAcc1">
-    <dgm:scene3d>
-      <a:camera prst="orthographicFront"/>
-      <a:lightRig rig="threePt" dir="t"/>
-    </dgm:scene3d>
-    <dgm:sp3d/>
-    <dgm:txPr/>
-    <dgm:style>
-      <a:lnRef idx="2">
-        <a:scrgbClr r="0" g="0" b="0"/>
-      </a:lnRef>
-      <a:fillRef idx="1">
-        <a:scrgbClr r="0" g="0" b="0"/>
-      </a:fillRef>
-      <a:effectRef idx="0">
-        <a:scrgbClr r="0" g="0" b="0"/>
-      </a:effectRef>
-      <a:fontRef idx="minor"/>
-    </dgm:style>
-  </dgm:styleLbl>
-  <dgm:styleLbl name="solidBgAcc1">
-    <dgm:scene3d>
-      <a:camera prst="orthographicFront"/>
-      <a:lightRig rig="threePt" dir="t"/>
-    </dgm:scene3d>
-    <dgm:sp3d/>
-    <dgm:txPr/>
-    <dgm:style>
-      <a:lnRef idx="2">
-        <a:scrgbClr r="0" g="0" b="0"/>
-      </a:lnRef>
-      <a:fillRef idx="1">
-        <a:scrgbClr r="0" g="0" b="0"/>
-      </a:fillRef>
-      <a:effectRef idx="0">
-        <a:scrgbClr r="0" g="0" b="0"/>
-      </a:effectRef>
-      <a:fontRef idx="minor"/>
-    </dgm:style>
-  </dgm:styleLbl>
-  <dgm:styleLbl name="fgAccFollowNode1">
-    <dgm:scene3d>
-      <a:camera prst="orthographicFront"/>
-      <a:lightRig rig="threePt" dir="t"/>
-    </dgm:scene3d>
-    <dgm:sp3d/>
-    <dgm:txPr/>
-    <dgm:style>
-      <a:lnRef idx="2">
-        <a:scrgbClr r="0" g="0" b="0"/>
-      </a:lnRef>
-      <a:fillRef idx="1">
-        <a:scrgbClr r="0" g="0" b="0"/>
-      </a:fillRef>
-      <a:effectRef idx="0">
-        <a:scrgbClr r="0" g="0" b="0"/>
-      </a:effectRef>
-      <a:fontRef idx="minor"/>
-    </dgm:style>
-  </dgm:styleLbl>
-  <dgm:styleLbl name="alignAccFollowNode1">
-    <dgm:scene3d>
-      <a:camera prst="orthographicFront"/>
-      <a:lightRig rig="threePt" dir="t"/>
-    </dgm:scene3d>
-    <dgm:sp3d/>
-    <dgm:txPr/>
-    <dgm:style>
-      <a:lnRef idx="2">
-        <a:scrgbClr r="0" g="0" b="0"/>
-      </a:lnRef>
-      <a:fillRef idx="1">
-        <a:scrgbClr r="0" g="0" b="0"/>
-      </a:fillRef>
-      <a:effectRef idx="0">
-        <a:scrgbClr r="0" g="0" b="0"/>
-      </a:effectRef>
-      <a:fontRef idx="minor"/>
-    </dgm:style>
-  </dgm:styleLbl>
-  <dgm:styleLbl name="bgAccFollowNode1">
-    <dgm:scene3d>
-      <a:camera prst="orthographicFront"/>
-      <a:lightRig rig="threePt" dir="t"/>
-    </dgm:scene3d>
-    <dgm:sp3d/>
-    <dgm:txPr/>
-    <dgm:style>
-      <a:lnRef idx="2">
-        <a:scrgbClr r="0" g="0" b="0"/>
-      </a:lnRef>
-      <a:fillRef idx="1">
-        <a:scrgbClr r="0" g="0" b="0"/>
-      </a:fillRef>
-      <a:effectRef idx="0">
-        <a:scrgbClr r="0" g="0" b="0"/>
-      </a:effectRef>
-      <a:fontRef idx="minor"/>
-    </dgm:style>
-  </dgm:styleLbl>
-  <dgm:styleLbl name="fgAcc0">
-    <dgm:scene3d>
-      <a:camera prst="orthographicFront"/>
-      <a:lightRig rig="threePt" dir="t"/>
-    </dgm:scene3d>
-    <dgm:sp3d/>
-    <dgm:txPr/>
-    <dgm:style>
-      <a:lnRef idx="2">
-        <a:scrgbClr r="0" g="0" b="0"/>
-      </a:lnRef>
-      <a:fillRef idx="1">
-        <a:scrgbClr r="0" g="0" b="0"/>
-      </a:fillRef>
-      <a:effectRef idx="0">
-        <a:scrgbClr r="0" g="0" b="0"/>
-      </a:effectRef>
-      <a:fontRef idx="minor"/>
-    </dgm:style>
-  </dgm:styleLbl>
-  <dgm:styleLbl name="fgAcc2">
-    <dgm:scene3d>
-      <a:camera prst="orthographicFront"/>
-      <a:lightRig rig="threePt" dir="t"/>
-    </dgm:scene3d>
-    <dgm:sp3d/>
-    <dgm:txPr/>
-    <dgm:style>
-      <a:lnRef idx="2">
-        <a:scrgbClr r="0" g="0" b="0"/>
-      </a:lnRef>
-      <a:fillRef idx="1">
-        <a:scrgbClr r="0" g="0" b="0"/>
-      </a:fillRef>
-      <a:effectRef idx="0">
-        <a:scrgbClr r="0" g="0" b="0"/>
-      </a:effectRef>
-      <a:fontRef idx="minor"/>
-    </dgm:style>
-  </dgm:styleLbl>
-  <dgm:styleLbl name="fgAcc3">
-    <dgm:scene3d>
-      <a:camera prst="orthographicFront"/>
-      <a:lightRig rig="threePt" dir="t"/>
-    </dgm:scene3d>
-    <dgm:sp3d/>
-    <dgm:txPr/>
-    <dgm:style>
-      <a:lnRef idx="2">
-        <a:scrgbClr r="0" g="0" b="0"/>
-      </a:lnRef>
-      <a:fillRef idx="1">
-        <a:scrgbClr r="0" g="0" b="0"/>
-      </a:fillRef>
-      <a:effectRef idx="0">
-        <a:scrgbClr r="0" g="0" b="0"/>
-      </a:effectRef>
-      <a:fontRef idx="minor"/>
-    </dgm:style>
-  </dgm:styleLbl>
-  <dgm:styleLbl name="fgAcc4">
-    <dgm:scene3d>
-      <a:camera prst="orthographicFront"/>
-      <a:lightRig rig="threePt" dir="t"/>
-    </dgm:scene3d>
-    <dgm:sp3d/>
-    <dgm:txPr/>
-    <dgm:style>
-      <a:lnRef idx="2">
-        <a:scrgbClr r="0" g="0" b="0"/>
-      </a:lnRef>
-      <a:fillRef idx="1">
-        <a:scrgbClr r="0" g="0" b="0"/>
-      </a:fillRef>
-      <a:effectRef idx="0">
-        <a:scrgbClr r="0" g="0" b="0"/>
-      </a:effectRef>
-      <a:fontRef idx="minor"/>
-    </dgm:style>
-  </dgm:styleLbl>
-  <dgm:styleLbl name="bgShp">
-    <dgm:scene3d>
-      <a:camera prst="orthographicFront"/>
-      <a:lightRig rig="threePt" dir="t"/>
-    </dgm:scene3d>
-    <dgm:sp3d/>
-    <dgm:txPr/>
-    <dgm:style>
-      <a:lnRef idx="0">
-        <a:scrgbClr r="0" g="0" b="0"/>
-      </a:lnRef>
-      <a:fillRef idx="1">
-        <a:scrgbClr r="0" g="0" b="0"/>
-      </a:fillRef>
-      <a:effectRef idx="0">
-        <a:scrgbClr r="0" g="0" b="0"/>
-      </a:effectRef>
-      <a:fontRef idx="minor"/>
-    </dgm:style>
-  </dgm:styleLbl>
-  <dgm:styleLbl name="dkBgShp">
-    <dgm:scene3d>
-      <a:camera prst="orthographicFront"/>
-      <a:lightRig rig="threePt" dir="t"/>
-    </dgm:scene3d>
-    <dgm:sp3d/>
-    <dgm:txPr/>
-    <dgm:style>
-      <a:lnRef idx="0">
-        <a:scrgbClr r="0" g="0" b="0"/>
-      </a:lnRef>
-      <a:fillRef idx="1">
-        <a:scrgbClr r="0" g="0" b="0"/>
-      </a:fillRef>
-      <a:effectRef idx="0">
-        <a:scrgbClr r="0" g="0" b="0"/>
-      </a:effectRef>
-      <a:fontRef idx="minor"/>
-    </dgm:style>
-  </dgm:styleLbl>
-  <dgm:styleLbl name="trBgShp">
-    <dgm:scene3d>
-      <a:camera prst="orthographicFront"/>
-      <a:lightRig rig="threePt" dir="t"/>
-    </dgm:scene3d>
-    <dgm:sp3d/>
-    <dgm:txPr/>
-    <dgm:style>
-      <a:lnRef idx="0">
-        <a:scrgbClr r="0" g="0" b="0"/>
-      </a:lnRef>
-      <a:fillRef idx="1">
-        <a:scrgbClr r="0" g="0" b="0"/>
-      </a:fillRef>
-      <a:effectRef idx="0">
-        <a:scrgbClr r="0" g="0" b="0"/>
-      </a:effectRef>
-      <a:fontRef idx="minor"/>
-    </dgm:style>
-  </dgm:styleLbl>
-  <dgm:styleLbl name="fgShp">
-    <dgm:scene3d>
-      <a:camera prst="orthographicFront"/>
-      <a:lightRig rig="threePt" dir="t"/>
-    </dgm:scene3d>
-    <dgm:sp3d/>
-    <dgm:txPr/>
-    <dgm:style>
-      <a:lnRef idx="3">
-        <a:scrgbClr r="0" g="0" b="0"/>
-      </a:lnRef>
-      <a:fillRef idx="1">
-        <a:scrgbClr r="0" g="0" b="0"/>
-      </a:fillRef>
-      <a:effectRef idx="1">
-        <a:scrgbClr r="0" g="0" b="0"/>
-      </a:effectRef>
-      <a:fontRef idx="minor"/>
-    </dgm:style>
-  </dgm:styleLbl>
-  <dgm:styleLbl name="revTx">
-    <dgm:scene3d>
-      <a:camera prst="orthographicFront"/>
-      <a:lightRig rig="threePt" dir="t"/>
-    </dgm:scene3d>
-    <dgm:sp3d/>
-    <dgm:txPr/>
-    <dgm:style>
-      <a:lnRef idx="0">
-        <a:scrgbClr r="0" g="0" b="0"/>
-      </a:lnRef>
-      <a:fillRef idx="0">
-        <a:scrgbClr r="0" g="0" b="0"/>
-      </a:fillRef>
-      <a:effectRef idx="0">
-        <a:scrgbClr r="0" g="0" b="0"/>
-      </a:effectRef>
-      <a:fontRef idx="minor"/>
-    </dgm:style>
-  </dgm:styleLbl>
-</dgm:styleDef>
-</file>
-
 <file path=ppt/notesMasters/notesMaster1.xml><?xml version="1.0" encoding="utf-8"?>
 <p:notesMaster xmlns:a="http://schemas.openxmlformats.org/drawingml/2006/main" xmlns:r="http://schemas.openxmlformats.org/officeDocument/2006/relationships" xmlns:p="http://schemas.openxmlformats.org/presentationml/2006/main">
   <p:cSld>
@@ -5866,7 +3062,7 @@
           <a:p>
             <a:fld id="{41D56F23-EA9F-4617-B1DA-011EFD0CC45B}" type="datetimeFigureOut">
               <a:rPr lang="en-US" smtClean="0"/>
-              <a:t>6/2/2015</a:t>
+              <a:t>6/3/2015</a:t>
             </a:fld>
             <a:endParaRPr lang="en-US"/>
           </a:p>
@@ -7145,7 +4341,7 @@
           <a:p>
             <a:fld id="{4AAD347D-5ACD-4C99-B74B-A9C85AD731AF}" type="datetimeFigureOut">
               <a:rPr lang="en-US" smtClean="0"/>
-              <a:t>6/2/2015</a:t>
+              <a:t>6/3/2015</a:t>
             </a:fld>
             <a:endParaRPr lang="en-US" dirty="0"/>
           </a:p>
@@ -8233,7 +5429,7 @@
           <a:p>
             <a:fld id="{4AAD347D-5ACD-4C99-B74B-A9C85AD731AF}" type="datetimeFigureOut">
               <a:rPr lang="en-US" smtClean="0"/>
-              <a:t>6/2/2015</a:t>
+              <a:t>6/3/2015</a:t>
             </a:fld>
             <a:endParaRPr lang="en-US" dirty="0"/>
           </a:p>
@@ -9214,7 +6410,7 @@
           <a:p>
             <a:fld id="{4AAD347D-5ACD-4C99-B74B-A9C85AD731AF}" type="datetimeFigureOut">
               <a:rPr lang="en-US" smtClean="0"/>
-              <a:t>6/2/2015</a:t>
+              <a:t>6/3/2015</a:t>
             </a:fld>
             <a:endParaRPr lang="en-US" dirty="0"/>
           </a:p>
@@ -10349,7 +7545,7 @@
           <a:p>
             <a:fld id="{4AAD347D-5ACD-4C99-B74B-A9C85AD731AF}" type="datetimeFigureOut">
               <a:rPr lang="en-US" smtClean="0"/>
-              <a:t>6/2/2015</a:t>
+              <a:t>6/3/2015</a:t>
             </a:fld>
             <a:endParaRPr lang="en-US" dirty="0"/>
           </a:p>
@@ -11383,7 +8579,7 @@
           <a:p>
             <a:fld id="{4AAD347D-5ACD-4C99-B74B-A9C85AD731AF}" type="datetimeFigureOut">
               <a:rPr lang="en-US" smtClean="0"/>
-              <a:t>6/2/2015</a:t>
+              <a:t>6/3/2015</a:t>
             </a:fld>
             <a:endParaRPr lang="en-US" dirty="0"/>
           </a:p>
@@ -12044,7 +9240,7 @@
           <a:p>
             <a:fld id="{4AAD347D-5ACD-4C99-B74B-A9C85AD731AF}" type="datetimeFigureOut">
               <a:rPr lang="en-US" smtClean="0"/>
-              <a:t>6/2/2015</a:t>
+              <a:t>6/3/2015</a:t>
             </a:fld>
             <a:endParaRPr lang="en-US" dirty="0"/>
           </a:p>
@@ -12906,7 +10102,7 @@
           <a:p>
             <a:fld id="{4AAD347D-5ACD-4C99-B74B-A9C85AD731AF}" type="datetimeFigureOut">
               <a:rPr lang="en-US" smtClean="0"/>
-              <a:t>6/2/2015</a:t>
+              <a:t>6/3/2015</a:t>
             </a:fld>
             <a:endParaRPr lang="en-US" dirty="0"/>
           </a:p>
@@ -13097,7 +10293,7 @@
           <a:p>
             <a:fld id="{4509A250-FF31-4206-8172-F9D3106AACB1}" type="datetimeFigureOut">
               <a:rPr lang="en-US" smtClean="0"/>
-              <a:t>6/2/2015</a:t>
+              <a:t>6/3/2015</a:t>
             </a:fld>
             <a:endParaRPr lang="en-US" dirty="0"/>
           </a:p>
@@ -14069,7 +11265,7 @@
           <a:p>
             <a:fld id="{4509A250-FF31-4206-8172-F9D3106AACB1}" type="datetimeFigureOut">
               <a:rPr lang="en-US" smtClean="0"/>
-              <a:t>6/2/2015</a:t>
+              <a:t>6/3/2015</a:t>
             </a:fld>
             <a:endParaRPr lang="en-US" dirty="0"/>
           </a:p>
@@ -14280,7 +11476,7 @@
           <a:p>
             <a:fld id="{4509A250-FF31-4206-8172-F9D3106AACB1}" type="datetimeFigureOut">
               <a:rPr lang="en-US" smtClean="0"/>
-              <a:t>6/2/2015</a:t>
+              <a:t>6/3/2015</a:t>
             </a:fld>
             <a:endParaRPr lang="en-US" dirty="0"/>
           </a:p>
@@ -15314,7 +12510,7 @@
           <a:p>
             <a:fld id="{9796027F-7875-4030-9381-8BD8C4F21935}" type="datetimeFigureOut">
               <a:rPr lang="en-US" smtClean="0"/>
-              <a:t>6/2/2015</a:t>
+              <a:t>6/3/2015</a:t>
             </a:fld>
             <a:endParaRPr lang="en-US" dirty="0"/>
           </a:p>
@@ -15586,7 +12782,7 @@
           <a:p>
             <a:fld id="{9796027F-7875-4030-9381-8BD8C4F21935}" type="datetimeFigureOut">
               <a:rPr lang="en-US" smtClean="0"/>
-              <a:t>6/2/2015</a:t>
+              <a:t>6/3/2015</a:t>
             </a:fld>
             <a:endParaRPr lang="en-US" dirty="0"/>
           </a:p>
@@ -15996,7 +13192,7 @@
           <a:p>
             <a:fld id="{9796027F-7875-4030-9381-8BD8C4F21935}" type="datetimeFigureOut">
               <a:rPr lang="en-US" smtClean="0"/>
-              <a:t>6/2/2015</a:t>
+              <a:t>6/3/2015</a:t>
             </a:fld>
             <a:endParaRPr lang="en-US" dirty="0"/>
           </a:p>
@@ -16123,7 +13319,7 @@
           <a:p>
             <a:fld id="{4509A250-FF31-4206-8172-F9D3106AACB1}" type="datetimeFigureOut">
               <a:rPr lang="en-US" smtClean="0"/>
-              <a:t>6/2/2015</a:t>
+              <a:t>6/3/2015</a:t>
             </a:fld>
             <a:endParaRPr lang="en-US" dirty="0"/>
           </a:p>
@@ -16218,7 +13414,7 @@
           <a:p>
             <a:fld id="{4509A250-FF31-4206-8172-F9D3106AACB1}" type="datetimeFigureOut">
               <a:rPr lang="en-US" smtClean="0"/>
-              <a:t>6/2/2015</a:t>
+              <a:t>6/3/2015</a:t>
             </a:fld>
             <a:endParaRPr lang="en-US" dirty="0"/>
           </a:p>
@@ -17299,7 +14495,7 @@
           <a:p>
             <a:fld id="{4509A250-FF31-4206-8172-F9D3106AACB1}" type="datetimeFigureOut">
               <a:rPr lang="en-US" smtClean="0"/>
-              <a:t>6/2/2015</a:t>
+              <a:t>6/3/2015</a:t>
             </a:fld>
             <a:endParaRPr lang="en-US" dirty="0"/>
           </a:p>
@@ -18407,7 +15603,7 @@
           <a:p>
             <a:fld id="{4509A250-FF31-4206-8172-F9D3106AACB1}" type="datetimeFigureOut">
               <a:rPr lang="en-US" smtClean="0"/>
-              <a:t>6/2/2015</a:t>
+              <a:t>6/3/2015</a:t>
             </a:fld>
             <a:endParaRPr lang="en-US" dirty="0"/>
           </a:p>
@@ -19404,7 +16600,7 @@
           <a:p>
             <a:fld id="{4AAD347D-5ACD-4C99-B74B-A9C85AD731AF}" type="datetimeFigureOut">
               <a:rPr lang="en-US" smtClean="0"/>
-              <a:t>6/2/2015</a:t>
+              <a:t>6/3/2015</a:t>
             </a:fld>
             <a:endParaRPr lang="en-US" dirty="0"/>
           </a:p>
@@ -20036,8 +17232,8 @@
         </p:nvSpPr>
         <p:spPr>
           <a:xfrm>
-            <a:off x="9536965" y="5864739"/>
-            <a:ext cx="2106666" cy="400110"/>
+            <a:off x="11458900" y="5864739"/>
+            <a:ext cx="184731" cy="400110"/>
           </a:xfrm>
           <a:prstGeom prst="rect">
             <a:avLst/>
@@ -20051,14 +17247,11 @@
           <a:lstStyle/>
           <a:p>
             <a:pPr algn="r"/>
-            <a:r>
-              <a:rPr lang="es-CR" sz="2000" dirty="0" smtClean="0">
-                <a:solidFill>
-                  <a:schemeClr val="bg1"/>
-                </a:solidFill>
-              </a:rPr>
-              <a:t>Oscar Centeno</a:t>
-            </a:r>
+            <a:endParaRPr lang="es-CR" sz="2000" dirty="0" smtClean="0">
+              <a:solidFill>
+                <a:schemeClr val="bg1"/>
+              </a:solidFill>
+            </a:endParaRPr>
           </a:p>
         </p:txBody>
       </p:sp>
@@ -21084,7 +18277,7 @@
                 <a:rPr lang="es-CR" sz="2000" dirty="0" smtClean="0">
                   <a:latin typeface="Cecilia" panose="02000500000000000000" pitchFamily="2" charset="0"/>
                 </a:rPr>
-                <a:t>$25</a:t>
+                <a:t>$50</a:t>
               </a:r>
             </a:p>
             <a:p>
@@ -21359,7 +18552,7 @@
         </p:nvSpPr>
         <p:spPr>
           <a:xfrm>
-            <a:off x="9916367" y="5662238"/>
+            <a:off x="9979867" y="5700338"/>
             <a:ext cx="2101462" cy="1016000"/>
           </a:xfrm>
           <a:prstGeom prst="rect">
@@ -21432,6 +18625,60 @@
                   <a:srgbClr val="FFFFFF"/>
                 </a:solidFill>
               </a14:hiddenFill>
+            </a:ext>
+          </a:extLst>
+        </p:spPr>
+      </p:pic>
+      <p:pic>
+        <p:nvPicPr>
+          <p:cNvPr id="1026" name="Picture 2"/>
+          <p:cNvPicPr>
+            <a:picLocks noChangeAspect="1" noChangeArrowheads="1"/>
+          </p:cNvPicPr>
+          <p:nvPr/>
+        </p:nvPicPr>
+        <p:blipFill>
+          <a:blip r:embed="rId3">
+            <a:extLst>
+              <a:ext uri="{28A0092B-C50C-407E-A947-70E740481C1C}">
+                <a14:useLocalDpi xmlns:a14="http://schemas.microsoft.com/office/drawing/2010/main" val="0"/>
+              </a:ext>
+            </a:extLst>
+          </a:blip>
+          <a:srcRect/>
+          <a:stretch>
+            <a:fillRect/>
+          </a:stretch>
+        </p:blipFill>
+        <p:spPr bwMode="auto">
+          <a:xfrm>
+            <a:off x="458789" y="2102833"/>
+            <a:ext cx="9955212" cy="3559405"/>
+          </a:xfrm>
+          <a:prstGeom prst="rect">
+            <a:avLst/>
+          </a:prstGeom>
+          <a:noFill/>
+          <a:ln>
+            <a:noFill/>
+          </a:ln>
+          <a:extLst>
+            <a:ext uri="{909E8E84-426E-40DD-AFC4-6F175D3DCCD1}">
+              <a14:hiddenFill xmlns:a14="http://schemas.microsoft.com/office/drawing/2010/main">
+                <a:solidFill>
+                  <a:schemeClr val="accent1"/>
+                </a:solidFill>
+              </a14:hiddenFill>
+            </a:ext>
+            <a:ext uri="{91240B29-F687-4F45-9708-019B960494DF}">
+              <a14:hiddenLine xmlns:a14="http://schemas.microsoft.com/office/drawing/2010/main" w="9525">
+                <a:solidFill>
+                  <a:schemeClr val="tx1"/>
+                </a:solidFill>
+                <a:miter lim="800000"/>
+                <a:headEnd/>
+                <a:tailEnd/>
+              </a14:hiddenLine>
             </a:ext>
           </a:extLst>
         </p:spPr>
@@ -22830,24 +20077,14 @@
           <a:p>
             <a:r>
               <a:rPr lang="es-CR" sz="3200" dirty="0" smtClean="0"/>
-              <a:t>Usa lenguaje del </a:t>
-            </a:r>
+              <a:t>Usa lenguaje del negocio</a:t>
+            </a:r>
+          </a:p>
+          <a:p>
             <a:r>
               <a:rPr lang="es-CR" sz="3200" dirty="0" smtClean="0"/>
-              <a:t>negocio</a:t>
-            </a:r>
-            <a:endParaRPr lang="es-CR" sz="3200" dirty="0" smtClean="0"/>
-          </a:p>
-          <a:p>
-            <a:r>
-              <a:rPr lang="es-CR" sz="3200" dirty="0" smtClean="0"/>
-              <a:t>Es </a:t>
-            </a:r>
-            <a:r>
-              <a:rPr lang="es-CR" sz="3200" dirty="0" smtClean="0"/>
-              <a:t>legible para humanos</a:t>
-            </a:r>
-            <a:endParaRPr lang="es-CR" sz="3200" dirty="0" smtClean="0"/>
+              <a:t>Es legible para humanos</a:t>
+            </a:r>
           </a:p>
           <a:p>
             <a:r>
@@ -22859,11 +20096,7 @@
             <a:pPr lvl="1"/>
             <a:r>
               <a:rPr lang="es-CR" sz="3000" dirty="0" smtClean="0"/>
-              <a:t>Se puede usar para </a:t>
-            </a:r>
-            <a:r>
-              <a:rPr lang="es-CR" sz="3000" dirty="0" smtClean="0"/>
-              <a:t>conversar…</a:t>
+              <a:t>Se puede usar para conversar…</a:t>
             </a:r>
             <a:endParaRPr lang="es-CR" sz="3000" dirty="0"/>
           </a:p>
@@ -22879,6 +20112,13 @@
   <p:clrMapOvr>
     <a:masterClrMapping/>
   </p:clrMapOvr>
+  <p:timing>
+    <p:tnLst>
+      <p:par>
+        <p:cTn id="1" dur="indefinite" restart="never" nodeType="tmRoot"/>
+      </p:par>
+    </p:tnLst>
+  </p:timing>
 </p:sld>
 </file>
 
@@ -22916,15 +20156,7 @@
           <a:p>
             <a:r>
               <a:rPr lang="es-CR" dirty="0" smtClean="0"/>
-              <a:t>“¿</a:t>
-            </a:r>
-            <a:r>
-              <a:rPr lang="es-CR" dirty="0" smtClean="0"/>
-              <a:t>Qué pasaría si</a:t>
-            </a:r>
-            <a:r>
-              <a:rPr lang="es-CR" dirty="0" smtClean="0"/>
-              <a:t>…?”</a:t>
+              <a:t>“¿Qué pasaría si…?”</a:t>
             </a:r>
             <a:endParaRPr lang="es-CR" dirty="0"/>
           </a:p>
@@ -23041,18 +20273,7 @@
                   </a:schemeClr>
                 </a:solidFill>
               </a:rPr>
-              <a:t>Podemos </a:t>
-            </a:r>
-            <a:r>
-              <a:rPr lang="es-CR" sz="3200" dirty="0" smtClean="0">
-                <a:solidFill>
-                  <a:schemeClr val="tx1">
-                    <a:lumMod val="50000"/>
-                    <a:lumOff val="50000"/>
-                  </a:schemeClr>
-                </a:solidFill>
-              </a:rPr>
-              <a:t>pensar en nuevos ejemplos y saber rápidamente cómo se comporta el sistema…</a:t>
+              <a:t>Podemos pensar en nuevos ejemplos y saber rápidamente cómo se comporta el sistema…</a:t>
             </a:r>
           </a:p>
           <a:p>
@@ -23376,24 +20597,44 @@
           <a:chExt cx="0" cy="0"/>
         </a:xfrm>
       </p:grpSpPr>
-      <p:graphicFrame>
-        <p:nvGraphicFramePr>
-          <p:cNvPr id="3" name="Diagram 2"/>
-          <p:cNvGraphicFramePr/>
-          <p:nvPr>
-            <p:extLst/>
-          </p:nvPr>
-        </p:nvGraphicFramePr>
-        <p:xfrm>
-          <a:off x="115909" y="193184"/>
-          <a:ext cx="11964473" cy="6568224"/>
-        </p:xfrm>
-        <a:graphic>
-          <a:graphicData uri="http://schemas.openxmlformats.org/drawingml/2006/diagram">
-            <dgm:relIds xmlns:dgm="http://schemas.openxmlformats.org/drawingml/2006/diagram" xmlns:r="http://schemas.openxmlformats.org/officeDocument/2006/relationships" r:dm="rId2" r:lo="rId3" r:qs="rId4" r:cs="rId5"/>
-          </a:graphicData>
-        </a:graphic>
-      </p:graphicFrame>
+      <p:sp>
+        <p:nvSpPr>
+          <p:cNvPr id="37" name="Rounded Rectangle 36"/>
+          <p:cNvSpPr/>
+          <p:nvPr/>
+        </p:nvSpPr>
+        <p:spPr>
+          <a:xfrm>
+            <a:off x="8736841" y="2709502"/>
+            <a:ext cx="3300484" cy="3104444"/>
+          </a:xfrm>
+          <a:prstGeom prst="roundRect">
+            <a:avLst/>
+          </a:prstGeom>
+        </p:spPr>
+        <p:style>
+          <a:lnRef idx="2">
+            <a:schemeClr val="accent1"/>
+          </a:lnRef>
+          <a:fillRef idx="1">
+            <a:schemeClr val="lt1"/>
+          </a:fillRef>
+          <a:effectRef idx="0">
+            <a:schemeClr val="accent1"/>
+          </a:effectRef>
+          <a:fontRef idx="minor">
+            <a:schemeClr val="dk1"/>
+          </a:fontRef>
+        </p:style>
+        <p:txBody>
+          <a:bodyPr rtlCol="0" anchor="ctr"/>
+          <a:lstStyle/>
+          <a:p>
+            <a:pPr algn="ctr"/>
+            <a:endParaRPr lang="es-CR"/>
+          </a:p>
+        </p:txBody>
+      </p:sp>
       <p:sp>
         <p:nvSpPr>
           <p:cNvPr id="2" name="Title 1"/>
@@ -23411,22 +20652,82 @@
           <a:p>
             <a:r>
               <a:rPr lang="es-CR" dirty="0" smtClean="0"/>
-              <a:t>Ideas principales</a:t>
+              <a:t>Cambio en el enfoque tradicional</a:t>
             </a:r>
             <a:endParaRPr lang="en-US" dirty="0"/>
           </a:p>
         </p:txBody>
       </p:sp>
+      <p:cxnSp>
+        <p:nvCxnSpPr>
+          <p:cNvPr id="8" name="Straight Connector 7"/>
+          <p:cNvCxnSpPr/>
+          <p:nvPr/>
+        </p:nvCxnSpPr>
+        <p:spPr>
+          <a:xfrm>
+            <a:off x="600501" y="5759355"/>
+            <a:ext cx="3671248" cy="0"/>
+          </a:xfrm>
+          <a:prstGeom prst="line">
+            <a:avLst/>
+          </a:prstGeom>
+        </p:spPr>
+        <p:style>
+          <a:lnRef idx="1">
+            <a:schemeClr val="accent1"/>
+          </a:lnRef>
+          <a:fillRef idx="0">
+            <a:schemeClr val="accent1"/>
+          </a:fillRef>
+          <a:effectRef idx="0">
+            <a:schemeClr val="accent1"/>
+          </a:effectRef>
+          <a:fontRef idx="minor">
+            <a:schemeClr val="tx1"/>
+          </a:fontRef>
+        </p:style>
+      </p:cxnSp>
+      <p:cxnSp>
+        <p:nvCxnSpPr>
+          <p:cNvPr id="23" name="Straight Connector 22"/>
+          <p:cNvCxnSpPr/>
+          <p:nvPr/>
+        </p:nvCxnSpPr>
+        <p:spPr>
+          <a:xfrm>
+            <a:off x="4915465" y="5773003"/>
+            <a:ext cx="3671248" cy="0"/>
+          </a:xfrm>
+          <a:prstGeom prst="line">
+            <a:avLst/>
+          </a:prstGeom>
+        </p:spPr>
+        <p:style>
+          <a:lnRef idx="1">
+            <a:schemeClr val="accent1"/>
+          </a:lnRef>
+          <a:fillRef idx="0">
+            <a:schemeClr val="accent1"/>
+          </a:fillRef>
+          <a:effectRef idx="0">
+            <a:schemeClr val="accent1"/>
+          </a:effectRef>
+          <a:fontRef idx="minor">
+            <a:schemeClr val="tx1"/>
+          </a:fontRef>
+        </p:style>
+      </p:cxnSp>
       <p:sp>
         <p:nvSpPr>
-          <p:cNvPr id="4" name="TextBox 3"/>
+          <p:cNvPr id="18" name="TextBox 17"/>
           <p:cNvSpPr txBox="1"/>
           <p:nvPr/>
         </p:nvSpPr>
         <p:spPr>
           <a:xfrm>
-            <a:off x="199383" y="4327300"/>
-            <a:ext cx="1962397" cy="707886"/>
+            <a:off x="600500" y="5813946"/>
+            <a:ext cx="3395481" cy="369332"/>
           </a:xfrm>
           <a:prstGeom prst="rect">
             <a:avLst/>
@@ -23440,29 +20741,61 @@
           <a:lstStyle/>
           <a:p>
             <a:r>
-              <a:rPr lang="es-CR" sz="2000" dirty="0" smtClean="0"/>
-              <a:t>Especificamos</a:t>
-            </a:r>
-          </a:p>
-          <a:p>
-            <a:r>
-              <a:rPr lang="es-CR" sz="2000" dirty="0" smtClean="0"/>
-              <a:t>en equipo</a:t>
-            </a:r>
-            <a:endParaRPr lang="en-US" sz="2000" dirty="0"/>
+              <a:rPr lang="es-CR" dirty="0" smtClean="0"/>
+              <a:t>Antes de iniciar a programar</a:t>
+            </a:r>
+            <a:endParaRPr lang="es-CR" dirty="0"/>
           </a:p>
         </p:txBody>
       </p:sp>
       <p:sp>
         <p:nvSpPr>
-          <p:cNvPr id="5" name="TextBox 4"/>
+          <p:cNvPr id="20" name="Rounded Rectangle 19"/>
+          <p:cNvSpPr/>
+          <p:nvPr/>
+        </p:nvSpPr>
+        <p:spPr>
+          <a:xfrm>
+            <a:off x="600501" y="3289110"/>
+            <a:ext cx="3671248" cy="2292824"/>
+          </a:xfrm>
+          <a:prstGeom prst="roundRect">
+            <a:avLst/>
+          </a:prstGeom>
+        </p:spPr>
+        <p:style>
+          <a:lnRef idx="2">
+            <a:schemeClr val="accent1"/>
+          </a:lnRef>
+          <a:fillRef idx="1">
+            <a:schemeClr val="lt1"/>
+          </a:fillRef>
+          <a:effectRef idx="0">
+            <a:schemeClr val="accent1"/>
+          </a:effectRef>
+          <a:fontRef idx="minor">
+            <a:schemeClr val="dk1"/>
+          </a:fontRef>
+        </p:style>
+        <p:txBody>
+          <a:bodyPr rtlCol="0" anchor="ctr"/>
+          <a:lstStyle/>
+          <a:p>
+            <a:pPr algn="ctr"/>
+            <a:endParaRPr lang="es-CR"/>
+          </a:p>
+        </p:txBody>
+      </p:sp>
+      <p:sp>
+        <p:nvSpPr>
+          <p:cNvPr id="21" name="TextBox 20"/>
           <p:cNvSpPr txBox="1"/>
           <p:nvPr/>
         </p:nvSpPr>
         <p:spPr>
           <a:xfrm>
-            <a:off x="3390773" y="4327301"/>
-            <a:ext cx="2026517" cy="707886"/>
+            <a:off x="600501" y="2886923"/>
+            <a:ext cx="2818400" cy="369332"/>
           </a:xfrm>
           <a:prstGeom prst="rect">
             <a:avLst/>
@@ -23476,29 +20809,296 @@
           <a:lstStyle/>
           <a:p>
             <a:r>
-              <a:rPr lang="es-CR" sz="2000" dirty="0" smtClean="0"/>
-              <a:t>Refinamos la</a:t>
-            </a:r>
-          </a:p>
-          <a:p>
-            <a:r>
-              <a:rPr lang="es-CR" sz="2000" dirty="0" smtClean="0"/>
-              <a:t>especificación</a:t>
-            </a:r>
-            <a:endParaRPr lang="en-US" sz="2000" dirty="0"/>
+              <a:rPr lang="es-CR" b="1" dirty="0" smtClean="0"/>
+              <a:t>Taller de Especificación</a:t>
+            </a:r>
+            <a:endParaRPr lang="es-CR" b="1" dirty="0"/>
           </a:p>
         </p:txBody>
       </p:sp>
+      <p:pic>
+        <p:nvPicPr>
+          <p:cNvPr id="27" name="Picture 2" descr="http://www.derailleurconsulting.com/Media/Default/Images/blog/1284408118communicate-pictofigo-13.png"/>
+          <p:cNvPicPr>
+            <a:picLocks noChangeAspect="1" noChangeArrowheads="1"/>
+          </p:cNvPicPr>
+          <p:nvPr/>
+        </p:nvPicPr>
+        <p:blipFill>
+          <a:blip r:embed="rId2">
+            <a:extLst>
+              <a:ext uri="{28A0092B-C50C-407E-A947-70E740481C1C}">
+                <a14:useLocalDpi xmlns:a14="http://schemas.microsoft.com/office/drawing/2010/main" val="0"/>
+              </a:ext>
+            </a:extLst>
+          </a:blip>
+          <a:srcRect/>
+          <a:stretch>
+            <a:fillRect/>
+          </a:stretch>
+        </p:blipFill>
+        <p:spPr bwMode="auto">
+          <a:xfrm>
+            <a:off x="769250" y="3483022"/>
+            <a:ext cx="3333750" cy="1905000"/>
+          </a:xfrm>
+          <a:prstGeom prst="rect">
+            <a:avLst/>
+          </a:prstGeom>
+          <a:noFill/>
+          <a:extLst>
+            <a:ext uri="{909E8E84-426E-40DD-AFC4-6F175D3DCCD1}">
+              <a14:hiddenFill xmlns:a14="http://schemas.microsoft.com/office/drawing/2010/main">
+                <a:solidFill>
+                  <a:srgbClr val="FFFFFF"/>
+                </a:solidFill>
+              </a14:hiddenFill>
+            </a:ext>
+          </a:extLst>
+        </p:spPr>
+      </p:pic>
+      <p:grpSp>
+        <p:nvGrpSpPr>
+          <p:cNvPr id="28" name="Group 27"/>
+          <p:cNvGrpSpPr/>
+          <p:nvPr/>
+        </p:nvGrpSpPr>
+        <p:grpSpPr>
+          <a:xfrm>
+            <a:off x="5220783" y="3096618"/>
+            <a:ext cx="2298837" cy="1379302"/>
+            <a:chOff x="6442004" y="2594460"/>
+            <a:chExt cx="2298837" cy="1379302"/>
+          </a:xfrm>
+        </p:grpSpPr>
+        <p:sp>
+          <p:nvSpPr>
+            <p:cNvPr id="32" name="Rounded Rectangle 31"/>
+            <p:cNvSpPr/>
+            <p:nvPr/>
+          </p:nvSpPr>
+          <p:spPr>
+            <a:xfrm>
+              <a:off x="6442004" y="2594460"/>
+              <a:ext cx="2298837" cy="1379302"/>
+            </a:xfrm>
+            <a:prstGeom prst="roundRect">
+              <a:avLst>
+                <a:gd name="adj" fmla="val 10000"/>
+              </a:avLst>
+            </a:prstGeom>
+          </p:spPr>
+          <p:style>
+            <a:lnRef idx="3">
+              <a:schemeClr val="lt1">
+                <a:hueOff val="0"/>
+                <a:satOff val="0"/>
+                <a:lumOff val="0"/>
+                <a:alphaOff val="0"/>
+              </a:schemeClr>
+            </a:lnRef>
+            <a:fillRef idx="1">
+              <a:schemeClr val="accent3">
+                <a:hueOff val="0"/>
+                <a:satOff val="0"/>
+                <a:lumOff val="0"/>
+                <a:alphaOff val="0"/>
+              </a:schemeClr>
+            </a:fillRef>
+            <a:effectRef idx="1">
+              <a:schemeClr val="accent3">
+                <a:hueOff val="0"/>
+                <a:satOff val="0"/>
+                <a:lumOff val="0"/>
+                <a:alphaOff val="0"/>
+              </a:schemeClr>
+            </a:effectRef>
+            <a:fontRef idx="minor">
+              <a:schemeClr val="lt1"/>
+            </a:fontRef>
+          </p:style>
+        </p:sp>
+        <p:sp>
+          <p:nvSpPr>
+            <p:cNvPr id="33" name="Rounded Rectangle 4"/>
+            <p:cNvSpPr/>
+            <p:nvPr/>
+          </p:nvSpPr>
+          <p:spPr>
+            <a:xfrm>
+              <a:off x="6482402" y="2634858"/>
+              <a:ext cx="2218041" cy="1298506"/>
+            </a:xfrm>
+            <a:prstGeom prst="rect">
+              <a:avLst/>
+            </a:prstGeom>
+          </p:spPr>
+          <p:style>
+            <a:lnRef idx="0">
+              <a:scrgbClr r="0" g="0" b="0"/>
+            </a:lnRef>
+            <a:fillRef idx="0">
+              <a:scrgbClr r="0" g="0" b="0"/>
+            </a:fillRef>
+            <a:effectRef idx="0">
+              <a:scrgbClr r="0" g="0" b="0"/>
+            </a:effectRef>
+            <a:fontRef idx="minor">
+              <a:schemeClr val="lt1"/>
+            </a:fontRef>
+          </p:style>
+          <p:txBody>
+            <a:bodyPr spcFirstLastPara="0" vert="horz" wrap="square" lIns="76200" tIns="76200" rIns="76200" bIns="76200" numCol="1" spcCol="1270" anchor="ctr" anchorCtr="0">
+              <a:noAutofit/>
+            </a:bodyPr>
+            <a:lstStyle/>
+            <a:p>
+              <a:pPr lvl="0" algn="ctr" defTabSz="889000">
+                <a:lnSpc>
+                  <a:spcPct val="90000"/>
+                </a:lnSpc>
+                <a:spcBef>
+                  <a:spcPct val="0"/>
+                </a:spcBef>
+                <a:spcAft>
+                  <a:spcPct val="35000"/>
+                </a:spcAft>
+              </a:pPr>
+              <a:r>
+                <a:rPr lang="es-CR" sz="2000" kern="1200" dirty="0" smtClean="0"/>
+                <a:t>Especificación Ejecutable</a:t>
+              </a:r>
+              <a:endParaRPr lang="en-US" sz="2000" kern="1200" dirty="0"/>
+            </a:p>
+          </p:txBody>
+        </p:sp>
+      </p:grpSp>
+      <p:grpSp>
+        <p:nvGrpSpPr>
+          <p:cNvPr id="29" name="Group 28"/>
+          <p:cNvGrpSpPr/>
+          <p:nvPr/>
+        </p:nvGrpSpPr>
+        <p:grpSpPr>
+          <a:xfrm>
+            <a:off x="8952931" y="3057345"/>
+            <a:ext cx="2808647" cy="912102"/>
+            <a:chOff x="9660377" y="2594460"/>
+            <a:chExt cx="2298837" cy="1379302"/>
+          </a:xfrm>
+        </p:grpSpPr>
+        <p:sp>
+          <p:nvSpPr>
+            <p:cNvPr id="30" name="Rounded Rectangle 29"/>
+            <p:cNvSpPr/>
+            <p:nvPr/>
+          </p:nvSpPr>
+          <p:spPr>
+            <a:xfrm>
+              <a:off x="9660377" y="2594460"/>
+              <a:ext cx="2298837" cy="1379302"/>
+            </a:xfrm>
+            <a:prstGeom prst="roundRect">
+              <a:avLst>
+                <a:gd name="adj" fmla="val 10000"/>
+              </a:avLst>
+            </a:prstGeom>
+          </p:spPr>
+          <p:style>
+            <a:lnRef idx="3">
+              <a:schemeClr val="lt1">
+                <a:hueOff val="0"/>
+                <a:satOff val="0"/>
+                <a:lumOff val="0"/>
+                <a:alphaOff val="0"/>
+              </a:schemeClr>
+            </a:lnRef>
+            <a:fillRef idx="1">
+              <a:schemeClr val="accent3">
+                <a:hueOff val="0"/>
+                <a:satOff val="0"/>
+                <a:lumOff val="0"/>
+                <a:alphaOff val="0"/>
+              </a:schemeClr>
+            </a:fillRef>
+            <a:effectRef idx="1">
+              <a:schemeClr val="accent3">
+                <a:hueOff val="0"/>
+                <a:satOff val="0"/>
+                <a:lumOff val="0"/>
+                <a:alphaOff val="0"/>
+              </a:schemeClr>
+            </a:effectRef>
+            <a:fontRef idx="minor">
+              <a:schemeClr val="lt1"/>
+            </a:fontRef>
+          </p:style>
+        </p:sp>
+        <p:sp>
+          <p:nvSpPr>
+            <p:cNvPr id="31" name="Rounded Rectangle 6"/>
+            <p:cNvSpPr/>
+            <p:nvPr/>
+          </p:nvSpPr>
+          <p:spPr>
+            <a:xfrm>
+              <a:off x="9700775" y="2634858"/>
+              <a:ext cx="2218041" cy="1298506"/>
+            </a:xfrm>
+            <a:prstGeom prst="rect">
+              <a:avLst/>
+            </a:prstGeom>
+          </p:spPr>
+          <p:style>
+            <a:lnRef idx="0">
+              <a:scrgbClr r="0" g="0" b="0"/>
+            </a:lnRef>
+            <a:fillRef idx="0">
+              <a:scrgbClr r="0" g="0" b="0"/>
+            </a:fillRef>
+            <a:effectRef idx="0">
+              <a:scrgbClr r="0" g="0" b="0"/>
+            </a:effectRef>
+            <a:fontRef idx="minor">
+              <a:schemeClr val="lt1"/>
+            </a:fontRef>
+          </p:style>
+          <p:txBody>
+            <a:bodyPr spcFirstLastPara="0" vert="horz" wrap="square" lIns="76200" tIns="76200" rIns="76200" bIns="76200" numCol="1" spcCol="1270" anchor="ctr" anchorCtr="0">
+              <a:noAutofit/>
+            </a:bodyPr>
+            <a:lstStyle/>
+            <a:p>
+              <a:pPr lvl="0" algn="ctr" defTabSz="889000">
+                <a:lnSpc>
+                  <a:spcPct val="90000"/>
+                </a:lnSpc>
+                <a:spcBef>
+                  <a:spcPct val="0"/>
+                </a:spcBef>
+                <a:spcAft>
+                  <a:spcPct val="35000"/>
+                </a:spcAft>
+              </a:pPr>
+              <a:r>
+                <a:rPr lang="es-CR" sz="2000" kern="1200" dirty="0" smtClean="0"/>
+                <a:t>Documentación Viva</a:t>
+              </a:r>
+              <a:endParaRPr lang="en-US" sz="2000" kern="1200" dirty="0"/>
+            </a:p>
+          </p:txBody>
+        </p:sp>
+      </p:grpSp>
       <p:sp>
         <p:nvSpPr>
-          <p:cNvPr id="6" name="TextBox 5"/>
+          <p:cNvPr id="34" name="TextBox 33"/>
           <p:cNvSpPr txBox="1"/>
           <p:nvPr/>
         </p:nvSpPr>
         <p:spPr>
           <a:xfrm>
-            <a:off x="6578957" y="4327300"/>
-            <a:ext cx="1843825" cy="1015663"/>
+            <a:off x="4915465" y="5800298"/>
+            <a:ext cx="3044423" cy="369332"/>
           </a:xfrm>
           <a:prstGeom prst="rect">
             <a:avLst/>
@@ -23506,29 +21106,118 @@
           <a:noFill/>
         </p:spPr>
         <p:txBody>
-          <a:bodyPr wrap="square" rtlCol="0">
+          <a:bodyPr wrap="none" rtlCol="0">
             <a:spAutoFit/>
           </a:bodyPr>
           <a:lstStyle/>
           <a:p>
             <a:r>
-              <a:rPr lang="es-CR" sz="2000" dirty="0" smtClean="0"/>
-              <a:t>Se automatiza sin cambiarla</a:t>
-            </a:r>
-            <a:endParaRPr lang="en-US" sz="2000" dirty="0"/>
+              <a:rPr lang="es-CR" dirty="0" smtClean="0"/>
+              <a:t>Durante la programación</a:t>
+            </a:r>
+            <a:endParaRPr lang="es-CR" dirty="0"/>
           </a:p>
         </p:txBody>
       </p:sp>
+      <p:pic>
+        <p:nvPicPr>
+          <p:cNvPr id="35" name="Picture 4" descr="http://www.geeks.ltd.uk/App_Documents/Point.Image/abc9a272-7769-4c4a-a341-b679e99b2756.png?1276637317pmp_06.png"/>
+          <p:cNvPicPr>
+            <a:picLocks noChangeAspect="1" noChangeArrowheads="1"/>
+          </p:cNvPicPr>
+          <p:nvPr/>
+        </p:nvPicPr>
+        <p:blipFill>
+          <a:blip r:embed="rId3">
+            <a:extLst>
+              <a:ext uri="{28A0092B-C50C-407E-A947-70E740481C1C}">
+                <a14:useLocalDpi xmlns:a14="http://schemas.microsoft.com/office/drawing/2010/main" val="0"/>
+              </a:ext>
+            </a:extLst>
+          </a:blip>
+          <a:srcRect/>
+          <a:stretch>
+            <a:fillRect/>
+          </a:stretch>
+        </p:blipFill>
+        <p:spPr bwMode="auto">
+          <a:xfrm>
+            <a:off x="6370201" y="4181901"/>
+            <a:ext cx="1905000" cy="1905000"/>
+          </a:xfrm>
+          <a:prstGeom prst="rect">
+            <a:avLst/>
+          </a:prstGeom>
+          <a:ln>
+            <a:noFill/>
+          </a:ln>
+          <a:effectLst>
+            <a:outerShdw blurRad="292100" dist="139700" dir="2700000" algn="tl" rotWithShape="0">
+              <a:srgbClr val="333333">
+                <a:alpha val="65000"/>
+              </a:srgbClr>
+            </a:outerShdw>
+          </a:effectLst>
+          <a:extLst>
+            <a:ext uri="{909E8E84-426E-40DD-AFC4-6F175D3DCCD1}">
+              <a14:hiddenFill xmlns:a14="http://schemas.microsoft.com/office/drawing/2010/main">
+                <a:solidFill>
+                  <a:srgbClr val="FFFFFF"/>
+                </a:solidFill>
+              </a14:hiddenFill>
+            </a:ext>
+          </a:extLst>
+        </p:spPr>
+      </p:pic>
+      <p:cxnSp>
+        <p:nvCxnSpPr>
+          <p:cNvPr id="25" name="Curved Connector 24"/>
+          <p:cNvCxnSpPr>
+            <a:stCxn id="32" idx="3"/>
+            <a:endCxn id="32" idx="0"/>
+          </p:cNvCxnSpPr>
+          <p:nvPr/>
+        </p:nvCxnSpPr>
+        <p:spPr>
+          <a:xfrm flipH="1" flipV="1">
+            <a:off x="6370202" y="3096618"/>
+            <a:ext cx="1149418" cy="689651"/>
+          </a:xfrm>
+          <a:prstGeom prst="curvedConnector4">
+            <a:avLst>
+              <a:gd name="adj1" fmla="val -28200"/>
+              <a:gd name="adj2" fmla="val 194494"/>
+            </a:avLst>
+          </a:prstGeom>
+          <a:ln>
+            <a:tailEnd type="arrow"/>
+          </a:ln>
+        </p:spPr>
+        <p:style>
+          <a:lnRef idx="1">
+            <a:schemeClr val="accent1"/>
+          </a:lnRef>
+          <a:fillRef idx="0">
+            <a:schemeClr val="accent1"/>
+          </a:fillRef>
+          <a:effectRef idx="0">
+            <a:schemeClr val="accent1"/>
+          </a:effectRef>
+          <a:fontRef idx="minor">
+            <a:schemeClr val="tx1"/>
+          </a:fontRef>
+        </p:style>
+      </p:cxnSp>
       <p:sp>
         <p:nvSpPr>
-          <p:cNvPr id="7" name="TextBox 6"/>
+          <p:cNvPr id="40" name="TextBox 39"/>
           <p:cNvSpPr txBox="1"/>
           <p:nvPr/>
         </p:nvSpPr>
         <p:spPr>
           <a:xfrm>
-            <a:off x="9767141" y="4327300"/>
-            <a:ext cx="1483216" cy="1015663"/>
+            <a:off x="9849474" y="5813946"/>
+            <a:ext cx="1135247" cy="369332"/>
           </a:xfrm>
           <a:prstGeom prst="rect">
             <a:avLst/>
@@ -23536,23 +21225,159 @@
           <a:noFill/>
         </p:spPr>
         <p:txBody>
-          <a:bodyPr wrap="square" rtlCol="0">
+          <a:bodyPr wrap="none" rtlCol="0">
             <a:spAutoFit/>
           </a:bodyPr>
           <a:lstStyle/>
           <a:p>
             <a:r>
-              <a:rPr lang="es-CR" sz="2000" dirty="0" smtClean="0"/>
-              <a:t>Se valida con cada cambio</a:t>
-            </a:r>
-            <a:endParaRPr lang="en-US" sz="2000" dirty="0"/>
+              <a:rPr lang="es-CR" dirty="0" smtClean="0"/>
+              <a:t>Después</a:t>
+            </a:r>
+            <a:endParaRPr lang="es-CR" dirty="0"/>
+          </a:p>
+        </p:txBody>
+      </p:sp>
+      <p:sp>
+        <p:nvSpPr>
+          <p:cNvPr id="41" name="TextBox 40"/>
+          <p:cNvSpPr txBox="1"/>
+          <p:nvPr/>
+        </p:nvSpPr>
+        <p:spPr>
+          <a:xfrm>
+            <a:off x="9234723" y="4120804"/>
+            <a:ext cx="2364750" cy="1477328"/>
+          </a:xfrm>
+          <a:prstGeom prst="rect">
+            <a:avLst/>
+          </a:prstGeom>
+          <a:noFill/>
+        </p:spPr>
+        <p:txBody>
+          <a:bodyPr wrap="none" rtlCol="0">
+            <a:spAutoFit/>
+          </a:bodyPr>
+          <a:lstStyle/>
+          <a:p>
+            <a:r>
+              <a:rPr lang="es-CR" dirty="0" smtClean="0"/>
+              <a:t>10100101010010101</a:t>
+            </a:r>
+          </a:p>
+          <a:p>
+            <a:r>
+              <a:rPr lang="es-CR" dirty="0" smtClean="0"/>
+              <a:t>01001010100101010</a:t>
+            </a:r>
+            <a:endParaRPr lang="es-CR" dirty="0"/>
+          </a:p>
+          <a:p>
+            <a:r>
+              <a:rPr lang="es-CR" dirty="0" smtClean="0"/>
+              <a:t>10100101010010101</a:t>
+            </a:r>
+            <a:endParaRPr lang="es-CR" dirty="0"/>
+          </a:p>
+          <a:p>
+            <a:r>
+              <a:rPr lang="es-CR" dirty="0"/>
+              <a:t>01001010100101010</a:t>
+            </a:r>
+          </a:p>
+          <a:p>
+            <a:r>
+              <a:rPr lang="es-CR" dirty="0" smtClean="0"/>
+              <a:t>10100101010010101</a:t>
+            </a:r>
+            <a:endParaRPr lang="es-CR" dirty="0"/>
+          </a:p>
+        </p:txBody>
+      </p:sp>
+      <p:sp>
+        <p:nvSpPr>
+          <p:cNvPr id="38" name="Right Arrow 37"/>
+          <p:cNvSpPr/>
+          <p:nvPr/>
+        </p:nvSpPr>
+        <p:spPr>
+          <a:xfrm>
+            <a:off x="4531057" y="4007416"/>
+            <a:ext cx="479943" cy="506473"/>
+          </a:xfrm>
+          <a:prstGeom prst="rightArrow">
+            <a:avLst/>
+          </a:prstGeom>
+        </p:spPr>
+        <p:style>
+          <a:lnRef idx="2">
+            <a:schemeClr val="accent1">
+              <a:shade val="50000"/>
+            </a:schemeClr>
+          </a:lnRef>
+          <a:fillRef idx="1">
+            <a:schemeClr val="accent1"/>
+          </a:fillRef>
+          <a:effectRef idx="0">
+            <a:schemeClr val="accent1"/>
+          </a:effectRef>
+          <a:fontRef idx="minor">
+            <a:schemeClr val="lt1"/>
+          </a:fontRef>
+        </p:style>
+        <p:txBody>
+          <a:bodyPr rtlCol="0" anchor="ctr"/>
+          <a:lstStyle/>
+          <a:p>
+            <a:pPr algn="ctr"/>
+            <a:endParaRPr lang="es-CR"/>
+          </a:p>
+        </p:txBody>
+      </p:sp>
+      <p:sp>
+        <p:nvSpPr>
+          <p:cNvPr id="44" name="Right Arrow 43"/>
+          <p:cNvSpPr/>
+          <p:nvPr/>
+        </p:nvSpPr>
+        <p:spPr>
+          <a:xfrm>
+            <a:off x="8035229" y="4008487"/>
+            <a:ext cx="479943" cy="506473"/>
+          </a:xfrm>
+          <a:prstGeom prst="rightArrow">
+            <a:avLst/>
+          </a:prstGeom>
+        </p:spPr>
+        <p:style>
+          <a:lnRef idx="2">
+            <a:schemeClr val="accent1">
+              <a:shade val="50000"/>
+            </a:schemeClr>
+          </a:lnRef>
+          <a:fillRef idx="1">
+            <a:schemeClr val="accent1"/>
+          </a:fillRef>
+          <a:effectRef idx="0">
+            <a:schemeClr val="accent1"/>
+          </a:effectRef>
+          <a:fontRef idx="minor">
+            <a:schemeClr val="lt1"/>
+          </a:fontRef>
+        </p:style>
+        <p:txBody>
+          <a:bodyPr rtlCol="0" anchor="ctr"/>
+          <a:lstStyle/>
+          <a:p>
+            <a:pPr algn="ctr"/>
+            <a:endParaRPr lang="es-CR"/>
           </a:p>
         </p:txBody>
       </p:sp>
     </p:spTree>
     <p:extLst>
       <p:ext uri="{BB962C8B-B14F-4D97-AF65-F5344CB8AC3E}">
-        <p14:creationId xmlns:p14="http://schemas.microsoft.com/office/powerpoint/2010/main" val="430844721"/>
+        <p14:creationId xmlns:p14="http://schemas.microsoft.com/office/powerpoint/2010/main" val="4079369713"/>
       </p:ext>
     </p:extLst>
   </p:cSld>
@@ -23562,9 +21387,529 @@
   <p:timing>
     <p:tnLst>
       <p:par>
-        <p:cTn id="1" dur="indefinite" restart="never" nodeType="tmRoot"/>
+        <p:cTn id="1" dur="indefinite" restart="never" nodeType="tmRoot">
+          <p:childTnLst>
+            <p:seq concurrent="1" nextAc="seek">
+              <p:cTn id="2" dur="indefinite" nodeType="mainSeq">
+                <p:childTnLst>
+                  <p:par>
+                    <p:cTn id="3" fill="hold">
+                      <p:stCondLst>
+                        <p:cond delay="indefinite"/>
+                      </p:stCondLst>
+                      <p:childTnLst>
+                        <p:par>
+                          <p:cTn id="4" fill="hold">
+                            <p:stCondLst>
+                              <p:cond delay="0"/>
+                            </p:stCondLst>
+                            <p:childTnLst>
+                              <p:par>
+                                <p:cTn id="5" presetID="1" presetClass="entr" presetSubtype="0" fill="hold" nodeType="clickEffect">
+                                  <p:stCondLst>
+                                    <p:cond delay="0"/>
+                                  </p:stCondLst>
+                                  <p:childTnLst>
+                                    <p:set>
+                                      <p:cBhvr>
+                                        <p:cTn id="6" dur="1" fill="hold">
+                                          <p:stCondLst>
+                                            <p:cond delay="0"/>
+                                          </p:stCondLst>
+                                        </p:cTn>
+                                        <p:tgtEl>
+                                          <p:spTgt spid="8"/>
+                                        </p:tgtEl>
+                                        <p:attrNameLst>
+                                          <p:attrName>style.visibility</p:attrName>
+                                        </p:attrNameLst>
+                                      </p:cBhvr>
+                                      <p:to>
+                                        <p:strVal val="visible"/>
+                                      </p:to>
+                                    </p:set>
+                                  </p:childTnLst>
+                                </p:cTn>
+                              </p:par>
+                              <p:par>
+                                <p:cTn id="7" presetID="1" presetClass="entr" presetSubtype="0" fill="hold" grpId="0" nodeType="withEffect">
+                                  <p:stCondLst>
+                                    <p:cond delay="0"/>
+                                  </p:stCondLst>
+                                  <p:childTnLst>
+                                    <p:set>
+                                      <p:cBhvr>
+                                        <p:cTn id="8" dur="1" fill="hold">
+                                          <p:stCondLst>
+                                            <p:cond delay="0"/>
+                                          </p:stCondLst>
+                                        </p:cTn>
+                                        <p:tgtEl>
+                                          <p:spTgt spid="18"/>
+                                        </p:tgtEl>
+                                        <p:attrNameLst>
+                                          <p:attrName>style.visibility</p:attrName>
+                                        </p:attrNameLst>
+                                      </p:cBhvr>
+                                      <p:to>
+                                        <p:strVal val="visible"/>
+                                      </p:to>
+                                    </p:set>
+                                  </p:childTnLst>
+                                </p:cTn>
+                              </p:par>
+                              <p:par>
+                                <p:cTn id="9" presetID="1" presetClass="entr" presetSubtype="0" fill="hold" grpId="0" nodeType="withEffect">
+                                  <p:stCondLst>
+                                    <p:cond delay="0"/>
+                                  </p:stCondLst>
+                                  <p:childTnLst>
+                                    <p:set>
+                                      <p:cBhvr>
+                                        <p:cTn id="10" dur="1" fill="hold">
+                                          <p:stCondLst>
+                                            <p:cond delay="0"/>
+                                          </p:stCondLst>
+                                        </p:cTn>
+                                        <p:tgtEl>
+                                          <p:spTgt spid="20"/>
+                                        </p:tgtEl>
+                                        <p:attrNameLst>
+                                          <p:attrName>style.visibility</p:attrName>
+                                        </p:attrNameLst>
+                                      </p:cBhvr>
+                                      <p:to>
+                                        <p:strVal val="visible"/>
+                                      </p:to>
+                                    </p:set>
+                                  </p:childTnLst>
+                                </p:cTn>
+                              </p:par>
+                              <p:par>
+                                <p:cTn id="11" presetID="1" presetClass="entr" presetSubtype="0" fill="hold" grpId="0" nodeType="withEffect">
+                                  <p:stCondLst>
+                                    <p:cond delay="0"/>
+                                  </p:stCondLst>
+                                  <p:childTnLst>
+                                    <p:set>
+                                      <p:cBhvr>
+                                        <p:cTn id="12" dur="1" fill="hold">
+                                          <p:stCondLst>
+                                            <p:cond delay="0"/>
+                                          </p:stCondLst>
+                                        </p:cTn>
+                                        <p:tgtEl>
+                                          <p:spTgt spid="21"/>
+                                        </p:tgtEl>
+                                        <p:attrNameLst>
+                                          <p:attrName>style.visibility</p:attrName>
+                                        </p:attrNameLst>
+                                      </p:cBhvr>
+                                      <p:to>
+                                        <p:strVal val="visible"/>
+                                      </p:to>
+                                    </p:set>
+                                  </p:childTnLst>
+                                </p:cTn>
+                              </p:par>
+                              <p:par>
+                                <p:cTn id="13" presetID="1" presetClass="entr" presetSubtype="0" fill="hold" nodeType="withEffect">
+                                  <p:stCondLst>
+                                    <p:cond delay="0"/>
+                                  </p:stCondLst>
+                                  <p:childTnLst>
+                                    <p:set>
+                                      <p:cBhvr>
+                                        <p:cTn id="14" dur="1" fill="hold">
+                                          <p:stCondLst>
+                                            <p:cond delay="0"/>
+                                          </p:stCondLst>
+                                        </p:cTn>
+                                        <p:tgtEl>
+                                          <p:spTgt spid="27"/>
+                                        </p:tgtEl>
+                                        <p:attrNameLst>
+                                          <p:attrName>style.visibility</p:attrName>
+                                        </p:attrNameLst>
+                                      </p:cBhvr>
+                                      <p:to>
+                                        <p:strVal val="visible"/>
+                                      </p:to>
+                                    </p:set>
+                                  </p:childTnLst>
+                                </p:cTn>
+                              </p:par>
+                            </p:childTnLst>
+                          </p:cTn>
+                        </p:par>
+                      </p:childTnLst>
+                    </p:cTn>
+                  </p:par>
+                  <p:par>
+                    <p:cTn id="15" fill="hold">
+                      <p:stCondLst>
+                        <p:cond delay="indefinite"/>
+                      </p:stCondLst>
+                      <p:childTnLst>
+                        <p:par>
+                          <p:cTn id="16" fill="hold">
+                            <p:stCondLst>
+                              <p:cond delay="0"/>
+                            </p:stCondLst>
+                            <p:childTnLst>
+                              <p:par>
+                                <p:cTn id="17" presetID="1" presetClass="entr" presetSubtype="0" fill="hold" nodeType="clickEffect">
+                                  <p:stCondLst>
+                                    <p:cond delay="0"/>
+                                  </p:stCondLst>
+                                  <p:childTnLst>
+                                    <p:set>
+                                      <p:cBhvr>
+                                        <p:cTn id="18" dur="1" fill="hold">
+                                          <p:stCondLst>
+                                            <p:cond delay="0"/>
+                                          </p:stCondLst>
+                                        </p:cTn>
+                                        <p:tgtEl>
+                                          <p:spTgt spid="28"/>
+                                        </p:tgtEl>
+                                        <p:attrNameLst>
+                                          <p:attrName>style.visibility</p:attrName>
+                                        </p:attrNameLst>
+                                      </p:cBhvr>
+                                      <p:to>
+                                        <p:strVal val="visible"/>
+                                      </p:to>
+                                    </p:set>
+                                  </p:childTnLst>
+                                </p:cTn>
+                              </p:par>
+                              <p:par>
+                                <p:cTn id="19" presetID="1" presetClass="entr" presetSubtype="0" fill="hold" nodeType="withEffect">
+                                  <p:stCondLst>
+                                    <p:cond delay="0"/>
+                                  </p:stCondLst>
+                                  <p:childTnLst>
+                                    <p:set>
+                                      <p:cBhvr>
+                                        <p:cTn id="20" dur="1" fill="hold">
+                                          <p:stCondLst>
+                                            <p:cond delay="0"/>
+                                          </p:stCondLst>
+                                        </p:cTn>
+                                        <p:tgtEl>
+                                          <p:spTgt spid="25"/>
+                                        </p:tgtEl>
+                                        <p:attrNameLst>
+                                          <p:attrName>style.visibility</p:attrName>
+                                        </p:attrNameLst>
+                                      </p:cBhvr>
+                                      <p:to>
+                                        <p:strVal val="visible"/>
+                                      </p:to>
+                                    </p:set>
+                                  </p:childTnLst>
+                                </p:cTn>
+                              </p:par>
+                              <p:par>
+                                <p:cTn id="21" presetID="1" presetClass="entr" presetSubtype="0" fill="hold" grpId="0" nodeType="withEffect">
+                                  <p:stCondLst>
+                                    <p:cond delay="0"/>
+                                  </p:stCondLst>
+                                  <p:childTnLst>
+                                    <p:set>
+                                      <p:cBhvr>
+                                        <p:cTn id="22" dur="1" fill="hold">
+                                          <p:stCondLst>
+                                            <p:cond delay="0"/>
+                                          </p:stCondLst>
+                                        </p:cTn>
+                                        <p:tgtEl>
+                                          <p:spTgt spid="38"/>
+                                        </p:tgtEl>
+                                        <p:attrNameLst>
+                                          <p:attrName>style.visibility</p:attrName>
+                                        </p:attrNameLst>
+                                      </p:cBhvr>
+                                      <p:to>
+                                        <p:strVal val="visible"/>
+                                      </p:to>
+                                    </p:set>
+                                  </p:childTnLst>
+                                </p:cTn>
+                              </p:par>
+                              <p:par>
+                                <p:cTn id="23" presetID="1" presetClass="entr" presetSubtype="0" fill="hold" nodeType="withEffect">
+                                  <p:stCondLst>
+                                    <p:cond delay="0"/>
+                                  </p:stCondLst>
+                                  <p:childTnLst>
+                                    <p:set>
+                                      <p:cBhvr>
+                                        <p:cTn id="24" dur="1" fill="hold">
+                                          <p:stCondLst>
+                                            <p:cond delay="0"/>
+                                          </p:stCondLst>
+                                        </p:cTn>
+                                        <p:tgtEl>
+                                          <p:spTgt spid="35"/>
+                                        </p:tgtEl>
+                                        <p:attrNameLst>
+                                          <p:attrName>style.visibility</p:attrName>
+                                        </p:attrNameLst>
+                                      </p:cBhvr>
+                                      <p:to>
+                                        <p:strVal val="visible"/>
+                                      </p:to>
+                                    </p:set>
+                                  </p:childTnLst>
+                                </p:cTn>
+                              </p:par>
+                              <p:par>
+                                <p:cTn id="25" presetID="1" presetClass="entr" presetSubtype="0" fill="hold" nodeType="withEffect">
+                                  <p:stCondLst>
+                                    <p:cond delay="0"/>
+                                  </p:stCondLst>
+                                  <p:childTnLst>
+                                    <p:set>
+                                      <p:cBhvr>
+                                        <p:cTn id="26" dur="1" fill="hold">
+                                          <p:stCondLst>
+                                            <p:cond delay="0"/>
+                                          </p:stCondLst>
+                                        </p:cTn>
+                                        <p:tgtEl>
+                                          <p:spTgt spid="23"/>
+                                        </p:tgtEl>
+                                        <p:attrNameLst>
+                                          <p:attrName>style.visibility</p:attrName>
+                                        </p:attrNameLst>
+                                      </p:cBhvr>
+                                      <p:to>
+                                        <p:strVal val="visible"/>
+                                      </p:to>
+                                    </p:set>
+                                  </p:childTnLst>
+                                </p:cTn>
+                              </p:par>
+                              <p:par>
+                                <p:cTn id="27" presetID="1" presetClass="entr" presetSubtype="0" fill="hold" grpId="0" nodeType="withEffect">
+                                  <p:stCondLst>
+                                    <p:cond delay="0"/>
+                                  </p:stCondLst>
+                                  <p:childTnLst>
+                                    <p:set>
+                                      <p:cBhvr>
+                                        <p:cTn id="28" dur="1" fill="hold">
+                                          <p:stCondLst>
+                                            <p:cond delay="0"/>
+                                          </p:stCondLst>
+                                        </p:cTn>
+                                        <p:tgtEl>
+                                          <p:spTgt spid="34"/>
+                                        </p:tgtEl>
+                                        <p:attrNameLst>
+                                          <p:attrName>style.visibility</p:attrName>
+                                        </p:attrNameLst>
+                                      </p:cBhvr>
+                                      <p:to>
+                                        <p:strVal val="visible"/>
+                                      </p:to>
+                                    </p:set>
+                                  </p:childTnLst>
+                                </p:cTn>
+                              </p:par>
+                            </p:childTnLst>
+                          </p:cTn>
+                        </p:par>
+                      </p:childTnLst>
+                    </p:cTn>
+                  </p:par>
+                  <p:par>
+                    <p:cTn id="29" fill="hold">
+                      <p:stCondLst>
+                        <p:cond delay="indefinite"/>
+                      </p:stCondLst>
+                      <p:childTnLst>
+                        <p:par>
+                          <p:cTn id="30" fill="hold">
+                            <p:stCondLst>
+                              <p:cond delay="0"/>
+                            </p:stCondLst>
+                            <p:childTnLst>
+                              <p:par>
+                                <p:cTn id="31" presetID="1" presetClass="entr" presetSubtype="0" fill="hold" grpId="0" nodeType="clickEffect">
+                                  <p:stCondLst>
+                                    <p:cond delay="0"/>
+                                  </p:stCondLst>
+                                  <p:childTnLst>
+                                    <p:set>
+                                      <p:cBhvr>
+                                        <p:cTn id="32" dur="1" fill="hold">
+                                          <p:stCondLst>
+                                            <p:cond delay="0"/>
+                                          </p:stCondLst>
+                                        </p:cTn>
+                                        <p:tgtEl>
+                                          <p:spTgt spid="37"/>
+                                        </p:tgtEl>
+                                        <p:attrNameLst>
+                                          <p:attrName>style.visibility</p:attrName>
+                                        </p:attrNameLst>
+                                      </p:cBhvr>
+                                      <p:to>
+                                        <p:strVal val="visible"/>
+                                      </p:to>
+                                    </p:set>
+                                  </p:childTnLst>
+                                </p:cTn>
+                              </p:par>
+                              <p:par>
+                                <p:cTn id="33" presetID="1" presetClass="entr" presetSubtype="0" fill="hold" nodeType="withEffect">
+                                  <p:stCondLst>
+                                    <p:cond delay="0"/>
+                                  </p:stCondLst>
+                                  <p:childTnLst>
+                                    <p:set>
+                                      <p:cBhvr>
+                                        <p:cTn id="34" dur="1" fill="hold">
+                                          <p:stCondLst>
+                                            <p:cond delay="0"/>
+                                          </p:stCondLst>
+                                        </p:cTn>
+                                        <p:tgtEl>
+                                          <p:spTgt spid="29"/>
+                                        </p:tgtEl>
+                                        <p:attrNameLst>
+                                          <p:attrName>style.visibility</p:attrName>
+                                        </p:attrNameLst>
+                                      </p:cBhvr>
+                                      <p:to>
+                                        <p:strVal val="visible"/>
+                                      </p:to>
+                                    </p:set>
+                                  </p:childTnLst>
+                                </p:cTn>
+                              </p:par>
+                              <p:par>
+                                <p:cTn id="35" presetID="1" presetClass="entr" presetSubtype="0" fill="hold" grpId="0" nodeType="withEffect">
+                                  <p:stCondLst>
+                                    <p:cond delay="0"/>
+                                  </p:stCondLst>
+                                  <p:childTnLst>
+                                    <p:set>
+                                      <p:cBhvr>
+                                        <p:cTn id="36" dur="1" fill="hold">
+                                          <p:stCondLst>
+                                            <p:cond delay="0"/>
+                                          </p:stCondLst>
+                                        </p:cTn>
+                                        <p:tgtEl>
+                                          <p:spTgt spid="40"/>
+                                        </p:tgtEl>
+                                        <p:attrNameLst>
+                                          <p:attrName>style.visibility</p:attrName>
+                                        </p:attrNameLst>
+                                      </p:cBhvr>
+                                      <p:to>
+                                        <p:strVal val="visible"/>
+                                      </p:to>
+                                    </p:set>
+                                  </p:childTnLst>
+                                </p:cTn>
+                              </p:par>
+                              <p:par>
+                                <p:cTn id="37" presetID="1" presetClass="entr" presetSubtype="0" fill="hold" grpId="0" nodeType="withEffect">
+                                  <p:stCondLst>
+                                    <p:cond delay="0"/>
+                                  </p:stCondLst>
+                                  <p:childTnLst>
+                                    <p:set>
+                                      <p:cBhvr>
+                                        <p:cTn id="38" dur="1" fill="hold">
+                                          <p:stCondLst>
+                                            <p:cond delay="0"/>
+                                          </p:stCondLst>
+                                        </p:cTn>
+                                        <p:tgtEl>
+                                          <p:spTgt spid="44"/>
+                                        </p:tgtEl>
+                                        <p:attrNameLst>
+                                          <p:attrName>style.visibility</p:attrName>
+                                        </p:attrNameLst>
+                                      </p:cBhvr>
+                                      <p:to>
+                                        <p:strVal val="visible"/>
+                                      </p:to>
+                                    </p:set>
+                                  </p:childTnLst>
+                                </p:cTn>
+                              </p:par>
+                              <p:par>
+                                <p:cTn id="39" presetID="1" presetClass="entr" presetSubtype="0" fill="hold" grpId="0" nodeType="withEffect">
+                                  <p:stCondLst>
+                                    <p:cond delay="0"/>
+                                  </p:stCondLst>
+                                  <p:childTnLst>
+                                    <p:set>
+                                      <p:cBhvr>
+                                        <p:cTn id="40" dur="1" fill="hold">
+                                          <p:stCondLst>
+                                            <p:cond delay="0"/>
+                                          </p:stCondLst>
+                                        </p:cTn>
+                                        <p:tgtEl>
+                                          <p:spTgt spid="41"/>
+                                        </p:tgtEl>
+                                        <p:attrNameLst>
+                                          <p:attrName>style.visibility</p:attrName>
+                                        </p:attrNameLst>
+                                      </p:cBhvr>
+                                      <p:to>
+                                        <p:strVal val="visible"/>
+                                      </p:to>
+                                    </p:set>
+                                  </p:childTnLst>
+                                </p:cTn>
+                              </p:par>
+                            </p:childTnLst>
+                          </p:cTn>
+                        </p:par>
+                      </p:childTnLst>
+                    </p:cTn>
+                  </p:par>
+                </p:childTnLst>
+              </p:cTn>
+              <p:prevCondLst>
+                <p:cond evt="onPrev" delay="0">
+                  <p:tgtEl>
+                    <p:sldTgt/>
+                  </p:tgtEl>
+                </p:cond>
+              </p:prevCondLst>
+              <p:nextCondLst>
+                <p:cond evt="onNext" delay="0">
+                  <p:tgtEl>
+                    <p:sldTgt/>
+                  </p:tgtEl>
+                </p:cond>
+              </p:nextCondLst>
+            </p:seq>
+          </p:childTnLst>
+        </p:cTn>
       </p:par>
     </p:tnLst>
+    <p:bldLst>
+      <p:bldP spid="37" grpId="0" animBg="1"/>
+      <p:bldP spid="18" grpId="0"/>
+      <p:bldP spid="20" grpId="0" animBg="1"/>
+      <p:bldP spid="21" grpId="0"/>
+      <p:bldP spid="34" grpId="0"/>
+      <p:bldP spid="40" grpId="0"/>
+      <p:bldP spid="41" grpId="0"/>
+      <p:bldP spid="38" grpId="0" animBg="1"/>
+      <p:bldP spid="44" grpId="0" animBg="1"/>
+    </p:bldLst>
   </p:timing>
 </p:sld>
 </file>
@@ -23823,7 +22168,7 @@
             </a:r>
             <a:r>
               <a:rPr lang="es-CR" dirty="0" smtClean="0"/>
-              <a:t>Tres problemas</a:t>
+              <a:t>Tres problemas resueltos</a:t>
             </a:r>
             <a:endParaRPr lang="en-US" dirty="0"/>
           </a:p>
@@ -26067,19 +24412,7 @@
           <a:p>
             <a:r>
               <a:rPr lang="es-CR" sz="3600" dirty="0" smtClean="0"/>
-              <a:t>Se </a:t>
-            </a:r>
-            <a:r>
-              <a:rPr lang="es-CR" sz="3600" dirty="0" smtClean="0"/>
-              <a:t>puede ofrecer </a:t>
-            </a:r>
-            <a:r>
-              <a:rPr lang="es-CR" sz="3600" dirty="0" smtClean="0"/>
-              <a:t>entregas gratuitas a clientes </a:t>
-            </a:r>
-            <a:r>
-              <a:rPr lang="es-CR" sz="3600" dirty="0" smtClean="0"/>
-              <a:t>según sus compras.</a:t>
+              <a:t>Se puede ofrecer entregas gratuitas a clientes según sus compras.</a:t>
             </a:r>
             <a:endParaRPr lang="es-CR" sz="3600" dirty="0"/>
           </a:p>
@@ -26200,19 +24533,7 @@
             </a:pPr>
             <a:r>
               <a:rPr lang="es-CR" sz="2400" dirty="0" smtClean="0"/>
-              <a:t>Haré que funcione para todos </a:t>
-            </a:r>
-            <a:r>
-              <a:rPr lang="es-CR" sz="2400" dirty="0" smtClean="0"/>
-              <a:t>los </a:t>
-            </a:r>
-            <a:r>
-              <a:rPr lang="es-CR" sz="2400" dirty="0" smtClean="0"/>
-              <a:t>productos y todos </a:t>
-            </a:r>
-            <a:r>
-              <a:rPr lang="es-CR" sz="2400" dirty="0" smtClean="0"/>
-              <a:t>los clientes.</a:t>
+              <a:t>Haré que funcione para todos los productos y todos los clientes.</a:t>
             </a:r>
             <a:endParaRPr lang="es-CR" sz="2400" dirty="0"/>
           </a:p>

</xml_diff>

<commit_message>
Aclaro ejemplos y formatos
</commit_message>
<xml_diff>
--- a/Especificacion por Ejemplos.pptx
+++ b/Especificacion por Ejemplos.pptx
@@ -5,7 +5,7 @@
     <p:sldMasterId id="2147483795" r:id="rId1"/>
   </p:sldMasterIdLst>
   <p:notesMasterIdLst>
-    <p:notesMasterId r:id="rId25"/>
+    <p:notesMasterId r:id="rId26"/>
   </p:notesMasterIdLst>
   <p:sldIdLst>
     <p:sldId id="256" r:id="rId2"/>
@@ -26,11 +26,12 @@
     <p:sldId id="306" r:id="rId17"/>
     <p:sldId id="305" r:id="rId18"/>
     <p:sldId id="307" r:id="rId19"/>
-    <p:sldId id="309" r:id="rId20"/>
-    <p:sldId id="279" r:id="rId21"/>
-    <p:sldId id="280" r:id="rId22"/>
-    <p:sldId id="298" r:id="rId23"/>
-    <p:sldId id="277" r:id="rId24"/>
+    <p:sldId id="310" r:id="rId20"/>
+    <p:sldId id="309" r:id="rId21"/>
+    <p:sldId id="279" r:id="rId22"/>
+    <p:sldId id="280" r:id="rId23"/>
+    <p:sldId id="298" r:id="rId24"/>
+    <p:sldId id="277" r:id="rId25"/>
   </p:sldIdLst>
   <p:sldSz cx="12192000" cy="6858000"/>
   <p:notesSz cx="6858000" cy="9144000"/>
@@ -160,6 +161,7 @@
             <p14:sldId id="306"/>
             <p14:sldId id="305"/>
             <p14:sldId id="307"/>
+            <p14:sldId id="310"/>
             <p14:sldId id="309"/>
             <p14:sldId id="279"/>
             <p14:sldId id="280"/>
@@ -170,7 +172,7 @@
       </p14:sectionLst>
     </p:ext>
     <p:ext uri="{EFAFB233-063F-42B5-8137-9DF3F51BA10A}">
-      <p15:sldGuideLst xmlns="" xmlns:p15="http://schemas.microsoft.com/office/powerpoint/2012/main"/>
+      <p15:sldGuideLst xmlns:p15="http://schemas.microsoft.com/office/powerpoint/2012/main" xmlns=""/>
     </p:ext>
   </p:extLst>
 </p:presentation>
@@ -3966,6 +3968,102 @@
           <a:bodyPr/>
           <a:lstStyle/>
           <a:p>
+            <a:r>
+              <a:rPr lang="es-CR" dirty="0" smtClean="0"/>
+              <a:t>Con cada ejemplo, surgen más dudas y así logramos una especificación sin </a:t>
+            </a:r>
+            <a:r>
+              <a:rPr lang="es-CR" dirty="0" err="1" smtClean="0"/>
+              <a:t>ambiguedades</a:t>
+            </a:r>
+            <a:r>
+              <a:rPr lang="es-CR" dirty="0" smtClean="0"/>
+              <a:t>.</a:t>
+            </a:r>
+          </a:p>
+          <a:p>
+            <a:endParaRPr lang="es-CR" dirty="0" smtClean="0"/>
+          </a:p>
+          <a:p>
+            <a:r>
+              <a:rPr lang="es-CR" dirty="0" smtClean="0"/>
+              <a:t>Aquí,</a:t>
+            </a:r>
+            <a:r>
+              <a:rPr lang="es-CR" baseline="0" dirty="0" smtClean="0"/>
+              <a:t> podemos ajustar el escenario para que la columna de tipos de producto contenga más tipos (por ejemplo “libros, lavadoras”. El código se ajustará para soportar la regla.</a:t>
+            </a:r>
+          </a:p>
+          <a:p>
+            <a:endParaRPr lang="es-CR" baseline="0" dirty="0" smtClean="0"/>
+          </a:p>
+          <a:p>
+            <a:r>
+              <a:rPr lang="es-CR" baseline="0" dirty="0" smtClean="0"/>
+              <a:t>Agregamos los ejemplos:</a:t>
+            </a:r>
+          </a:p>
+          <a:p>
+            <a:pPr marL="171450" indent="-171450">
+              <a:buFontTx/>
+              <a:buChar char="-"/>
+            </a:pPr>
+            <a:r>
+              <a:rPr lang="es-CR" sz="1200" kern="1200" dirty="0" smtClean="0">
+                <a:solidFill>
+                  <a:schemeClr val="tx1"/>
+                </a:solidFill>
+                <a:latin typeface="+mn-lt"/>
+                <a:ea typeface="+mn-ea"/>
+                <a:cs typeface="+mn-cs"/>
+              </a:rPr>
+              <a:t>no califica si la orden contiene más que libros </a:t>
+            </a:r>
+          </a:p>
+          <a:p>
+            <a:pPr marL="171450" indent="-171450">
+              <a:buFontTx/>
+              <a:buChar char="-"/>
+            </a:pPr>
+            <a:r>
+              <a:rPr lang="es-CR" sz="1200" kern="1200" dirty="0" smtClean="0">
+                <a:solidFill>
+                  <a:schemeClr val="tx1"/>
+                </a:solidFill>
+                <a:latin typeface="+mn-lt"/>
+                <a:ea typeface="+mn-ea"/>
+                <a:cs typeface="+mn-cs"/>
+              </a:rPr>
+              <a:t>bienes digitales no afectan </a:t>
+            </a:r>
+            <a:r>
+              <a:rPr lang="es-CR" sz="1200" kern="1200" dirty="0" err="1" smtClean="0">
+                <a:solidFill>
+                  <a:schemeClr val="tx1"/>
+                </a:solidFill>
+                <a:latin typeface="+mn-lt"/>
+                <a:ea typeface="+mn-ea"/>
+                <a:cs typeface="+mn-cs"/>
+              </a:rPr>
+              <a:t>calificacion</a:t>
+            </a:r>
+            <a:r>
+              <a:rPr lang="es-CR" sz="1200" kern="1200" dirty="0" smtClean="0">
+                <a:solidFill>
+                  <a:schemeClr val="tx1"/>
+                </a:solidFill>
+                <a:latin typeface="+mn-lt"/>
+                <a:ea typeface="+mn-ea"/>
+                <a:cs typeface="+mn-cs"/>
+              </a:rPr>
+              <a:t> de otros productos </a:t>
+            </a:r>
+          </a:p>
+          <a:p>
+            <a:pPr marL="171450" indent="-171450">
+              <a:buFontTx/>
+              <a:buChar char="-"/>
+            </a:pPr>
             <a:endParaRPr lang="es-CR" dirty="0"/>
           </a:p>
         </p:txBody>
@@ -3987,7 +4085,91 @@
           <a:p>
             <a:fld id="{9980F735-AEAE-4F3B-8BAF-43B018904B5F}" type="slidenum">
               <a:rPr lang="en-US" smtClean="0"/>
-              <a:t>21</a:t>
+              <a:t>19</a:t>
+            </a:fld>
+            <a:endParaRPr lang="en-US"/>
+          </a:p>
+        </p:txBody>
+      </p:sp>
+    </p:spTree>
+    <p:extLst>
+      <p:ext uri="{BB962C8B-B14F-4D97-AF65-F5344CB8AC3E}">
+        <p14:creationId xmlns:p14="http://schemas.microsoft.com/office/powerpoint/2010/main" val="2643012981"/>
+      </p:ext>
+    </p:extLst>
+  </p:cSld>
+  <p:clrMapOvr>
+    <a:masterClrMapping/>
+  </p:clrMapOvr>
+</p:notes>
+</file>
+
+<file path=ppt/notesSlides/notesSlide7.xml><?xml version="1.0" encoding="utf-8"?>
+<p:notes xmlns:a="http://schemas.openxmlformats.org/drawingml/2006/main" xmlns:r="http://schemas.openxmlformats.org/officeDocument/2006/relationships" xmlns:p="http://schemas.openxmlformats.org/presentationml/2006/main">
+  <p:cSld>
+    <p:spTree>
+      <p:nvGrpSpPr>
+        <p:cNvPr id="1" name=""/>
+        <p:cNvGrpSpPr/>
+        <p:nvPr/>
+      </p:nvGrpSpPr>
+      <p:grpSpPr>
+        <a:xfrm>
+          <a:off x="0" y="0"/>
+          <a:ext cx="0" cy="0"/>
+          <a:chOff x="0" y="0"/>
+          <a:chExt cx="0" cy="0"/>
+        </a:xfrm>
+      </p:grpSpPr>
+      <p:sp>
+        <p:nvSpPr>
+          <p:cNvPr id="2" name="Slide Image Placeholder 1"/>
+          <p:cNvSpPr>
+            <a:spLocks noGrp="1" noRot="1" noChangeAspect="1"/>
+          </p:cNvSpPr>
+          <p:nvPr>
+            <p:ph type="sldImg"/>
+          </p:nvPr>
+        </p:nvSpPr>
+        <p:spPr/>
+      </p:sp>
+      <p:sp>
+        <p:nvSpPr>
+          <p:cNvPr id="3" name="Notes Placeholder 2"/>
+          <p:cNvSpPr>
+            <a:spLocks noGrp="1"/>
+          </p:cNvSpPr>
+          <p:nvPr>
+            <p:ph type="body" idx="1"/>
+          </p:nvPr>
+        </p:nvSpPr>
+        <p:spPr/>
+        <p:txBody>
+          <a:bodyPr/>
+          <a:lstStyle/>
+          <a:p>
+            <a:endParaRPr lang="es-CR" dirty="0"/>
+          </a:p>
+        </p:txBody>
+      </p:sp>
+      <p:sp>
+        <p:nvSpPr>
+          <p:cNvPr id="4" name="Slide Number Placeholder 3"/>
+          <p:cNvSpPr>
+            <a:spLocks noGrp="1"/>
+          </p:cNvSpPr>
+          <p:nvPr>
+            <p:ph type="sldNum" sz="quarter" idx="10"/>
+          </p:nvPr>
+        </p:nvSpPr>
+        <p:spPr/>
+        <p:txBody>
+          <a:bodyPr/>
+          <a:lstStyle/>
+          <a:p>
+            <a:fld id="{9980F735-AEAE-4F3B-8BAF-43B018904B5F}" type="slidenum">
+              <a:rPr lang="en-US" smtClean="0"/>
+              <a:t>22</a:t>
             </a:fld>
             <a:endParaRPr lang="en-US"/>
           </a:p>
@@ -20077,28 +20259,41 @@
           <a:p>
             <a:r>
               <a:rPr lang="es-CR" sz="3200" dirty="0" smtClean="0"/>
+              <a:t>Es </a:t>
+            </a:r>
+            <a:r>
+              <a:rPr lang="es-CR" sz="3200" dirty="0" smtClean="0"/>
+              <a:t>legible para </a:t>
+            </a:r>
+            <a:r>
+              <a:rPr lang="es-CR" sz="3200" dirty="0" smtClean="0"/>
+              <a:t>humanos</a:t>
+            </a:r>
+          </a:p>
+          <a:p>
+            <a:pPr lvl="1"/>
+            <a:r>
+              <a:rPr lang="es-CR" sz="2800" dirty="0"/>
               <a:t>Usa lenguaje del negocio</a:t>
             </a:r>
           </a:p>
           <a:p>
             <a:r>
               <a:rPr lang="es-CR" sz="3200" dirty="0" smtClean="0"/>
-              <a:t>Es legible para humanos</a:t>
-            </a:r>
-          </a:p>
-          <a:p>
+              <a:t>Todos </a:t>
+            </a:r>
             <a:r>
               <a:rPr lang="es-CR" sz="3200" dirty="0" smtClean="0"/>
-              <a:t>Todos pueden consultarlo fácilmente </a:t>
+              <a:t>pueden consultarlo fácilmente </a:t>
             </a:r>
           </a:p>
           <a:p>
             <a:pPr lvl="1"/>
             <a:r>
-              <a:rPr lang="es-CR" sz="3000" dirty="0" smtClean="0"/>
+              <a:rPr lang="es-CR" sz="2800" dirty="0" smtClean="0"/>
               <a:t>Se puede usar para conversar…</a:t>
             </a:r>
-            <a:endParaRPr lang="es-CR" sz="3000" dirty="0"/>
+            <a:endParaRPr lang="es-CR" sz="2800" dirty="0"/>
           </a:p>
         </p:txBody>
       </p:sp>
@@ -20443,10 +20638,19 @@
                   </a:schemeClr>
                 </a:solidFill>
               </a:rPr>
-              <a:t>En los ejemplos, incluimos sólo la información relevante para la explicación de la regla.</a:t>
-            </a:r>
-          </a:p>
-          <a:p>
+              <a:t>En los ejemplos, incluimos sólo la información relevante para la explicación de la regla</a:t>
+            </a:r>
+            <a:r>
+              <a:rPr lang="es-CR" sz="3200" dirty="0" smtClean="0">
+                <a:solidFill>
+                  <a:schemeClr val="tx1">
+                    <a:lumMod val="50000"/>
+                    <a:lumOff val="50000"/>
+                  </a:schemeClr>
+                </a:solidFill>
+              </a:rPr>
+              <a:t>.</a:t>
+            </a:r>
             <a:endParaRPr lang="es-CR" sz="3200" dirty="0"/>
           </a:p>
         </p:txBody>
@@ -20581,6 +20785,394 @@
 </file>
 
 <file path=ppt/slides/slide19.xml><?xml version="1.0" encoding="utf-8"?>
+<p:sld xmlns:a="http://schemas.openxmlformats.org/drawingml/2006/main" xmlns:r="http://schemas.openxmlformats.org/officeDocument/2006/relationships" xmlns:p="http://schemas.openxmlformats.org/presentationml/2006/main">
+  <p:cSld>
+    <p:spTree>
+      <p:nvGrpSpPr>
+        <p:cNvPr id="1" name=""/>
+        <p:cNvGrpSpPr/>
+        <p:nvPr/>
+      </p:nvGrpSpPr>
+      <p:grpSpPr>
+        <a:xfrm>
+          <a:off x="0" y="0"/>
+          <a:ext cx="0" cy="0"/>
+          <a:chOff x="0" y="0"/>
+          <a:chExt cx="0" cy="0"/>
+        </a:xfrm>
+      </p:grpSpPr>
+      <p:sp>
+        <p:nvSpPr>
+          <p:cNvPr id="2" name="Title 1"/>
+          <p:cNvSpPr>
+            <a:spLocks noGrp="1"/>
+          </p:cNvSpPr>
+          <p:nvPr>
+            <p:ph type="title"/>
+          </p:nvPr>
+        </p:nvSpPr>
+        <p:spPr/>
+        <p:txBody>
+          <a:bodyPr/>
+          <a:lstStyle/>
+          <a:p>
+            <a:r>
+              <a:rPr lang="es-CR" dirty="0" smtClean="0"/>
+              <a:t>Refinando más el ejemplo</a:t>
+            </a:r>
+            <a:endParaRPr lang="es-CR" dirty="0"/>
+          </a:p>
+        </p:txBody>
+      </p:sp>
+      <p:sp>
+        <p:nvSpPr>
+          <p:cNvPr id="3" name="Content Placeholder 2"/>
+          <p:cNvSpPr>
+            <a:spLocks noGrp="1"/>
+          </p:cNvSpPr>
+          <p:nvPr>
+            <p:ph idx="1"/>
+          </p:nvPr>
+        </p:nvSpPr>
+        <p:spPr/>
+        <p:txBody>
+          <a:bodyPr>
+            <a:noAutofit/>
+          </a:bodyPr>
+          <a:lstStyle/>
+          <a:p>
+            <a:r>
+              <a:rPr lang="es-CR" sz="2000" b="1" dirty="0" smtClean="0"/>
+              <a:t>El tester</a:t>
+            </a:r>
+            <a:r>
+              <a:rPr lang="es-CR" sz="2000" dirty="0" smtClean="0"/>
+              <a:t>: “¿Qué pasa si la orden contiene libros y lavadoras?”.</a:t>
+            </a:r>
+          </a:p>
+          <a:p>
+            <a:r>
+              <a:rPr lang="es-CR" sz="2000" b="1" dirty="0" smtClean="0"/>
+              <a:t>Dueño de producto</a:t>
+            </a:r>
+            <a:r>
+              <a:rPr lang="es-CR" sz="2000" dirty="0" smtClean="0"/>
+              <a:t>: “En ese caso, la orden no califica.”</a:t>
+            </a:r>
+          </a:p>
+          <a:p>
+            <a:r>
+              <a:rPr lang="es-CR" sz="2000" b="1" dirty="0" smtClean="0"/>
+              <a:t>El desarrollador</a:t>
+            </a:r>
+            <a:r>
+              <a:rPr lang="es-CR" sz="2000" dirty="0" smtClean="0"/>
+              <a:t>: “Si la orden tiene libros y bienes digitales, ¿se debería ignorar los digitales y ofrecer la entrega gratuita?”</a:t>
+            </a:r>
+          </a:p>
+          <a:p>
+            <a:r>
+              <a:rPr lang="es-CR" sz="2000" b="1" dirty="0" smtClean="0"/>
+              <a:t>Dueño de producto</a:t>
+            </a:r>
+            <a:r>
+              <a:rPr lang="es-CR" sz="2000" dirty="0" smtClean="0"/>
+              <a:t>: “Sí. Y recuerden que si tuviera lavadoras y digitales, la orden no califica como en el otro ejemplo.”</a:t>
+            </a:r>
+            <a:endParaRPr lang="es-CR" sz="2000" dirty="0"/>
+          </a:p>
+        </p:txBody>
+      </p:sp>
+      <p:sp>
+        <p:nvSpPr>
+          <p:cNvPr id="4" name="Rectangle 3"/>
+          <p:cNvSpPr/>
+          <p:nvPr/>
+        </p:nvSpPr>
+        <p:spPr>
+          <a:xfrm>
+            <a:off x="5658197" y="5496775"/>
+            <a:ext cx="6096000" cy="1200329"/>
+          </a:xfrm>
+          <a:prstGeom prst="rect">
+            <a:avLst/>
+          </a:prstGeom>
+        </p:spPr>
+        <p:style>
+          <a:lnRef idx="2">
+            <a:schemeClr val="accent3">
+              <a:shade val="50000"/>
+            </a:schemeClr>
+          </a:lnRef>
+          <a:fillRef idx="1">
+            <a:schemeClr val="accent3"/>
+          </a:fillRef>
+          <a:effectRef idx="0">
+            <a:schemeClr val="accent3"/>
+          </a:effectRef>
+          <a:fontRef idx="minor">
+            <a:schemeClr val="lt1"/>
+          </a:fontRef>
+        </p:style>
+        <p:txBody>
+          <a:bodyPr>
+            <a:spAutoFit/>
+          </a:bodyPr>
+          <a:lstStyle/>
+          <a:p>
+            <a:r>
+              <a:rPr lang="es-CR" sz="2400" dirty="0" smtClean="0">
+                <a:solidFill>
+                  <a:schemeClr val="bg1"/>
+                </a:solidFill>
+              </a:rPr>
+              <a:t>Haga que los ejemplos sean claros para todos. Es más importante que pensar cómo convertirlo en código.</a:t>
+            </a:r>
+            <a:endParaRPr lang="es-CR" sz="2400" dirty="0">
+              <a:solidFill>
+                <a:schemeClr val="bg1"/>
+              </a:solidFill>
+            </a:endParaRPr>
+          </a:p>
+        </p:txBody>
+      </p:sp>
+    </p:spTree>
+    <p:extLst>
+      <p:ext uri="{BB962C8B-B14F-4D97-AF65-F5344CB8AC3E}">
+        <p14:creationId xmlns:p14="http://schemas.microsoft.com/office/powerpoint/2010/main" val="4279793431"/>
+      </p:ext>
+    </p:extLst>
+  </p:cSld>
+  <p:clrMapOvr>
+    <a:masterClrMapping/>
+  </p:clrMapOvr>
+  <p:timing>
+    <p:tnLst>
+      <p:par>
+        <p:cTn id="1" dur="indefinite" restart="never" nodeType="tmRoot"/>
+      </p:par>
+    </p:tnLst>
+  </p:timing>
+</p:sld>
+</file>
+
+<file path=ppt/slides/slide2.xml><?xml version="1.0" encoding="utf-8"?>
+<p:sld xmlns:a="http://schemas.openxmlformats.org/drawingml/2006/main" xmlns:r="http://schemas.openxmlformats.org/officeDocument/2006/relationships" xmlns:p="http://schemas.openxmlformats.org/presentationml/2006/main">
+  <p:cSld>
+    <p:spTree>
+      <p:nvGrpSpPr>
+        <p:cNvPr id="1" name=""/>
+        <p:cNvGrpSpPr/>
+        <p:nvPr/>
+      </p:nvGrpSpPr>
+      <p:grpSpPr>
+        <a:xfrm>
+          <a:off x="0" y="0"/>
+          <a:ext cx="0" cy="0"/>
+          <a:chOff x="0" y="0"/>
+          <a:chExt cx="0" cy="0"/>
+        </a:xfrm>
+      </p:grpSpPr>
+      <p:sp>
+        <p:nvSpPr>
+          <p:cNvPr id="2" name="Title 1"/>
+          <p:cNvSpPr>
+            <a:spLocks noGrp="1"/>
+          </p:cNvSpPr>
+          <p:nvPr>
+            <p:ph type="title"/>
+          </p:nvPr>
+        </p:nvSpPr>
+        <p:spPr/>
+        <p:txBody>
+          <a:bodyPr/>
+          <a:lstStyle/>
+          <a:p>
+            <a:r>
+              <a:rPr lang="es-CR" dirty="0" smtClean="0"/>
+              <a:t>¿Cómo mejorar mi </a:t>
+            </a:r>
+            <a:r>
+              <a:rPr lang="es-CR" dirty="0" err="1" smtClean="0"/>
+              <a:t>Scrum</a:t>
+            </a:r>
+            <a:r>
+              <a:rPr lang="es-CR" dirty="0" smtClean="0"/>
+              <a:t>?</a:t>
+            </a:r>
+            <a:endParaRPr lang="en-US" dirty="0"/>
+          </a:p>
+        </p:txBody>
+      </p:sp>
+      <p:sp>
+        <p:nvSpPr>
+          <p:cNvPr id="3" name="Content Placeholder 2"/>
+          <p:cNvSpPr>
+            <a:spLocks noGrp="1"/>
+          </p:cNvSpPr>
+          <p:nvPr>
+            <p:ph idx="1"/>
+          </p:nvPr>
+        </p:nvSpPr>
+        <p:spPr/>
+        <p:txBody>
+          <a:bodyPr>
+            <a:normAutofit/>
+          </a:bodyPr>
+          <a:lstStyle/>
+          <a:p>
+            <a:pPr lvl="1"/>
+            <a:r>
+              <a:rPr lang="es-CR" sz="3200" dirty="0" smtClean="0"/>
+              <a:t>Mejoremos </a:t>
+            </a:r>
+            <a:r>
+              <a:rPr lang="es-CR" sz="3200" dirty="0"/>
+              <a:t>la manera en cómo </a:t>
+            </a:r>
+            <a:r>
+              <a:rPr lang="es-CR" sz="3200" dirty="0" smtClean="0"/>
+              <a:t>entendemos lo complejo </a:t>
+            </a:r>
+            <a:r>
+              <a:rPr lang="es-CR" sz="3200" dirty="0"/>
+              <a:t>del </a:t>
+            </a:r>
+            <a:r>
+              <a:rPr lang="es-CR" sz="3200" dirty="0" smtClean="0"/>
+              <a:t>negocio.</a:t>
+            </a:r>
+            <a:endParaRPr lang="en-US" sz="3200" dirty="0"/>
+          </a:p>
+        </p:txBody>
+      </p:sp>
+      <p:pic>
+        <p:nvPicPr>
+          <p:cNvPr id="4" name="Picture Placeholder 11"/>
+          <p:cNvPicPr>
+            <a:picLocks noChangeAspect="1"/>
+          </p:cNvPicPr>
+          <p:nvPr/>
+        </p:nvPicPr>
+        <p:blipFill rotWithShape="1">
+          <a:blip r:embed="rId2">
+            <a:extLst>
+              <a:ext uri="{28A0092B-C50C-407E-A947-70E740481C1C}">
+                <a14:useLocalDpi xmlns:a14="http://schemas.microsoft.com/office/drawing/2010/main" val="0"/>
+              </a:ext>
+            </a:extLst>
+          </a:blip>
+          <a:srcRect l="-4863" t="-3283" r="-4618" b="-9506"/>
+          <a:stretch/>
+        </p:blipFill>
+        <p:spPr>
+          <a:xfrm>
+            <a:off x="8853714" y="4688114"/>
+            <a:ext cx="2946400" cy="2206172"/>
+          </a:xfrm>
+          <a:prstGeom prst="roundRect">
+            <a:avLst>
+              <a:gd name="adj" fmla="val 1858"/>
+            </a:avLst>
+          </a:prstGeom>
+        </p:spPr>
+      </p:pic>
+    </p:spTree>
+    <p:extLst>
+      <p:ext uri="{BB962C8B-B14F-4D97-AF65-F5344CB8AC3E}">
+        <p14:creationId xmlns:p14="http://schemas.microsoft.com/office/powerpoint/2010/main" val="4090491670"/>
+      </p:ext>
+    </p:extLst>
+  </p:cSld>
+  <p:clrMapOvr>
+    <a:masterClrMapping/>
+  </p:clrMapOvr>
+  <p:timing>
+    <p:tnLst>
+      <p:par>
+        <p:cTn id="1" dur="indefinite" restart="never" nodeType="tmRoot">
+          <p:childTnLst>
+            <p:seq concurrent="1" nextAc="seek">
+              <p:cTn id="2" dur="indefinite" nodeType="mainSeq">
+                <p:childTnLst>
+                  <p:par>
+                    <p:cTn id="3" fill="hold">
+                      <p:stCondLst>
+                        <p:cond delay="indefinite"/>
+                      </p:stCondLst>
+                      <p:childTnLst>
+                        <p:par>
+                          <p:cTn id="4" fill="hold">
+                            <p:stCondLst>
+                              <p:cond delay="0"/>
+                            </p:stCondLst>
+                            <p:childTnLst>
+                              <p:par>
+                                <p:cTn id="5" presetID="1" presetClass="entr" presetSubtype="0" fill="hold" grpId="0" nodeType="clickEffect">
+                                  <p:stCondLst>
+                                    <p:cond delay="0"/>
+                                  </p:stCondLst>
+                                  <p:childTnLst>
+                                    <p:set>
+                                      <p:cBhvr>
+                                        <p:cTn id="6" dur="1" fill="hold">
+                                          <p:stCondLst>
+                                            <p:cond delay="0"/>
+                                          </p:stCondLst>
+                                        </p:cTn>
+                                        <p:tgtEl>
+                                          <p:spTgt spid="3">
+                                            <p:txEl>
+                                              <p:pRg st="0" end="0"/>
+                                            </p:txEl>
+                                          </p:spTgt>
+                                        </p:tgtEl>
+                                        <p:attrNameLst>
+                                          <p:attrName>style.visibility</p:attrName>
+                                        </p:attrNameLst>
+                                      </p:cBhvr>
+                                      <p:to>
+                                        <p:strVal val="visible"/>
+                                      </p:to>
+                                    </p:set>
+                                  </p:childTnLst>
+                                </p:cTn>
+                              </p:par>
+                            </p:childTnLst>
+                          </p:cTn>
+                        </p:par>
+                      </p:childTnLst>
+                    </p:cTn>
+                  </p:par>
+                </p:childTnLst>
+              </p:cTn>
+              <p:prevCondLst>
+                <p:cond evt="onPrev" delay="0">
+                  <p:tgtEl>
+                    <p:sldTgt/>
+                  </p:tgtEl>
+                </p:cond>
+              </p:prevCondLst>
+              <p:nextCondLst>
+                <p:cond evt="onNext" delay="0">
+                  <p:tgtEl>
+                    <p:sldTgt/>
+                  </p:tgtEl>
+                </p:cond>
+              </p:nextCondLst>
+            </p:seq>
+          </p:childTnLst>
+        </p:cTn>
+      </p:par>
+    </p:tnLst>
+    <p:bldLst>
+      <p:bldP spid="3" grpId="0" uiExpand="1" build="p"/>
+    </p:bldLst>
+  </p:timing>
+</p:sld>
+</file>
+
+<file path=ppt/slides/slide20.xml><?xml version="1.0" encoding="utf-8"?>
 <p:sld xmlns:a="http://schemas.openxmlformats.org/drawingml/2006/main" xmlns:r="http://schemas.openxmlformats.org/officeDocument/2006/relationships" xmlns:p="http://schemas.openxmlformats.org/presentationml/2006/main">
   <p:cSld>
     <p:spTree>
@@ -21914,7 +22506,7 @@
 </p:sld>
 </file>
 
-<file path=ppt/slides/slide2.xml><?xml version="1.0" encoding="utf-8"?>
+<file path=ppt/slides/slide21.xml><?xml version="1.0" encoding="utf-8"?>
 <p:sld xmlns:a="http://schemas.openxmlformats.org/drawingml/2006/main" xmlns:r="http://schemas.openxmlformats.org/officeDocument/2006/relationships" xmlns:p="http://schemas.openxmlformats.org/presentationml/2006/main">
   <p:cSld>
     <p:spTree>
@@ -21947,222 +22539,6 @@
           <a:lstStyle/>
           <a:p>
             <a:r>
-              <a:rPr lang="es-CR" dirty="0" smtClean="0"/>
-              <a:t>¿Cómo mejorar mi </a:t>
-            </a:r>
-            <a:r>
-              <a:rPr lang="es-CR" dirty="0" err="1" smtClean="0"/>
-              <a:t>Scrum</a:t>
-            </a:r>
-            <a:r>
-              <a:rPr lang="es-CR" dirty="0" smtClean="0"/>
-              <a:t>?</a:t>
-            </a:r>
-            <a:endParaRPr lang="en-US" dirty="0"/>
-          </a:p>
-        </p:txBody>
-      </p:sp>
-      <p:sp>
-        <p:nvSpPr>
-          <p:cNvPr id="3" name="Content Placeholder 2"/>
-          <p:cNvSpPr>
-            <a:spLocks noGrp="1"/>
-          </p:cNvSpPr>
-          <p:nvPr>
-            <p:ph idx="1"/>
-          </p:nvPr>
-        </p:nvSpPr>
-        <p:spPr/>
-        <p:txBody>
-          <a:bodyPr>
-            <a:normAutofit/>
-          </a:bodyPr>
-          <a:lstStyle/>
-          <a:p>
-            <a:pPr lvl="1"/>
-            <a:r>
-              <a:rPr lang="es-CR" sz="3200" dirty="0" smtClean="0"/>
-              <a:t>Mejoremos </a:t>
-            </a:r>
-            <a:r>
-              <a:rPr lang="es-CR" sz="3200" dirty="0"/>
-              <a:t>la manera en cómo </a:t>
-            </a:r>
-            <a:r>
-              <a:rPr lang="es-CR" sz="3200" dirty="0" smtClean="0"/>
-              <a:t>entendemos lo complejo </a:t>
-            </a:r>
-            <a:r>
-              <a:rPr lang="es-CR" sz="3200" dirty="0"/>
-              <a:t>del </a:t>
-            </a:r>
-            <a:r>
-              <a:rPr lang="es-CR" sz="3200" dirty="0" smtClean="0"/>
-              <a:t>negocio.</a:t>
-            </a:r>
-            <a:endParaRPr lang="en-US" sz="3200" dirty="0"/>
-          </a:p>
-        </p:txBody>
-      </p:sp>
-      <p:pic>
-        <p:nvPicPr>
-          <p:cNvPr id="4" name="Picture Placeholder 11"/>
-          <p:cNvPicPr>
-            <a:picLocks noChangeAspect="1"/>
-          </p:cNvPicPr>
-          <p:nvPr/>
-        </p:nvPicPr>
-        <p:blipFill rotWithShape="1">
-          <a:blip r:embed="rId2">
-            <a:extLst>
-              <a:ext uri="{28A0092B-C50C-407E-A947-70E740481C1C}">
-                <a14:useLocalDpi xmlns:a14="http://schemas.microsoft.com/office/drawing/2010/main" val="0"/>
-              </a:ext>
-            </a:extLst>
-          </a:blip>
-          <a:srcRect l="-4863" t="-3283" r="-4618" b="-9506"/>
-          <a:stretch/>
-        </p:blipFill>
-        <p:spPr>
-          <a:xfrm>
-            <a:off x="8853714" y="4688114"/>
-            <a:ext cx="2946400" cy="2206172"/>
-          </a:xfrm>
-          <a:prstGeom prst="roundRect">
-            <a:avLst>
-              <a:gd name="adj" fmla="val 1858"/>
-            </a:avLst>
-          </a:prstGeom>
-        </p:spPr>
-      </p:pic>
-    </p:spTree>
-    <p:extLst>
-      <p:ext uri="{BB962C8B-B14F-4D97-AF65-F5344CB8AC3E}">
-        <p14:creationId xmlns:p14="http://schemas.microsoft.com/office/powerpoint/2010/main" val="4090491670"/>
-      </p:ext>
-    </p:extLst>
-  </p:cSld>
-  <p:clrMapOvr>
-    <a:masterClrMapping/>
-  </p:clrMapOvr>
-  <p:timing>
-    <p:tnLst>
-      <p:par>
-        <p:cTn id="1" dur="indefinite" restart="never" nodeType="tmRoot">
-          <p:childTnLst>
-            <p:seq concurrent="1" nextAc="seek">
-              <p:cTn id="2" dur="indefinite" nodeType="mainSeq">
-                <p:childTnLst>
-                  <p:par>
-                    <p:cTn id="3" fill="hold">
-                      <p:stCondLst>
-                        <p:cond delay="indefinite"/>
-                      </p:stCondLst>
-                      <p:childTnLst>
-                        <p:par>
-                          <p:cTn id="4" fill="hold">
-                            <p:stCondLst>
-                              <p:cond delay="0"/>
-                            </p:stCondLst>
-                            <p:childTnLst>
-                              <p:par>
-                                <p:cTn id="5" presetID="1" presetClass="entr" presetSubtype="0" fill="hold" grpId="0" nodeType="clickEffect">
-                                  <p:stCondLst>
-                                    <p:cond delay="0"/>
-                                  </p:stCondLst>
-                                  <p:childTnLst>
-                                    <p:set>
-                                      <p:cBhvr>
-                                        <p:cTn id="6" dur="1" fill="hold">
-                                          <p:stCondLst>
-                                            <p:cond delay="0"/>
-                                          </p:stCondLst>
-                                        </p:cTn>
-                                        <p:tgtEl>
-                                          <p:spTgt spid="3">
-                                            <p:txEl>
-                                              <p:pRg st="0" end="0"/>
-                                            </p:txEl>
-                                          </p:spTgt>
-                                        </p:tgtEl>
-                                        <p:attrNameLst>
-                                          <p:attrName>style.visibility</p:attrName>
-                                        </p:attrNameLst>
-                                      </p:cBhvr>
-                                      <p:to>
-                                        <p:strVal val="visible"/>
-                                      </p:to>
-                                    </p:set>
-                                  </p:childTnLst>
-                                </p:cTn>
-                              </p:par>
-                            </p:childTnLst>
-                          </p:cTn>
-                        </p:par>
-                      </p:childTnLst>
-                    </p:cTn>
-                  </p:par>
-                </p:childTnLst>
-              </p:cTn>
-              <p:prevCondLst>
-                <p:cond evt="onPrev" delay="0">
-                  <p:tgtEl>
-                    <p:sldTgt/>
-                  </p:tgtEl>
-                </p:cond>
-              </p:prevCondLst>
-              <p:nextCondLst>
-                <p:cond evt="onNext" delay="0">
-                  <p:tgtEl>
-                    <p:sldTgt/>
-                  </p:tgtEl>
-                </p:cond>
-              </p:nextCondLst>
-            </p:seq>
-          </p:childTnLst>
-        </p:cTn>
-      </p:par>
-    </p:tnLst>
-    <p:bldLst>
-      <p:bldP spid="3" grpId="0" uiExpand="1" build="p"/>
-    </p:bldLst>
-  </p:timing>
-</p:sld>
-</file>
-
-<file path=ppt/slides/slide20.xml><?xml version="1.0" encoding="utf-8"?>
-<p:sld xmlns:a="http://schemas.openxmlformats.org/drawingml/2006/main" xmlns:r="http://schemas.openxmlformats.org/officeDocument/2006/relationships" xmlns:p="http://schemas.openxmlformats.org/presentationml/2006/main">
-  <p:cSld>
-    <p:spTree>
-      <p:nvGrpSpPr>
-        <p:cNvPr id="1" name=""/>
-        <p:cNvGrpSpPr/>
-        <p:nvPr/>
-      </p:nvGrpSpPr>
-      <p:grpSpPr>
-        <a:xfrm>
-          <a:off x="0" y="0"/>
-          <a:ext cx="0" cy="0"/>
-          <a:chOff x="0" y="0"/>
-          <a:chExt cx="0" cy="0"/>
-        </a:xfrm>
-      </p:grpSpPr>
-      <p:sp>
-        <p:nvSpPr>
-          <p:cNvPr id="2" name="Title 1"/>
-          <p:cNvSpPr>
-            <a:spLocks noGrp="1"/>
-          </p:cNvSpPr>
-          <p:nvPr>
-            <p:ph type="title"/>
-          </p:nvPr>
-        </p:nvSpPr>
-        <p:spPr/>
-        <p:txBody>
-          <a:bodyPr/>
-          <a:lstStyle/>
-          <a:p>
-            <a:r>
               <a:rPr lang="es-CR" b="1" dirty="0" smtClean="0"/>
               <a:t>R/ </a:t>
             </a:r>
@@ -22375,7 +22751,7 @@
 </p:sld>
 </file>
 
-<file path=ppt/slides/slide21.xml><?xml version="1.0" encoding="utf-8"?>
+<file path=ppt/slides/slide22.xml><?xml version="1.0" encoding="utf-8"?>
 <p:sld xmlns:a="http://schemas.openxmlformats.org/drawingml/2006/main" xmlns:r="http://schemas.openxmlformats.org/officeDocument/2006/relationships" xmlns:p="http://schemas.openxmlformats.org/presentationml/2006/main">
   <p:cSld>
     <p:spTree>
@@ -22798,82 +23174,14 @@
   <p:timing>
     <p:tnLst>
       <p:par>
-        <p:cTn id="1" dur="indefinite" restart="never" nodeType="tmRoot">
-          <p:childTnLst>
-            <p:seq concurrent="1" nextAc="seek">
-              <p:cTn id="2" dur="indefinite" nodeType="mainSeq">
-                <p:childTnLst>
-                  <p:par>
-                    <p:cTn id="3" fill="hold">
-                      <p:stCondLst>
-                        <p:cond delay="indefinite"/>
-                      </p:stCondLst>
-                      <p:childTnLst>
-                        <p:par>
-                          <p:cTn id="4" fill="hold">
-                            <p:stCondLst>
-                              <p:cond delay="0"/>
-                            </p:stCondLst>
-                            <p:childTnLst>
-                              <p:par>
-                                <p:cTn id="5" presetID="1" presetClass="entr" presetSubtype="0" fill="hold" nodeType="clickEffect">
-                                  <p:stCondLst>
-                                    <p:cond delay="0"/>
-                                  </p:stCondLst>
-                                  <p:childTnLst>
-                                    <p:set>
-                                      <p:cBhvr>
-                                        <p:cTn id="6" dur="1" fill="hold">
-                                          <p:stCondLst>
-                                            <p:cond delay="0"/>
-                                          </p:stCondLst>
-                                        </p:cTn>
-                                        <p:tgtEl>
-                                          <p:spTgt spid="10"/>
-                                        </p:tgtEl>
-                                        <p:attrNameLst>
-                                          <p:attrName>style.visibility</p:attrName>
-                                        </p:attrNameLst>
-                                      </p:cBhvr>
-                                      <p:to>
-                                        <p:strVal val="visible"/>
-                                      </p:to>
-                                    </p:set>
-                                  </p:childTnLst>
-                                </p:cTn>
-                              </p:par>
-                            </p:childTnLst>
-                          </p:cTn>
-                        </p:par>
-                      </p:childTnLst>
-                    </p:cTn>
-                  </p:par>
-                </p:childTnLst>
-              </p:cTn>
-              <p:prevCondLst>
-                <p:cond evt="onPrev" delay="0">
-                  <p:tgtEl>
-                    <p:sldTgt/>
-                  </p:tgtEl>
-                </p:cond>
-              </p:prevCondLst>
-              <p:nextCondLst>
-                <p:cond evt="onNext" delay="0">
-                  <p:tgtEl>
-                    <p:sldTgt/>
-                  </p:tgtEl>
-                </p:cond>
-              </p:nextCondLst>
-            </p:seq>
-          </p:childTnLst>
-        </p:cTn>
+        <p:cTn id="1" dur="indefinite" restart="never" nodeType="tmRoot"/>
       </p:par>
     </p:tnLst>
   </p:timing>
 </p:sld>
 </file>
 
-<file path=ppt/slides/slide22.xml><?xml version="1.0" encoding="utf-8"?>
+<file path=ppt/slides/slide23.xml><?xml version="1.0" encoding="utf-8"?>
 <p:sld xmlns:a="http://schemas.openxmlformats.org/drawingml/2006/main" xmlns:r="http://schemas.openxmlformats.org/officeDocument/2006/relationships" xmlns:p="http://schemas.openxmlformats.org/presentationml/2006/main">
   <p:cSld>
     <p:spTree>
@@ -22907,7 +23215,11 @@
           <a:p>
             <a:r>
               <a:rPr lang="es-CR" dirty="0" smtClean="0"/>
-              <a:t>Materiales de esta presentación</a:t>
+              <a:t>Materiales de esta </a:t>
+            </a:r>
+            <a:r>
+              <a:rPr lang="es-CR" dirty="0" smtClean="0"/>
+              <a:t>charla</a:t>
             </a:r>
             <a:endParaRPr lang="es-CR" dirty="0"/>
           </a:p>
@@ -22921,7 +23233,7 @@
         </p:nvSpPr>
         <p:spPr>
           <a:xfrm>
-            <a:off x="622300" y="5600700"/>
+            <a:off x="389544" y="2839431"/>
             <a:ext cx="11538736" cy="492443"/>
           </a:xfrm>
           <a:prstGeom prst="rect">
@@ -22955,94 +23267,99 @@
           </a:p>
         </p:txBody>
       </p:sp>
-      <p:sp>
-        <p:nvSpPr>
-          <p:cNvPr id="6" name="Rounded Rectangle 5"/>
-          <p:cNvSpPr/>
+      <p:pic>
+        <p:nvPicPr>
+          <p:cNvPr id="1026" name="Picture 2" descr="http://www.iconsdb.com/icons/preview/purple/github-11-xxl.png"/>
+          <p:cNvPicPr>
+            <a:picLocks noChangeAspect="1" noChangeArrowheads="1"/>
+          </p:cNvPicPr>
           <p:nvPr/>
-        </p:nvSpPr>
-        <p:spPr>
+        </p:nvPicPr>
+        <p:blipFill>
+          <a:blip r:embed="rId2">
+            <a:extLst>
+              <a:ext uri="{28A0092B-C50C-407E-A947-70E740481C1C}">
+                <a14:useLocalDpi xmlns:a14="http://schemas.microsoft.com/office/drawing/2010/main" val="0"/>
+              </a:ext>
+            </a:extLst>
+          </a:blip>
+          <a:srcRect/>
+          <a:stretch>
+            <a:fillRect/>
+          </a:stretch>
+        </p:blipFill>
+        <p:spPr bwMode="auto">
           <a:xfrm>
-            <a:off x="1877906" y="3295650"/>
-            <a:ext cx="3452706" cy="1231900"/>
+            <a:off x="9505023" y="4238047"/>
+            <a:ext cx="2438400" cy="2438400"/>
           </a:xfrm>
-          <a:prstGeom prst="roundRect">
+          <a:prstGeom prst="rect">
             <a:avLst/>
           </a:prstGeom>
+          <a:noFill/>
+          <a:extLst>
+            <a:ext uri="{909E8E84-426E-40DD-AFC4-6F175D3DCCD1}">
+              <a14:hiddenFill xmlns:a14="http://schemas.microsoft.com/office/drawing/2010/main">
+                <a:solidFill>
+                  <a:srgbClr val="FFFFFF"/>
+                </a:solidFill>
+              </a14:hiddenFill>
+            </a:ext>
+          </a:extLst>
         </p:spPr>
-        <p:style>
-          <a:lnRef idx="2">
-            <a:schemeClr val="accent1">
-              <a:shade val="50000"/>
-            </a:schemeClr>
-          </a:lnRef>
-          <a:fillRef idx="1">
-            <a:schemeClr val="accent1"/>
-          </a:fillRef>
-          <a:effectRef idx="0">
-            <a:schemeClr val="accent1"/>
-          </a:effectRef>
-          <a:fontRef idx="minor">
-            <a:schemeClr val="lt1"/>
-          </a:fontRef>
-        </p:style>
-        <p:txBody>
-          <a:bodyPr rtlCol="0" anchor="ctr"/>
-          <a:lstStyle/>
-          <a:p>
-            <a:pPr algn="ctr"/>
-            <a:r>
-              <a:rPr lang="es-CR" sz="3200" dirty="0" err="1" smtClean="0"/>
-              <a:t>pptx</a:t>
-            </a:r>
-            <a:endParaRPr lang="es-CR" sz="3200" dirty="0"/>
-          </a:p>
-        </p:txBody>
-      </p:sp>
-      <p:sp>
-        <p:nvSpPr>
-          <p:cNvPr id="9" name="Rounded Rectangle 8"/>
-          <p:cNvSpPr/>
+      </p:pic>
+      <p:pic>
+        <p:nvPicPr>
+          <p:cNvPr id="1027" name="Picture 3"/>
+          <p:cNvPicPr>
+            <a:picLocks noChangeAspect="1" noChangeArrowheads="1"/>
+          </p:cNvPicPr>
           <p:nvPr/>
-        </p:nvSpPr>
-        <p:spPr>
+        </p:nvPicPr>
+        <p:blipFill rotWithShape="1">
+          <a:blip r:embed="rId3">
+            <a:extLst>
+              <a:ext uri="{28A0092B-C50C-407E-A947-70E740481C1C}">
+                <a14:useLocalDpi xmlns:a14="http://schemas.microsoft.com/office/drawing/2010/main" val="0"/>
+              </a:ext>
+            </a:extLst>
+          </a:blip>
+          <a:srcRect t="56016"/>
+          <a:stretch/>
+        </p:blipFill>
+        <p:spPr bwMode="auto">
           <a:xfrm>
-            <a:off x="5587153" y="3295650"/>
-            <a:ext cx="3452706" cy="1231900"/>
+            <a:off x="205308" y="4069957"/>
+            <a:ext cx="9088322" cy="2681348"/>
           </a:xfrm>
-          <a:prstGeom prst="roundRect">
+          <a:prstGeom prst="rect">
             <a:avLst/>
           </a:prstGeom>
+          <a:noFill/>
+          <a:ln>
+            <a:noFill/>
+          </a:ln>
+          <a:extLst>
+            <a:ext uri="{909E8E84-426E-40DD-AFC4-6F175D3DCCD1}">
+              <a14:hiddenFill xmlns:a14="http://schemas.microsoft.com/office/drawing/2010/main">
+                <a:solidFill>
+                  <a:schemeClr val="accent1"/>
+                </a:solidFill>
+              </a14:hiddenFill>
+            </a:ext>
+            <a:ext uri="{91240B29-F687-4F45-9708-019B960494DF}">
+              <a14:hiddenLine xmlns:a14="http://schemas.microsoft.com/office/drawing/2010/main" w="9525">
+                <a:solidFill>
+                  <a:schemeClr val="tx1"/>
+                </a:solidFill>
+                <a:miter lim="800000"/>
+                <a:headEnd/>
+                <a:tailEnd/>
+              </a14:hiddenLine>
+            </a:ext>
+          </a:extLst>
         </p:spPr>
-        <p:style>
-          <a:lnRef idx="2">
-            <a:schemeClr val="accent1">
-              <a:shade val="50000"/>
-            </a:schemeClr>
-          </a:lnRef>
-          <a:fillRef idx="1">
-            <a:schemeClr val="accent1"/>
-          </a:fillRef>
-          <a:effectRef idx="0">
-            <a:schemeClr val="accent1"/>
-          </a:effectRef>
-          <a:fontRef idx="minor">
-            <a:schemeClr val="lt1"/>
-          </a:fontRef>
-        </p:style>
-        <p:txBody>
-          <a:bodyPr rtlCol="0" anchor="ctr"/>
-          <a:lstStyle/>
-          <a:p>
-            <a:pPr algn="ctr"/>
-            <a:r>
-              <a:rPr lang="es-CR" sz="3200" dirty="0" smtClean="0"/>
-              <a:t>código fuente</a:t>
-            </a:r>
-            <a:endParaRPr lang="es-CR" sz="3200" dirty="0"/>
-          </a:p>
-        </p:txBody>
-      </p:sp>
+      </p:pic>
     </p:spTree>
     <p:extLst>
       <p:ext uri="{BB962C8B-B14F-4D97-AF65-F5344CB8AC3E}">
@@ -23063,7 +23380,7 @@
 </p:sld>
 </file>
 
-<file path=ppt/slides/slide23.xml><?xml version="1.0" encoding="utf-8"?>
+<file path=ppt/slides/slide24.xml><?xml version="1.0" encoding="utf-8"?>
 <p:sld xmlns:a="http://schemas.openxmlformats.org/drawingml/2006/main" xmlns:r="http://schemas.openxmlformats.org/officeDocument/2006/relationships" xmlns:p="http://schemas.openxmlformats.org/presentationml/2006/main">
   <p:cSld>
     <p:spTree>
@@ -26848,7 +27165,7 @@
   <a:extraClrSchemeLst/>
   <a:extLst>
     <a:ext uri="{05A4C25C-085E-4340-85A3-A5531E510DB2}">
-      <thm15:themeFamily xmlns="" xmlns:thm15="http://schemas.microsoft.com/office/thememl/2012/main" name="Ion Boardroom" id="{FC33163D-4339-46B1-8EED-24C834239D99}" vid="{B8502691-933B-45FE-8764-BA278511EF27}"/>
+      <thm15:themeFamily xmlns:thm15="http://schemas.microsoft.com/office/thememl/2012/main" xmlns="" name="Ion Boardroom" id="{FC33163D-4339-46B1-8EED-24C834239D99}" vid="{B8502691-933B-45FE-8764-BA278511EF27}"/>
     </a:ext>
   </a:extLst>
 </a:theme>
@@ -27109,7 +27426,7 @@
   <a:extraClrSchemeLst/>
   <a:extLst>
     <a:ext uri="{05A4C25C-085E-4340-85A3-A5531E510DB2}">
-      <thm15:themeFamily xmlns="" xmlns:thm15="http://schemas.microsoft.com/office/thememl/2012/main" name="Office Theme" id="{62F939B6-93AF-4DB8-9C6B-D6C7DFDC589F}" vid="{4A3C46E8-61CC-4603-A589-7422A47A8E4A}"/>
+      <thm15:themeFamily xmlns:thm15="http://schemas.microsoft.com/office/thememl/2012/main" xmlns="" name="Office Theme" id="{62F939B6-93AF-4DB8-9C6B-D6C7DFDC589F}" vid="{4A3C46E8-61CC-4603-A589-7422A47A8E4A}"/>
     </a:ext>
   </a:extLst>
 </a:theme>

</xml_diff>